<commit_message>
Working on BXCC process description.
</commit_message>
<xml_diff>
--- a/images/BXCC_figs.pptx
+++ b/images/BXCC_figs.pptx
@@ -262,7 +262,7 @@
           <a:p>
             <a:fld id="{42C5692D-4EAB-6146-AB82-22160C9836E7}" type="datetimeFigureOut">
               <a:rPr lang="en-US" smtClean="0"/>
-              <a:t>7/28/25</a:t>
+              <a:t>7/29/25</a:t>
             </a:fld>
             <a:endParaRPr lang="en-US"/>
           </a:p>
@@ -460,7 +460,7 @@
           <a:p>
             <a:fld id="{42C5692D-4EAB-6146-AB82-22160C9836E7}" type="datetimeFigureOut">
               <a:rPr lang="en-US" smtClean="0"/>
-              <a:t>7/28/25</a:t>
+              <a:t>7/29/25</a:t>
             </a:fld>
             <a:endParaRPr lang="en-US"/>
           </a:p>
@@ -668,7 +668,7 @@
           <a:p>
             <a:fld id="{42C5692D-4EAB-6146-AB82-22160C9836E7}" type="datetimeFigureOut">
               <a:rPr lang="en-US" smtClean="0"/>
-              <a:t>7/28/25</a:t>
+              <a:t>7/29/25</a:t>
             </a:fld>
             <a:endParaRPr lang="en-US"/>
           </a:p>
@@ -866,7 +866,7 @@
           <a:p>
             <a:fld id="{42C5692D-4EAB-6146-AB82-22160C9836E7}" type="datetimeFigureOut">
               <a:rPr lang="en-US" smtClean="0"/>
-              <a:t>7/28/25</a:t>
+              <a:t>7/29/25</a:t>
             </a:fld>
             <a:endParaRPr lang="en-US"/>
           </a:p>
@@ -1141,7 +1141,7 @@
           <a:p>
             <a:fld id="{42C5692D-4EAB-6146-AB82-22160C9836E7}" type="datetimeFigureOut">
               <a:rPr lang="en-US" smtClean="0"/>
-              <a:t>7/28/25</a:t>
+              <a:t>7/29/25</a:t>
             </a:fld>
             <a:endParaRPr lang="en-US"/>
           </a:p>
@@ -1406,7 +1406,7 @@
           <a:p>
             <a:fld id="{42C5692D-4EAB-6146-AB82-22160C9836E7}" type="datetimeFigureOut">
               <a:rPr lang="en-US" smtClean="0"/>
-              <a:t>7/28/25</a:t>
+              <a:t>7/29/25</a:t>
             </a:fld>
             <a:endParaRPr lang="en-US"/>
           </a:p>
@@ -1818,7 +1818,7 @@
           <a:p>
             <a:fld id="{42C5692D-4EAB-6146-AB82-22160C9836E7}" type="datetimeFigureOut">
               <a:rPr lang="en-US" smtClean="0"/>
-              <a:t>7/28/25</a:t>
+              <a:t>7/29/25</a:t>
             </a:fld>
             <a:endParaRPr lang="en-US"/>
           </a:p>
@@ -1959,7 +1959,7 @@
           <a:p>
             <a:fld id="{42C5692D-4EAB-6146-AB82-22160C9836E7}" type="datetimeFigureOut">
               <a:rPr lang="en-US" smtClean="0"/>
-              <a:t>7/28/25</a:t>
+              <a:t>7/29/25</a:t>
             </a:fld>
             <a:endParaRPr lang="en-US"/>
           </a:p>
@@ -2072,7 +2072,7 @@
           <a:p>
             <a:fld id="{42C5692D-4EAB-6146-AB82-22160C9836E7}" type="datetimeFigureOut">
               <a:rPr lang="en-US" smtClean="0"/>
-              <a:t>7/28/25</a:t>
+              <a:t>7/29/25</a:t>
             </a:fld>
             <a:endParaRPr lang="en-US"/>
           </a:p>
@@ -2383,7 +2383,7 @@
           <a:p>
             <a:fld id="{42C5692D-4EAB-6146-AB82-22160C9836E7}" type="datetimeFigureOut">
               <a:rPr lang="en-US" smtClean="0"/>
-              <a:t>7/28/25</a:t>
+              <a:t>7/29/25</a:t>
             </a:fld>
             <a:endParaRPr lang="en-US"/>
           </a:p>
@@ -2671,7 +2671,7 @@
           <a:p>
             <a:fld id="{42C5692D-4EAB-6146-AB82-22160C9836E7}" type="datetimeFigureOut">
               <a:rPr lang="en-US" smtClean="0"/>
-              <a:t>7/28/25</a:t>
+              <a:t>7/29/25</a:t>
             </a:fld>
             <a:endParaRPr lang="en-US"/>
           </a:p>
@@ -2912,7 +2912,7 @@
           <a:p>
             <a:fld id="{42C5692D-4EAB-6146-AB82-22160C9836E7}" type="datetimeFigureOut">
               <a:rPr lang="en-US" smtClean="0"/>
-              <a:t>7/28/25</a:t>
+              <a:t>7/29/25</a:t>
             </a:fld>
             <a:endParaRPr lang="en-US"/>
           </a:p>
@@ -6648,7 +6648,7 @@
         </p:nvSpPr>
         <p:spPr>
           <a:xfrm>
-            <a:off x="932644" y="5006926"/>
+            <a:off x="932644" y="5237049"/>
             <a:ext cx="922048" cy="246221"/>
           </a:xfrm>
           <a:prstGeom prst="rect">
@@ -7323,7 +7323,7 @@
         </p:nvSpPr>
         <p:spPr>
           <a:xfrm>
-            <a:off x="3330061" y="5019282"/>
+            <a:off x="3330061" y="5249405"/>
             <a:ext cx="428323" cy="246221"/>
           </a:xfrm>
           <a:prstGeom prst="rect">

</xml_diff>

<commit_message>
Update methods section for BXCC
</commit_message>
<xml_diff>
--- a/images/BXCC_figs.pptx
+++ b/images/BXCC_figs.pptx
@@ -3384,13 +3384,12 @@
           </p:cNvPr>
           <p:cNvCxnSpPr>
             <a:cxnSpLocks/>
-            <a:endCxn id="6" idx="1"/>
           </p:cNvCxnSpPr>
           <p:nvPr/>
         </p:nvCxnSpPr>
         <p:spPr>
           <a:xfrm>
-            <a:off x="5108575" y="1174816"/>
+            <a:off x="5108575" y="1180872"/>
             <a:ext cx="543118" cy="0"/>
           </a:xfrm>
           <a:prstGeom prst="straightConnector1">
@@ -4571,8 +4570,9 @@
           </a:prstGeom>
           <a:ln>
             <a:solidFill>
-              <a:srgbClr val="FF0000"/>
+              <a:schemeClr val="tx1"/>
             </a:solidFill>
+            <a:prstDash val="dash"/>
             <a:tailEnd type="triangle"/>
           </a:ln>
         </p:spPr>

</xml_diff>

<commit_message>
Fix bug in a figure.
</commit_message>
<xml_diff>
--- a/images/BXCC_figs.pptx
+++ b/images/BXCC_figs.pptx
@@ -262,7 +262,7 @@
           <a:p>
             <a:fld id="{42C5692D-4EAB-6146-AB82-22160C9836E7}" type="datetimeFigureOut">
               <a:rPr lang="en-US" smtClean="0"/>
-              <a:t>7/29/25</a:t>
+              <a:t>7/30/25</a:t>
             </a:fld>
             <a:endParaRPr lang="en-US"/>
           </a:p>
@@ -460,7 +460,7 @@
           <a:p>
             <a:fld id="{42C5692D-4EAB-6146-AB82-22160C9836E7}" type="datetimeFigureOut">
               <a:rPr lang="en-US" smtClean="0"/>
-              <a:t>7/29/25</a:t>
+              <a:t>7/30/25</a:t>
             </a:fld>
             <a:endParaRPr lang="en-US"/>
           </a:p>
@@ -668,7 +668,7 @@
           <a:p>
             <a:fld id="{42C5692D-4EAB-6146-AB82-22160C9836E7}" type="datetimeFigureOut">
               <a:rPr lang="en-US" smtClean="0"/>
-              <a:t>7/29/25</a:t>
+              <a:t>7/30/25</a:t>
             </a:fld>
             <a:endParaRPr lang="en-US"/>
           </a:p>
@@ -866,7 +866,7 @@
           <a:p>
             <a:fld id="{42C5692D-4EAB-6146-AB82-22160C9836E7}" type="datetimeFigureOut">
               <a:rPr lang="en-US" smtClean="0"/>
-              <a:t>7/29/25</a:t>
+              <a:t>7/30/25</a:t>
             </a:fld>
             <a:endParaRPr lang="en-US"/>
           </a:p>
@@ -1141,7 +1141,7 @@
           <a:p>
             <a:fld id="{42C5692D-4EAB-6146-AB82-22160C9836E7}" type="datetimeFigureOut">
               <a:rPr lang="en-US" smtClean="0"/>
-              <a:t>7/29/25</a:t>
+              <a:t>7/30/25</a:t>
             </a:fld>
             <a:endParaRPr lang="en-US"/>
           </a:p>
@@ -1406,7 +1406,7 @@
           <a:p>
             <a:fld id="{42C5692D-4EAB-6146-AB82-22160C9836E7}" type="datetimeFigureOut">
               <a:rPr lang="en-US" smtClean="0"/>
-              <a:t>7/29/25</a:t>
+              <a:t>7/30/25</a:t>
             </a:fld>
             <a:endParaRPr lang="en-US"/>
           </a:p>
@@ -1818,7 +1818,7 @@
           <a:p>
             <a:fld id="{42C5692D-4EAB-6146-AB82-22160C9836E7}" type="datetimeFigureOut">
               <a:rPr lang="en-US" smtClean="0"/>
-              <a:t>7/29/25</a:t>
+              <a:t>7/30/25</a:t>
             </a:fld>
             <a:endParaRPr lang="en-US"/>
           </a:p>
@@ -1959,7 +1959,7 @@
           <a:p>
             <a:fld id="{42C5692D-4EAB-6146-AB82-22160C9836E7}" type="datetimeFigureOut">
               <a:rPr lang="en-US" smtClean="0"/>
-              <a:t>7/29/25</a:t>
+              <a:t>7/30/25</a:t>
             </a:fld>
             <a:endParaRPr lang="en-US"/>
           </a:p>
@@ -2072,7 +2072,7 @@
           <a:p>
             <a:fld id="{42C5692D-4EAB-6146-AB82-22160C9836E7}" type="datetimeFigureOut">
               <a:rPr lang="en-US" smtClean="0"/>
-              <a:t>7/29/25</a:t>
+              <a:t>7/30/25</a:t>
             </a:fld>
             <a:endParaRPr lang="en-US"/>
           </a:p>
@@ -2383,7 +2383,7 @@
           <a:p>
             <a:fld id="{42C5692D-4EAB-6146-AB82-22160C9836E7}" type="datetimeFigureOut">
               <a:rPr lang="en-US" smtClean="0"/>
-              <a:t>7/29/25</a:t>
+              <a:t>7/30/25</a:t>
             </a:fld>
             <a:endParaRPr lang="en-US"/>
           </a:p>
@@ -2671,7 +2671,7 @@
           <a:p>
             <a:fld id="{42C5692D-4EAB-6146-AB82-22160C9836E7}" type="datetimeFigureOut">
               <a:rPr lang="en-US" smtClean="0"/>
-              <a:t>7/29/25</a:t>
+              <a:t>7/30/25</a:t>
             </a:fld>
             <a:endParaRPr lang="en-US"/>
           </a:p>
@@ -2912,7 +2912,7 @@
           <a:p>
             <a:fld id="{42C5692D-4EAB-6146-AB82-22160C9836E7}" type="datetimeFigureOut">
               <a:rPr lang="en-US" smtClean="0"/>
-              <a:t>7/29/25</a:t>
+              <a:t>7/30/25</a:t>
             </a:fld>
             <a:endParaRPr lang="en-US"/>
           </a:p>
@@ -10595,8 +10595,8 @@
         </p:nvSpPr>
         <p:spPr>
           <a:xfrm rot="20699462">
-            <a:off x="2593483" y="4091729"/>
-            <a:ext cx="768159" cy="400110"/>
+            <a:off x="2740959" y="4091729"/>
+            <a:ext cx="473207" cy="400110"/>
           </a:xfrm>
           <a:prstGeom prst="rect">
             <a:avLst/>
@@ -10612,7 +10612,7 @@
             <a:pPr algn="ctr"/>
             <a:r>
               <a:rPr lang="en-US" sz="1000" dirty="0"/>
-              <a:t>Limestone</a:t>
+              <a:t>Coke</a:t>
             </a:r>
           </a:p>
           <a:p>

</xml_diff>

<commit_message>
Changing some elect --> electricity
</commit_message>
<xml_diff>
--- a/images/BXCC_figs.pptx
+++ b/images/BXCC_figs.pptx
@@ -262,7 +262,7 @@
           <a:p>
             <a:fld id="{42C5692D-4EAB-6146-AB82-22160C9836E7}" type="datetimeFigureOut">
               <a:rPr lang="en-US" smtClean="0"/>
-              <a:t>7/30/25</a:t>
+              <a:t>8/1/25</a:t>
             </a:fld>
             <a:endParaRPr lang="en-US"/>
           </a:p>
@@ -460,7 +460,7 @@
           <a:p>
             <a:fld id="{42C5692D-4EAB-6146-AB82-22160C9836E7}" type="datetimeFigureOut">
               <a:rPr lang="en-US" smtClean="0"/>
-              <a:t>7/30/25</a:t>
+              <a:t>8/1/25</a:t>
             </a:fld>
             <a:endParaRPr lang="en-US"/>
           </a:p>
@@ -668,7 +668,7 @@
           <a:p>
             <a:fld id="{42C5692D-4EAB-6146-AB82-22160C9836E7}" type="datetimeFigureOut">
               <a:rPr lang="en-US" smtClean="0"/>
-              <a:t>7/30/25</a:t>
+              <a:t>8/1/25</a:t>
             </a:fld>
             <a:endParaRPr lang="en-US"/>
           </a:p>
@@ -866,7 +866,7 @@
           <a:p>
             <a:fld id="{42C5692D-4EAB-6146-AB82-22160C9836E7}" type="datetimeFigureOut">
               <a:rPr lang="en-US" smtClean="0"/>
-              <a:t>7/30/25</a:t>
+              <a:t>8/1/25</a:t>
             </a:fld>
             <a:endParaRPr lang="en-US"/>
           </a:p>
@@ -1141,7 +1141,7 @@
           <a:p>
             <a:fld id="{42C5692D-4EAB-6146-AB82-22160C9836E7}" type="datetimeFigureOut">
               <a:rPr lang="en-US" smtClean="0"/>
-              <a:t>7/30/25</a:t>
+              <a:t>8/1/25</a:t>
             </a:fld>
             <a:endParaRPr lang="en-US"/>
           </a:p>
@@ -1406,7 +1406,7 @@
           <a:p>
             <a:fld id="{42C5692D-4EAB-6146-AB82-22160C9836E7}" type="datetimeFigureOut">
               <a:rPr lang="en-US" smtClean="0"/>
-              <a:t>7/30/25</a:t>
+              <a:t>8/1/25</a:t>
             </a:fld>
             <a:endParaRPr lang="en-US"/>
           </a:p>
@@ -1818,7 +1818,7 @@
           <a:p>
             <a:fld id="{42C5692D-4EAB-6146-AB82-22160C9836E7}" type="datetimeFigureOut">
               <a:rPr lang="en-US" smtClean="0"/>
-              <a:t>7/30/25</a:t>
+              <a:t>8/1/25</a:t>
             </a:fld>
             <a:endParaRPr lang="en-US"/>
           </a:p>
@@ -1959,7 +1959,7 @@
           <a:p>
             <a:fld id="{42C5692D-4EAB-6146-AB82-22160C9836E7}" type="datetimeFigureOut">
               <a:rPr lang="en-US" smtClean="0"/>
-              <a:t>7/30/25</a:t>
+              <a:t>8/1/25</a:t>
             </a:fld>
             <a:endParaRPr lang="en-US"/>
           </a:p>
@@ -2072,7 +2072,7 @@
           <a:p>
             <a:fld id="{42C5692D-4EAB-6146-AB82-22160C9836E7}" type="datetimeFigureOut">
               <a:rPr lang="en-US" smtClean="0"/>
-              <a:t>7/30/25</a:t>
+              <a:t>8/1/25</a:t>
             </a:fld>
             <a:endParaRPr lang="en-US"/>
           </a:p>
@@ -2383,7 +2383,7 @@
           <a:p>
             <a:fld id="{42C5692D-4EAB-6146-AB82-22160C9836E7}" type="datetimeFigureOut">
               <a:rPr lang="en-US" smtClean="0"/>
-              <a:t>7/30/25</a:t>
+              <a:t>8/1/25</a:t>
             </a:fld>
             <a:endParaRPr lang="en-US"/>
           </a:p>
@@ -2671,7 +2671,7 @@
           <a:p>
             <a:fld id="{42C5692D-4EAB-6146-AB82-22160C9836E7}" type="datetimeFigureOut">
               <a:rPr lang="en-US" smtClean="0"/>
-              <a:t>7/30/25</a:t>
+              <a:t>8/1/25</a:t>
             </a:fld>
             <a:endParaRPr lang="en-US"/>
           </a:p>
@@ -2912,7 +2912,7 @@
           <a:p>
             <a:fld id="{42C5692D-4EAB-6146-AB82-22160C9836E7}" type="datetimeFigureOut">
               <a:rPr lang="en-US" smtClean="0"/>
-              <a:t>7/30/25</a:t>
+              <a:t>8/1/25</a:t>
             </a:fld>
             <a:endParaRPr lang="en-US"/>
           </a:p>
@@ -3694,8 +3694,8 @@
         </p:nvSpPr>
         <p:spPr>
           <a:xfrm>
-            <a:off x="3975568" y="980543"/>
-            <a:ext cx="465191" cy="400110"/>
+            <a:off x="3840116" y="980543"/>
+            <a:ext cx="736099" cy="400110"/>
           </a:xfrm>
           <a:prstGeom prst="rect">
             <a:avLst/>
@@ -3711,7 +3711,7 @@
             <a:pPr algn="ctr"/>
             <a:r>
               <a:rPr lang="en-US" sz="1000" dirty="0"/>
-              <a:t>Elect</a:t>
+              <a:t>Electricity</a:t>
             </a:r>
           </a:p>
           <a:p>
@@ -4326,9 +4326,9 @@
           <p:nvPr/>
         </p:nvSpPr>
         <p:spPr>
-          <a:xfrm rot="1992780">
-            <a:off x="2511862" y="2379872"/>
-            <a:ext cx="465191" cy="400110"/>
+          <a:xfrm rot="1916693">
+            <a:off x="2376410" y="2357838"/>
+            <a:ext cx="736099" cy="400110"/>
           </a:xfrm>
           <a:prstGeom prst="rect">
             <a:avLst/>
@@ -4344,7 +4344,7 @@
             <a:pPr algn="ctr"/>
             <a:r>
               <a:rPr lang="en-US" sz="1000" dirty="0"/>
-              <a:t>Elect</a:t>
+              <a:t>Electricity</a:t>
             </a:r>
           </a:p>
           <a:p>
@@ -5139,7 +5139,7 @@
                   <a:schemeClr val="tx1"/>
                 </a:solidFill>
               </a:rPr>
-              <a:t>Elect</a:t>
+              <a:t>Electricity</a:t>
             </a:r>
           </a:p>
           <a:p>

</xml_diff>

<commit_message>
Added a graphical example MCC
</commit_message>
<xml_diff>
--- a/images/BXCC_figs.pptx
+++ b/images/BXCC_figs.pptx
@@ -9,6 +9,7 @@
     <p:sldId id="257" r:id="rId3"/>
     <p:sldId id="258" r:id="rId4"/>
     <p:sldId id="259" r:id="rId5"/>
+    <p:sldId id="261" r:id="rId6"/>
   </p:sldIdLst>
   <p:sldSz cx="12192000" cy="6858000"/>
   <p:notesSz cx="6858000" cy="9144000"/>
@@ -262,7 +263,7 @@
           <a:p>
             <a:fld id="{42C5692D-4EAB-6146-AB82-22160C9836E7}" type="datetimeFigureOut">
               <a:rPr lang="en-US" smtClean="0"/>
-              <a:t>8/1/25</a:t>
+              <a:t>8/5/25</a:t>
             </a:fld>
             <a:endParaRPr lang="en-US"/>
           </a:p>
@@ -460,7 +461,7 @@
           <a:p>
             <a:fld id="{42C5692D-4EAB-6146-AB82-22160C9836E7}" type="datetimeFigureOut">
               <a:rPr lang="en-US" smtClean="0"/>
-              <a:t>8/1/25</a:t>
+              <a:t>8/5/25</a:t>
             </a:fld>
             <a:endParaRPr lang="en-US"/>
           </a:p>
@@ -668,7 +669,7 @@
           <a:p>
             <a:fld id="{42C5692D-4EAB-6146-AB82-22160C9836E7}" type="datetimeFigureOut">
               <a:rPr lang="en-US" smtClean="0"/>
-              <a:t>8/1/25</a:t>
+              <a:t>8/5/25</a:t>
             </a:fld>
             <a:endParaRPr lang="en-US"/>
           </a:p>
@@ -866,7 +867,7 @@
           <a:p>
             <a:fld id="{42C5692D-4EAB-6146-AB82-22160C9836E7}" type="datetimeFigureOut">
               <a:rPr lang="en-US" smtClean="0"/>
-              <a:t>8/1/25</a:t>
+              <a:t>8/5/25</a:t>
             </a:fld>
             <a:endParaRPr lang="en-US"/>
           </a:p>
@@ -1141,7 +1142,7 @@
           <a:p>
             <a:fld id="{42C5692D-4EAB-6146-AB82-22160C9836E7}" type="datetimeFigureOut">
               <a:rPr lang="en-US" smtClean="0"/>
-              <a:t>8/1/25</a:t>
+              <a:t>8/5/25</a:t>
             </a:fld>
             <a:endParaRPr lang="en-US"/>
           </a:p>
@@ -1406,7 +1407,7 @@
           <a:p>
             <a:fld id="{42C5692D-4EAB-6146-AB82-22160C9836E7}" type="datetimeFigureOut">
               <a:rPr lang="en-US" smtClean="0"/>
-              <a:t>8/1/25</a:t>
+              <a:t>8/5/25</a:t>
             </a:fld>
             <a:endParaRPr lang="en-US"/>
           </a:p>
@@ -1818,7 +1819,7 @@
           <a:p>
             <a:fld id="{42C5692D-4EAB-6146-AB82-22160C9836E7}" type="datetimeFigureOut">
               <a:rPr lang="en-US" smtClean="0"/>
-              <a:t>8/1/25</a:t>
+              <a:t>8/5/25</a:t>
             </a:fld>
             <a:endParaRPr lang="en-US"/>
           </a:p>
@@ -1959,7 +1960,7 @@
           <a:p>
             <a:fld id="{42C5692D-4EAB-6146-AB82-22160C9836E7}" type="datetimeFigureOut">
               <a:rPr lang="en-US" smtClean="0"/>
-              <a:t>8/1/25</a:t>
+              <a:t>8/5/25</a:t>
             </a:fld>
             <a:endParaRPr lang="en-US"/>
           </a:p>
@@ -2072,7 +2073,7 @@
           <a:p>
             <a:fld id="{42C5692D-4EAB-6146-AB82-22160C9836E7}" type="datetimeFigureOut">
               <a:rPr lang="en-US" smtClean="0"/>
-              <a:t>8/1/25</a:t>
+              <a:t>8/5/25</a:t>
             </a:fld>
             <a:endParaRPr lang="en-US"/>
           </a:p>
@@ -2383,7 +2384,7 @@
           <a:p>
             <a:fld id="{42C5692D-4EAB-6146-AB82-22160C9836E7}" type="datetimeFigureOut">
               <a:rPr lang="en-US" smtClean="0"/>
-              <a:t>8/1/25</a:t>
+              <a:t>8/5/25</a:t>
             </a:fld>
             <a:endParaRPr lang="en-US"/>
           </a:p>
@@ -2671,7 +2672,7 @@
           <a:p>
             <a:fld id="{42C5692D-4EAB-6146-AB82-22160C9836E7}" type="datetimeFigureOut">
               <a:rPr lang="en-US" smtClean="0"/>
-              <a:t>8/1/25</a:t>
+              <a:t>8/5/25</a:t>
             </a:fld>
             <a:endParaRPr lang="en-US"/>
           </a:p>
@@ -2912,7 +2913,7 @@
           <a:p>
             <a:fld id="{42C5692D-4EAB-6146-AB82-22160C9836E7}" type="datetimeFigureOut">
               <a:rPr lang="en-US" smtClean="0"/>
-              <a:t>8/1/25</a:t>
+              <a:t>8/5/25</a:t>
             </a:fld>
             <a:endParaRPr lang="en-US"/>
           </a:p>
@@ -10826,6 +10827,3139 @@
 </p:sld>
 </file>
 
+<file path=ppt/slides/slide5.xml><?xml version="1.0" encoding="utf-8"?>
+<p:sld xmlns:a="http://schemas.openxmlformats.org/drawingml/2006/main" xmlns:r="http://schemas.openxmlformats.org/officeDocument/2006/relationships" xmlns:p="http://schemas.openxmlformats.org/presentationml/2006/main">
+  <p:cSld>
+    <p:spTree>
+      <p:nvGrpSpPr>
+        <p:cNvPr id="1" name="">
+          <a:extLst>
+            <a:ext uri="{FF2B5EF4-FFF2-40B4-BE49-F238E27FC236}">
+              <a16:creationId xmlns:a16="http://schemas.microsoft.com/office/drawing/2014/main" id="{9211A33A-BBE4-A4F4-7CBB-86E3508792BF}"/>
+            </a:ext>
+          </a:extLst>
+        </p:cNvPr>
+        <p:cNvGrpSpPr/>
+        <p:nvPr/>
+      </p:nvGrpSpPr>
+      <p:grpSpPr>
+        <a:xfrm>
+          <a:off x="0" y="0"/>
+          <a:ext cx="0" cy="0"/>
+          <a:chOff x="0" y="0"/>
+          <a:chExt cx="0" cy="0"/>
+        </a:xfrm>
+      </p:grpSpPr>
+      <p:cxnSp>
+        <p:nvCxnSpPr>
+          <p:cNvPr id="171" name="Straight Arrow Connector 170">
+            <a:extLst>
+              <a:ext uri="{FF2B5EF4-FFF2-40B4-BE49-F238E27FC236}">
+                <a16:creationId xmlns:a16="http://schemas.microsoft.com/office/drawing/2014/main" id="{C2E899D0-7A79-C93C-18B0-342AD656594B}"/>
+              </a:ext>
+            </a:extLst>
+          </p:cNvPr>
+          <p:cNvCxnSpPr>
+            <a:cxnSpLocks/>
+            <a:stCxn id="157" idx="3"/>
+            <a:endCxn id="24" idx="0"/>
+          </p:cNvCxnSpPr>
+          <p:nvPr/>
+        </p:nvCxnSpPr>
+        <p:spPr>
+          <a:xfrm>
+            <a:off x="1788523" y="864866"/>
+            <a:ext cx="1901448" cy="1456688"/>
+          </a:xfrm>
+          <a:prstGeom prst="straightConnector1">
+            <a:avLst/>
+          </a:prstGeom>
+          <a:ln>
+            <a:solidFill>
+              <a:srgbClr val="EDE995"/>
+            </a:solidFill>
+            <a:tailEnd type="triangle"/>
+          </a:ln>
+        </p:spPr>
+        <p:style>
+          <a:lnRef idx="2">
+            <a:schemeClr val="accent1"/>
+          </a:lnRef>
+          <a:fillRef idx="0">
+            <a:schemeClr val="accent1"/>
+          </a:fillRef>
+          <a:effectRef idx="1">
+            <a:schemeClr val="accent1"/>
+          </a:effectRef>
+          <a:fontRef idx="minor">
+            <a:schemeClr val="tx1"/>
+          </a:fontRef>
+        </p:style>
+      </p:cxnSp>
+      <p:cxnSp>
+        <p:nvCxnSpPr>
+          <p:cNvPr id="179" name="Straight Arrow Connector 178">
+            <a:extLst>
+              <a:ext uri="{FF2B5EF4-FFF2-40B4-BE49-F238E27FC236}">
+                <a16:creationId xmlns:a16="http://schemas.microsoft.com/office/drawing/2014/main" id="{25E9D6B1-06E5-D909-9D5A-66029BAF7F26}"/>
+              </a:ext>
+            </a:extLst>
+          </p:cNvPr>
+          <p:cNvCxnSpPr>
+            <a:cxnSpLocks/>
+            <a:stCxn id="32" idx="3"/>
+            <a:endCxn id="30" idx="2"/>
+          </p:cNvCxnSpPr>
+          <p:nvPr/>
+        </p:nvCxnSpPr>
+        <p:spPr>
+          <a:xfrm flipV="1">
+            <a:off x="1788523" y="2863405"/>
+            <a:ext cx="4427310" cy="2488814"/>
+          </a:xfrm>
+          <a:prstGeom prst="straightConnector1">
+            <a:avLst/>
+          </a:prstGeom>
+          <a:ln>
+            <a:solidFill>
+              <a:srgbClr val="EDE995"/>
+            </a:solidFill>
+            <a:tailEnd type="triangle"/>
+          </a:ln>
+        </p:spPr>
+        <p:style>
+          <a:lnRef idx="2">
+            <a:schemeClr val="accent1"/>
+          </a:lnRef>
+          <a:fillRef idx="0">
+            <a:schemeClr val="accent1"/>
+          </a:fillRef>
+          <a:effectRef idx="1">
+            <a:schemeClr val="accent1"/>
+          </a:effectRef>
+          <a:fontRef idx="minor">
+            <a:schemeClr val="tx1"/>
+          </a:fontRef>
+        </p:style>
+      </p:cxnSp>
+      <p:cxnSp>
+        <p:nvCxnSpPr>
+          <p:cNvPr id="39" name="Straight Arrow Connector 38">
+            <a:extLst>
+              <a:ext uri="{FF2B5EF4-FFF2-40B4-BE49-F238E27FC236}">
+                <a16:creationId xmlns:a16="http://schemas.microsoft.com/office/drawing/2014/main" id="{167E0965-D179-364E-3DC3-43ABC96ABE88}"/>
+              </a:ext>
+            </a:extLst>
+          </p:cNvPr>
+          <p:cNvCxnSpPr>
+            <a:cxnSpLocks/>
+            <a:stCxn id="20" idx="3"/>
+          </p:cNvCxnSpPr>
+          <p:nvPr/>
+        </p:nvCxnSpPr>
+        <p:spPr>
+          <a:xfrm>
+            <a:off x="1788523" y="1864957"/>
+            <a:ext cx="539976" cy="5798"/>
+          </a:xfrm>
+          <a:prstGeom prst="straightConnector1">
+            <a:avLst/>
+          </a:prstGeom>
+          <a:ln>
+            <a:solidFill>
+              <a:srgbClr val="FFC003"/>
+            </a:solidFill>
+            <a:tailEnd type="triangle"/>
+          </a:ln>
+        </p:spPr>
+        <p:style>
+          <a:lnRef idx="2">
+            <a:schemeClr val="accent1"/>
+          </a:lnRef>
+          <a:fillRef idx="0">
+            <a:schemeClr val="accent1"/>
+          </a:fillRef>
+          <a:effectRef idx="1">
+            <a:schemeClr val="accent1"/>
+          </a:effectRef>
+          <a:fontRef idx="minor">
+            <a:schemeClr val="tx1"/>
+          </a:fontRef>
+        </p:style>
+      </p:cxnSp>
+      <p:cxnSp>
+        <p:nvCxnSpPr>
+          <p:cNvPr id="50" name="Straight Arrow Connector 49">
+            <a:extLst>
+              <a:ext uri="{FF2B5EF4-FFF2-40B4-BE49-F238E27FC236}">
+                <a16:creationId xmlns:a16="http://schemas.microsoft.com/office/drawing/2014/main" id="{43E66A07-1885-AB06-5FAF-62D153BFA0BC}"/>
+              </a:ext>
+            </a:extLst>
+          </p:cNvPr>
+          <p:cNvCxnSpPr>
+            <a:cxnSpLocks/>
+          </p:cNvCxnSpPr>
+          <p:nvPr/>
+        </p:nvCxnSpPr>
+        <p:spPr>
+          <a:xfrm>
+            <a:off x="1399555" y="2592479"/>
+            <a:ext cx="388968" cy="0"/>
+          </a:xfrm>
+          <a:prstGeom prst="straightConnector1">
+            <a:avLst/>
+          </a:prstGeom>
+          <a:ln>
+            <a:solidFill>
+              <a:srgbClr val="EDE995"/>
+            </a:solidFill>
+            <a:tailEnd type="triangle"/>
+          </a:ln>
+        </p:spPr>
+        <p:style>
+          <a:lnRef idx="2">
+            <a:schemeClr val="accent1"/>
+          </a:lnRef>
+          <a:fillRef idx="0">
+            <a:schemeClr val="accent1"/>
+          </a:fillRef>
+          <a:effectRef idx="1">
+            <a:schemeClr val="accent1"/>
+          </a:effectRef>
+          <a:fontRef idx="minor">
+            <a:schemeClr val="tx1"/>
+          </a:fontRef>
+        </p:style>
+      </p:cxnSp>
+      <p:cxnSp>
+        <p:nvCxnSpPr>
+          <p:cNvPr id="53" name="Straight Arrow Connector 52">
+            <a:extLst>
+              <a:ext uri="{FF2B5EF4-FFF2-40B4-BE49-F238E27FC236}">
+                <a16:creationId xmlns:a16="http://schemas.microsoft.com/office/drawing/2014/main" id="{9F284576-81A0-80E1-536D-21A34B91CADD}"/>
+              </a:ext>
+            </a:extLst>
+          </p:cNvPr>
+          <p:cNvCxnSpPr>
+            <a:cxnSpLocks/>
+          </p:cNvCxnSpPr>
+          <p:nvPr/>
+        </p:nvCxnSpPr>
+        <p:spPr>
+          <a:xfrm>
+            <a:off x="2947086" y="1864956"/>
+            <a:ext cx="397733" cy="0"/>
+          </a:xfrm>
+          <a:prstGeom prst="straightConnector1">
+            <a:avLst/>
+          </a:prstGeom>
+          <a:ln>
+            <a:solidFill>
+              <a:srgbClr val="FFC003"/>
+            </a:solidFill>
+            <a:tailEnd type="triangle"/>
+          </a:ln>
+        </p:spPr>
+        <p:style>
+          <a:lnRef idx="2">
+            <a:schemeClr val="accent1"/>
+          </a:lnRef>
+          <a:fillRef idx="0">
+            <a:schemeClr val="accent1"/>
+          </a:fillRef>
+          <a:effectRef idx="1">
+            <a:schemeClr val="accent1"/>
+          </a:effectRef>
+          <a:fontRef idx="minor">
+            <a:schemeClr val="tx1"/>
+          </a:fontRef>
+        </p:style>
+      </p:cxnSp>
+      <p:cxnSp>
+        <p:nvCxnSpPr>
+          <p:cNvPr id="56" name="Straight Arrow Connector 55">
+            <a:extLst>
+              <a:ext uri="{FF2B5EF4-FFF2-40B4-BE49-F238E27FC236}">
+                <a16:creationId xmlns:a16="http://schemas.microsoft.com/office/drawing/2014/main" id="{0F4F0047-E07C-14C5-49EE-1BF6D49D98C9}"/>
+              </a:ext>
+            </a:extLst>
+          </p:cNvPr>
+          <p:cNvCxnSpPr>
+            <a:cxnSpLocks/>
+          </p:cNvCxnSpPr>
+          <p:nvPr/>
+        </p:nvCxnSpPr>
+        <p:spPr>
+          <a:xfrm>
+            <a:off x="4035123" y="1859158"/>
+            <a:ext cx="314926" cy="11597"/>
+          </a:xfrm>
+          <a:prstGeom prst="straightConnector1">
+            <a:avLst/>
+          </a:prstGeom>
+          <a:ln>
+            <a:solidFill>
+              <a:srgbClr val="FFC003"/>
+            </a:solidFill>
+            <a:tailEnd type="triangle"/>
+          </a:ln>
+        </p:spPr>
+        <p:style>
+          <a:lnRef idx="2">
+            <a:schemeClr val="accent1"/>
+          </a:lnRef>
+          <a:fillRef idx="0">
+            <a:schemeClr val="accent1"/>
+          </a:fillRef>
+          <a:effectRef idx="1">
+            <a:schemeClr val="accent1"/>
+          </a:effectRef>
+          <a:fontRef idx="minor">
+            <a:schemeClr val="tx1"/>
+          </a:fontRef>
+        </p:style>
+      </p:cxnSp>
+      <p:cxnSp>
+        <p:nvCxnSpPr>
+          <p:cNvPr id="64" name="Straight Arrow Connector 63">
+            <a:extLst>
+              <a:ext uri="{FF2B5EF4-FFF2-40B4-BE49-F238E27FC236}">
+                <a16:creationId xmlns:a16="http://schemas.microsoft.com/office/drawing/2014/main" id="{B7FCADE2-F024-5068-9B65-D99B2DE40529}"/>
+              </a:ext>
+            </a:extLst>
+          </p:cNvPr>
+          <p:cNvCxnSpPr>
+            <a:cxnSpLocks/>
+          </p:cNvCxnSpPr>
+          <p:nvPr/>
+        </p:nvCxnSpPr>
+        <p:spPr>
+          <a:xfrm>
+            <a:off x="2980432" y="2592479"/>
+            <a:ext cx="260835" cy="0"/>
+          </a:xfrm>
+          <a:prstGeom prst="straightConnector1">
+            <a:avLst/>
+          </a:prstGeom>
+          <a:ln>
+            <a:solidFill>
+              <a:srgbClr val="EDE995"/>
+            </a:solidFill>
+            <a:tailEnd type="triangle"/>
+          </a:ln>
+        </p:spPr>
+        <p:style>
+          <a:lnRef idx="2">
+            <a:schemeClr val="accent1"/>
+          </a:lnRef>
+          <a:fillRef idx="0">
+            <a:schemeClr val="accent1"/>
+          </a:fillRef>
+          <a:effectRef idx="1">
+            <a:schemeClr val="accent1"/>
+          </a:effectRef>
+          <a:fontRef idx="minor">
+            <a:schemeClr val="tx1"/>
+          </a:fontRef>
+        </p:style>
+      </p:cxnSp>
+      <p:cxnSp>
+        <p:nvCxnSpPr>
+          <p:cNvPr id="68" name="Straight Arrow Connector 67">
+            <a:extLst>
+              <a:ext uri="{FF2B5EF4-FFF2-40B4-BE49-F238E27FC236}">
+                <a16:creationId xmlns:a16="http://schemas.microsoft.com/office/drawing/2014/main" id="{4BCFF186-4E6E-00B3-4D5B-21FB4E092F50}"/>
+              </a:ext>
+            </a:extLst>
+          </p:cNvPr>
+          <p:cNvCxnSpPr>
+            <a:cxnSpLocks/>
+          </p:cNvCxnSpPr>
+          <p:nvPr/>
+        </p:nvCxnSpPr>
+        <p:spPr>
+          <a:xfrm>
+            <a:off x="4138675" y="2592479"/>
+            <a:ext cx="211374" cy="0"/>
+          </a:xfrm>
+          <a:prstGeom prst="straightConnector1">
+            <a:avLst/>
+          </a:prstGeom>
+          <a:ln>
+            <a:solidFill>
+              <a:srgbClr val="EDE995"/>
+            </a:solidFill>
+            <a:tailEnd type="triangle"/>
+          </a:ln>
+        </p:spPr>
+        <p:style>
+          <a:lnRef idx="2">
+            <a:schemeClr val="accent1"/>
+          </a:lnRef>
+          <a:fillRef idx="0">
+            <a:schemeClr val="accent1"/>
+          </a:fillRef>
+          <a:effectRef idx="1">
+            <a:schemeClr val="accent1"/>
+          </a:effectRef>
+          <a:fontRef idx="minor">
+            <a:schemeClr val="tx1"/>
+          </a:fontRef>
+        </p:style>
+      </p:cxnSp>
+      <p:cxnSp>
+        <p:nvCxnSpPr>
+          <p:cNvPr id="74" name="Straight Arrow Connector 73">
+            <a:extLst>
+              <a:ext uri="{FF2B5EF4-FFF2-40B4-BE49-F238E27FC236}">
+                <a16:creationId xmlns:a16="http://schemas.microsoft.com/office/drawing/2014/main" id="{4D33D5E8-2729-5D61-5B16-E6BAEFF5CF55}"/>
+              </a:ext>
+            </a:extLst>
+          </p:cNvPr>
+          <p:cNvCxnSpPr>
+            <a:cxnSpLocks/>
+          </p:cNvCxnSpPr>
+          <p:nvPr/>
+        </p:nvCxnSpPr>
+        <p:spPr>
+          <a:xfrm>
+            <a:off x="5404233" y="2592479"/>
+            <a:ext cx="284508" cy="0"/>
+          </a:xfrm>
+          <a:prstGeom prst="straightConnector1">
+            <a:avLst/>
+          </a:prstGeom>
+          <a:ln>
+            <a:solidFill>
+              <a:srgbClr val="EDE995"/>
+            </a:solidFill>
+            <a:tailEnd type="triangle"/>
+          </a:ln>
+        </p:spPr>
+        <p:style>
+          <a:lnRef idx="2">
+            <a:schemeClr val="accent1"/>
+          </a:lnRef>
+          <a:fillRef idx="0">
+            <a:schemeClr val="accent1"/>
+          </a:fillRef>
+          <a:effectRef idx="1">
+            <a:schemeClr val="accent1"/>
+          </a:effectRef>
+          <a:fontRef idx="minor">
+            <a:schemeClr val="tx1"/>
+          </a:fontRef>
+        </p:style>
+      </p:cxnSp>
+      <p:cxnSp>
+        <p:nvCxnSpPr>
+          <p:cNvPr id="77" name="Straight Arrow Connector 76">
+            <a:extLst>
+              <a:ext uri="{FF2B5EF4-FFF2-40B4-BE49-F238E27FC236}">
+                <a16:creationId xmlns:a16="http://schemas.microsoft.com/office/drawing/2014/main" id="{CC5FE0FD-EC86-A0EC-E2E6-4B60E37A1BD1}"/>
+              </a:ext>
+            </a:extLst>
+          </p:cNvPr>
+          <p:cNvCxnSpPr>
+            <a:cxnSpLocks/>
+          </p:cNvCxnSpPr>
+          <p:nvPr/>
+        </p:nvCxnSpPr>
+        <p:spPr>
+          <a:xfrm>
+            <a:off x="6742925" y="2592479"/>
+            <a:ext cx="910541" cy="0"/>
+          </a:xfrm>
+          <a:prstGeom prst="straightConnector1">
+            <a:avLst/>
+          </a:prstGeom>
+          <a:ln>
+            <a:solidFill>
+              <a:srgbClr val="EDE995"/>
+            </a:solidFill>
+            <a:tailEnd type="triangle"/>
+          </a:ln>
+        </p:spPr>
+        <p:style>
+          <a:lnRef idx="2">
+            <a:schemeClr val="accent1"/>
+          </a:lnRef>
+          <a:fillRef idx="0">
+            <a:schemeClr val="accent1"/>
+          </a:fillRef>
+          <a:effectRef idx="1">
+            <a:schemeClr val="accent1"/>
+          </a:effectRef>
+          <a:fontRef idx="minor">
+            <a:schemeClr val="tx1"/>
+          </a:fontRef>
+        </p:style>
+      </p:cxnSp>
+      <p:cxnSp>
+        <p:nvCxnSpPr>
+          <p:cNvPr id="80" name="Straight Arrow Connector 79">
+            <a:extLst>
+              <a:ext uri="{FF2B5EF4-FFF2-40B4-BE49-F238E27FC236}">
+                <a16:creationId xmlns:a16="http://schemas.microsoft.com/office/drawing/2014/main" id="{9826EFAE-B3B5-27EF-AC07-24D40BE1DD24}"/>
+              </a:ext>
+            </a:extLst>
+          </p:cNvPr>
+          <p:cNvCxnSpPr>
+            <a:cxnSpLocks/>
+            <a:stCxn id="27" idx="3"/>
+            <a:endCxn id="35" idx="0"/>
+          </p:cNvCxnSpPr>
+          <p:nvPr/>
+        </p:nvCxnSpPr>
+        <p:spPr>
+          <a:xfrm>
+            <a:off x="5404233" y="1864957"/>
+            <a:ext cx="2543479" cy="456597"/>
+          </a:xfrm>
+          <a:prstGeom prst="straightConnector1">
+            <a:avLst/>
+          </a:prstGeom>
+          <a:ln>
+            <a:solidFill>
+              <a:srgbClr val="FFC003"/>
+            </a:solidFill>
+            <a:tailEnd type="triangle"/>
+          </a:ln>
+        </p:spPr>
+        <p:style>
+          <a:lnRef idx="2">
+            <a:schemeClr val="accent1"/>
+          </a:lnRef>
+          <a:fillRef idx="0">
+            <a:schemeClr val="accent1"/>
+          </a:fillRef>
+          <a:effectRef idx="1">
+            <a:schemeClr val="accent1"/>
+          </a:effectRef>
+          <a:fontRef idx="minor">
+            <a:schemeClr val="tx1"/>
+          </a:fontRef>
+        </p:style>
+      </p:cxnSp>
+      <p:cxnSp>
+        <p:nvCxnSpPr>
+          <p:cNvPr id="83" name="Straight Arrow Connector 82">
+            <a:extLst>
+              <a:ext uri="{FF2B5EF4-FFF2-40B4-BE49-F238E27FC236}">
+                <a16:creationId xmlns:a16="http://schemas.microsoft.com/office/drawing/2014/main" id="{EAFDE953-C292-7A3E-0641-11AAF1AE0742}"/>
+              </a:ext>
+            </a:extLst>
+          </p:cNvPr>
+          <p:cNvCxnSpPr>
+            <a:cxnSpLocks/>
+          </p:cNvCxnSpPr>
+          <p:nvPr/>
+        </p:nvCxnSpPr>
+        <p:spPr>
+          <a:xfrm>
+            <a:off x="1388638" y="3304533"/>
+            <a:ext cx="399885" cy="0"/>
+          </a:xfrm>
+          <a:prstGeom prst="straightConnector1">
+            <a:avLst/>
+          </a:prstGeom>
+          <a:ln>
+            <a:solidFill>
+              <a:schemeClr val="tx1"/>
+            </a:solidFill>
+            <a:tailEnd type="triangle"/>
+          </a:ln>
+        </p:spPr>
+        <p:style>
+          <a:lnRef idx="2">
+            <a:schemeClr val="accent1"/>
+          </a:lnRef>
+          <a:fillRef idx="0">
+            <a:schemeClr val="accent1"/>
+          </a:fillRef>
+          <a:effectRef idx="1">
+            <a:schemeClr val="accent1"/>
+          </a:effectRef>
+          <a:fontRef idx="minor">
+            <a:schemeClr val="tx1"/>
+          </a:fontRef>
+        </p:style>
+      </p:cxnSp>
+      <p:cxnSp>
+        <p:nvCxnSpPr>
+          <p:cNvPr id="89" name="Straight Arrow Connector 88">
+            <a:extLst>
+              <a:ext uri="{FF2B5EF4-FFF2-40B4-BE49-F238E27FC236}">
+                <a16:creationId xmlns:a16="http://schemas.microsoft.com/office/drawing/2014/main" id="{B8919BBF-E713-D960-29F2-1E02EF4AA5D4}"/>
+              </a:ext>
+            </a:extLst>
+          </p:cNvPr>
+          <p:cNvCxnSpPr>
+            <a:cxnSpLocks/>
+            <a:stCxn id="19" idx="3"/>
+            <a:endCxn id="26" idx="1"/>
+          </p:cNvCxnSpPr>
+          <p:nvPr/>
+        </p:nvCxnSpPr>
+        <p:spPr>
+          <a:xfrm>
+            <a:off x="2994230" y="3304534"/>
+            <a:ext cx="340332" cy="0"/>
+          </a:xfrm>
+          <a:prstGeom prst="straightConnector1">
+            <a:avLst/>
+          </a:prstGeom>
+          <a:ln>
+            <a:solidFill>
+              <a:schemeClr val="tx1"/>
+            </a:solidFill>
+            <a:tailEnd type="triangle"/>
+          </a:ln>
+        </p:spPr>
+        <p:style>
+          <a:lnRef idx="2">
+            <a:schemeClr val="accent1"/>
+          </a:lnRef>
+          <a:fillRef idx="0">
+            <a:schemeClr val="accent1"/>
+          </a:fillRef>
+          <a:effectRef idx="1">
+            <a:schemeClr val="accent1"/>
+          </a:effectRef>
+          <a:fontRef idx="minor">
+            <a:schemeClr val="tx1"/>
+          </a:fontRef>
+        </p:style>
+      </p:cxnSp>
+      <p:cxnSp>
+        <p:nvCxnSpPr>
+          <p:cNvPr id="92" name="Straight Arrow Connector 91">
+            <a:extLst>
+              <a:ext uri="{FF2B5EF4-FFF2-40B4-BE49-F238E27FC236}">
+                <a16:creationId xmlns:a16="http://schemas.microsoft.com/office/drawing/2014/main" id="{03086826-7416-B00F-D571-585D105DB310}"/>
+              </a:ext>
+            </a:extLst>
+          </p:cNvPr>
+          <p:cNvCxnSpPr>
+            <a:cxnSpLocks/>
+          </p:cNvCxnSpPr>
+          <p:nvPr/>
+        </p:nvCxnSpPr>
+        <p:spPr>
+          <a:xfrm>
+            <a:off x="4045381" y="3304533"/>
+            <a:ext cx="304668" cy="0"/>
+          </a:xfrm>
+          <a:prstGeom prst="straightConnector1">
+            <a:avLst/>
+          </a:prstGeom>
+          <a:ln>
+            <a:solidFill>
+              <a:schemeClr val="tx1"/>
+            </a:solidFill>
+            <a:tailEnd type="triangle"/>
+          </a:ln>
+        </p:spPr>
+        <p:style>
+          <a:lnRef idx="2">
+            <a:schemeClr val="accent1"/>
+          </a:lnRef>
+          <a:fillRef idx="0">
+            <a:schemeClr val="accent1"/>
+          </a:fillRef>
+          <a:effectRef idx="1">
+            <a:schemeClr val="accent1"/>
+          </a:effectRef>
+          <a:fontRef idx="minor">
+            <a:schemeClr val="tx1"/>
+          </a:fontRef>
+        </p:style>
+      </p:cxnSp>
+      <p:cxnSp>
+        <p:nvCxnSpPr>
+          <p:cNvPr id="95" name="Straight Arrow Connector 94">
+            <a:extLst>
+              <a:ext uri="{FF2B5EF4-FFF2-40B4-BE49-F238E27FC236}">
+                <a16:creationId xmlns:a16="http://schemas.microsoft.com/office/drawing/2014/main" id="{B12A6BFD-DA18-0E4A-2466-7B96FACB6E22}"/>
+              </a:ext>
+            </a:extLst>
+          </p:cNvPr>
+          <p:cNvCxnSpPr>
+            <a:cxnSpLocks/>
+          </p:cNvCxnSpPr>
+          <p:nvPr/>
+        </p:nvCxnSpPr>
+        <p:spPr>
+          <a:xfrm>
+            <a:off x="5404233" y="3304533"/>
+            <a:ext cx="284508" cy="0"/>
+          </a:xfrm>
+          <a:prstGeom prst="straightConnector1">
+            <a:avLst/>
+          </a:prstGeom>
+          <a:ln>
+            <a:solidFill>
+              <a:schemeClr val="tx1"/>
+            </a:solidFill>
+            <a:tailEnd type="triangle"/>
+          </a:ln>
+        </p:spPr>
+        <p:style>
+          <a:lnRef idx="2">
+            <a:schemeClr val="accent1"/>
+          </a:lnRef>
+          <a:fillRef idx="0">
+            <a:schemeClr val="accent1"/>
+          </a:fillRef>
+          <a:effectRef idx="1">
+            <a:schemeClr val="accent1"/>
+          </a:effectRef>
+          <a:fontRef idx="minor">
+            <a:schemeClr val="tx1"/>
+          </a:fontRef>
+        </p:style>
+      </p:cxnSp>
+      <p:cxnSp>
+        <p:nvCxnSpPr>
+          <p:cNvPr id="98" name="Straight Arrow Connector 97">
+            <a:extLst>
+              <a:ext uri="{FF2B5EF4-FFF2-40B4-BE49-F238E27FC236}">
+                <a16:creationId xmlns:a16="http://schemas.microsoft.com/office/drawing/2014/main" id="{11E4254D-FF68-BD9C-F734-63329ACC9E3F}"/>
+              </a:ext>
+            </a:extLst>
+          </p:cNvPr>
+          <p:cNvCxnSpPr>
+            <a:cxnSpLocks/>
+            <a:endCxn id="33" idx="1"/>
+          </p:cNvCxnSpPr>
+          <p:nvPr/>
+        </p:nvCxnSpPr>
+        <p:spPr>
+          <a:xfrm>
+            <a:off x="6742925" y="3304533"/>
+            <a:ext cx="974515" cy="1"/>
+          </a:xfrm>
+          <a:prstGeom prst="straightConnector1">
+            <a:avLst/>
+          </a:prstGeom>
+          <a:ln>
+            <a:solidFill>
+              <a:schemeClr val="tx1"/>
+            </a:solidFill>
+            <a:tailEnd type="triangle"/>
+          </a:ln>
+        </p:spPr>
+        <p:style>
+          <a:lnRef idx="2">
+            <a:schemeClr val="accent1"/>
+          </a:lnRef>
+          <a:fillRef idx="0">
+            <a:schemeClr val="accent1"/>
+          </a:fillRef>
+          <a:effectRef idx="1">
+            <a:schemeClr val="accent1"/>
+          </a:effectRef>
+          <a:fontRef idx="minor">
+            <a:schemeClr val="tx1"/>
+          </a:fontRef>
+        </p:style>
+      </p:cxnSp>
+      <p:cxnSp>
+        <p:nvCxnSpPr>
+          <p:cNvPr id="102" name="Straight Arrow Connector 101">
+            <a:extLst>
+              <a:ext uri="{FF2B5EF4-FFF2-40B4-BE49-F238E27FC236}">
+                <a16:creationId xmlns:a16="http://schemas.microsoft.com/office/drawing/2014/main" id="{9D2A5683-8D03-A417-B080-EAD96777F7E5}"/>
+              </a:ext>
+            </a:extLst>
+          </p:cNvPr>
+          <p:cNvCxnSpPr>
+            <a:cxnSpLocks/>
+            <a:stCxn id="33" idx="3"/>
+          </p:cNvCxnSpPr>
+          <p:nvPr/>
+        </p:nvCxnSpPr>
+        <p:spPr>
+          <a:xfrm flipV="1">
+            <a:off x="8771624" y="3304533"/>
+            <a:ext cx="395677" cy="1"/>
+          </a:xfrm>
+          <a:prstGeom prst="straightConnector1">
+            <a:avLst/>
+          </a:prstGeom>
+          <a:ln>
+            <a:solidFill>
+              <a:schemeClr val="tx1"/>
+            </a:solidFill>
+            <a:tailEnd type="triangle"/>
+          </a:ln>
+        </p:spPr>
+        <p:style>
+          <a:lnRef idx="2">
+            <a:schemeClr val="accent1"/>
+          </a:lnRef>
+          <a:fillRef idx="0">
+            <a:schemeClr val="accent1"/>
+          </a:fillRef>
+          <a:effectRef idx="1">
+            <a:schemeClr val="accent1"/>
+          </a:effectRef>
+          <a:fontRef idx="minor">
+            <a:schemeClr val="tx1"/>
+          </a:fontRef>
+        </p:style>
+      </p:cxnSp>
+      <p:cxnSp>
+        <p:nvCxnSpPr>
+          <p:cNvPr id="108" name="Straight Arrow Connector 107">
+            <a:extLst>
+              <a:ext uri="{FF2B5EF4-FFF2-40B4-BE49-F238E27FC236}">
+                <a16:creationId xmlns:a16="http://schemas.microsoft.com/office/drawing/2014/main" id="{0B8FEFCB-0071-FB73-B315-7B57C8C9D078}"/>
+              </a:ext>
+            </a:extLst>
+          </p:cNvPr>
+          <p:cNvCxnSpPr>
+            <a:cxnSpLocks/>
+            <a:stCxn id="31" idx="3"/>
+            <a:endCxn id="35" idx="2"/>
+          </p:cNvCxnSpPr>
+          <p:nvPr/>
+        </p:nvCxnSpPr>
+        <p:spPr>
+          <a:xfrm flipV="1">
+            <a:off x="6742925" y="2863405"/>
+            <a:ext cx="1204787" cy="441129"/>
+          </a:xfrm>
+          <a:prstGeom prst="straightConnector1">
+            <a:avLst/>
+          </a:prstGeom>
+          <a:ln>
+            <a:solidFill>
+              <a:schemeClr val="tx1"/>
+            </a:solidFill>
+            <a:tailEnd type="triangle"/>
+          </a:ln>
+        </p:spPr>
+        <p:style>
+          <a:lnRef idx="2">
+            <a:schemeClr val="accent1"/>
+          </a:lnRef>
+          <a:fillRef idx="0">
+            <a:schemeClr val="accent1"/>
+          </a:fillRef>
+          <a:effectRef idx="1">
+            <a:schemeClr val="accent1"/>
+          </a:effectRef>
+          <a:fontRef idx="minor">
+            <a:schemeClr val="tx1"/>
+          </a:fontRef>
+        </p:style>
+      </p:cxnSp>
+      <p:cxnSp>
+        <p:nvCxnSpPr>
+          <p:cNvPr id="116" name="Straight Arrow Connector 115">
+            <a:extLst>
+              <a:ext uri="{FF2B5EF4-FFF2-40B4-BE49-F238E27FC236}">
+                <a16:creationId xmlns:a16="http://schemas.microsoft.com/office/drawing/2014/main" id="{EAC35283-127C-A8D6-E9E0-DF236AAF301A}"/>
+              </a:ext>
+            </a:extLst>
+          </p:cNvPr>
+          <p:cNvCxnSpPr>
+            <a:cxnSpLocks/>
+            <a:stCxn id="34" idx="3"/>
+            <a:endCxn id="115" idx="2"/>
+          </p:cNvCxnSpPr>
+          <p:nvPr/>
+        </p:nvCxnSpPr>
+        <p:spPr>
+          <a:xfrm flipV="1">
+            <a:off x="10221485" y="2863405"/>
+            <a:ext cx="891106" cy="441129"/>
+          </a:xfrm>
+          <a:prstGeom prst="straightConnector1">
+            <a:avLst/>
+          </a:prstGeom>
+          <a:ln>
+            <a:solidFill>
+              <a:schemeClr val="tx1"/>
+            </a:solidFill>
+            <a:tailEnd type="triangle"/>
+          </a:ln>
+        </p:spPr>
+        <p:style>
+          <a:lnRef idx="2">
+            <a:schemeClr val="accent1"/>
+          </a:lnRef>
+          <a:fillRef idx="0">
+            <a:schemeClr val="accent1"/>
+          </a:fillRef>
+          <a:effectRef idx="1">
+            <a:schemeClr val="accent1"/>
+          </a:effectRef>
+          <a:fontRef idx="minor">
+            <a:schemeClr val="tx1"/>
+          </a:fontRef>
+        </p:style>
+      </p:cxnSp>
+      <p:cxnSp>
+        <p:nvCxnSpPr>
+          <p:cNvPr id="119" name="Straight Arrow Connector 118">
+            <a:extLst>
+              <a:ext uri="{FF2B5EF4-FFF2-40B4-BE49-F238E27FC236}">
+                <a16:creationId xmlns:a16="http://schemas.microsoft.com/office/drawing/2014/main" id="{E7EFF0B4-A69D-D150-B22E-AC34FF66285C}"/>
+              </a:ext>
+            </a:extLst>
+          </p:cNvPr>
+          <p:cNvCxnSpPr>
+            <a:cxnSpLocks/>
+          </p:cNvCxnSpPr>
+          <p:nvPr/>
+        </p:nvCxnSpPr>
+        <p:spPr>
+          <a:xfrm>
+            <a:off x="10221486" y="2592479"/>
+            <a:ext cx="525809" cy="0"/>
+          </a:xfrm>
+          <a:prstGeom prst="straightConnector1">
+            <a:avLst/>
+          </a:prstGeom>
+          <a:ln>
+            <a:solidFill>
+              <a:srgbClr val="C00000"/>
+            </a:solidFill>
+            <a:tailEnd type="triangle"/>
+          </a:ln>
+        </p:spPr>
+        <p:style>
+          <a:lnRef idx="2">
+            <a:schemeClr val="accent1"/>
+          </a:lnRef>
+          <a:fillRef idx="0">
+            <a:schemeClr val="accent1"/>
+          </a:fillRef>
+          <a:effectRef idx="1">
+            <a:schemeClr val="accent1"/>
+          </a:effectRef>
+          <a:fontRef idx="minor">
+            <a:schemeClr val="tx1"/>
+          </a:fontRef>
+        </p:style>
+      </p:cxnSp>
+      <p:cxnSp>
+        <p:nvCxnSpPr>
+          <p:cNvPr id="122" name="Straight Arrow Connector 121">
+            <a:extLst>
+              <a:ext uri="{FF2B5EF4-FFF2-40B4-BE49-F238E27FC236}">
+                <a16:creationId xmlns:a16="http://schemas.microsoft.com/office/drawing/2014/main" id="{31AE8CE7-140C-BE80-680B-00B317D8682E}"/>
+              </a:ext>
+            </a:extLst>
+          </p:cNvPr>
+          <p:cNvCxnSpPr>
+            <a:cxnSpLocks/>
+          </p:cNvCxnSpPr>
+          <p:nvPr/>
+        </p:nvCxnSpPr>
+        <p:spPr>
+          <a:xfrm>
+            <a:off x="8241958" y="2592479"/>
+            <a:ext cx="925344" cy="0"/>
+          </a:xfrm>
+          <a:prstGeom prst="straightConnector1">
+            <a:avLst/>
+          </a:prstGeom>
+          <a:ln>
+            <a:solidFill>
+              <a:srgbClr val="C00100"/>
+            </a:solidFill>
+            <a:tailEnd type="triangle"/>
+          </a:ln>
+        </p:spPr>
+        <p:style>
+          <a:lnRef idx="2">
+            <a:schemeClr val="accent1"/>
+          </a:lnRef>
+          <a:fillRef idx="0">
+            <a:schemeClr val="accent1"/>
+          </a:fillRef>
+          <a:effectRef idx="1">
+            <a:schemeClr val="accent1"/>
+          </a:effectRef>
+          <a:fontRef idx="minor">
+            <a:schemeClr val="tx1"/>
+          </a:fontRef>
+        </p:style>
+      </p:cxnSp>
+      <p:cxnSp>
+        <p:nvCxnSpPr>
+          <p:cNvPr id="151" name="Straight Arrow Connector 150">
+            <a:extLst>
+              <a:ext uri="{FF2B5EF4-FFF2-40B4-BE49-F238E27FC236}">
+                <a16:creationId xmlns:a16="http://schemas.microsoft.com/office/drawing/2014/main" id="{8BA2649B-8898-B285-C0D3-E0823CC9F215}"/>
+              </a:ext>
+            </a:extLst>
+          </p:cNvPr>
+          <p:cNvCxnSpPr>
+            <a:cxnSpLocks/>
+            <a:stCxn id="34" idx="0"/>
+            <a:endCxn id="36" idx="2"/>
+          </p:cNvCxnSpPr>
+          <p:nvPr/>
+        </p:nvCxnSpPr>
+        <p:spPr>
+          <a:xfrm flipV="1">
+            <a:off x="9694393" y="2863405"/>
+            <a:ext cx="1" cy="170203"/>
+          </a:xfrm>
+          <a:prstGeom prst="straightConnector1">
+            <a:avLst/>
+          </a:prstGeom>
+          <a:ln>
+            <a:solidFill>
+              <a:srgbClr val="C00000"/>
+            </a:solidFill>
+            <a:tailEnd type="triangle"/>
+          </a:ln>
+        </p:spPr>
+        <p:style>
+          <a:lnRef idx="2">
+            <a:schemeClr val="accent1"/>
+          </a:lnRef>
+          <a:fillRef idx="0">
+            <a:schemeClr val="accent1"/>
+          </a:fillRef>
+          <a:effectRef idx="1">
+            <a:schemeClr val="accent1"/>
+          </a:effectRef>
+          <a:fontRef idx="minor">
+            <a:schemeClr val="tx1"/>
+          </a:fontRef>
+        </p:style>
+      </p:cxnSp>
+      <p:cxnSp>
+        <p:nvCxnSpPr>
+          <p:cNvPr id="154" name="Straight Arrow Connector 153">
+            <a:extLst>
+              <a:ext uri="{FF2B5EF4-FFF2-40B4-BE49-F238E27FC236}">
+                <a16:creationId xmlns:a16="http://schemas.microsoft.com/office/drawing/2014/main" id="{B32B8DA1-1FE5-5CB1-DE0E-E949822C825D}"/>
+              </a:ext>
+            </a:extLst>
+          </p:cNvPr>
+          <p:cNvCxnSpPr>
+            <a:cxnSpLocks/>
+            <a:stCxn id="3" idx="3"/>
+            <a:endCxn id="15" idx="2"/>
+          </p:cNvCxnSpPr>
+          <p:nvPr/>
+        </p:nvCxnSpPr>
+        <p:spPr>
+          <a:xfrm flipV="1">
+            <a:off x="1788523" y="2135882"/>
+            <a:ext cx="762771" cy="2007029"/>
+          </a:xfrm>
+          <a:prstGeom prst="straightConnector1">
+            <a:avLst/>
+          </a:prstGeom>
+          <a:ln>
+            <a:solidFill>
+              <a:srgbClr val="FFC003"/>
+            </a:solidFill>
+            <a:tailEnd type="triangle"/>
+          </a:ln>
+        </p:spPr>
+        <p:style>
+          <a:lnRef idx="2">
+            <a:schemeClr val="accent1"/>
+          </a:lnRef>
+          <a:fillRef idx="0">
+            <a:schemeClr val="accent1"/>
+          </a:fillRef>
+          <a:effectRef idx="1">
+            <a:schemeClr val="accent1"/>
+          </a:effectRef>
+          <a:fontRef idx="minor">
+            <a:schemeClr val="tx1"/>
+          </a:fontRef>
+        </p:style>
+      </p:cxnSp>
+      <p:cxnSp>
+        <p:nvCxnSpPr>
+          <p:cNvPr id="158" name="Straight Arrow Connector 157">
+            <a:extLst>
+              <a:ext uri="{FF2B5EF4-FFF2-40B4-BE49-F238E27FC236}">
+                <a16:creationId xmlns:a16="http://schemas.microsoft.com/office/drawing/2014/main" id="{F26C5A8D-C362-E922-6AC8-18C73D6DCC7D}"/>
+              </a:ext>
+            </a:extLst>
+          </p:cNvPr>
+          <p:cNvCxnSpPr>
+            <a:cxnSpLocks/>
+            <a:stCxn id="157" idx="3"/>
+            <a:endCxn id="23" idx="0"/>
+          </p:cNvCxnSpPr>
+          <p:nvPr/>
+        </p:nvCxnSpPr>
+        <p:spPr>
+          <a:xfrm>
+            <a:off x="1788523" y="864866"/>
+            <a:ext cx="1901448" cy="729165"/>
+          </a:xfrm>
+          <a:prstGeom prst="straightConnector1">
+            <a:avLst/>
+          </a:prstGeom>
+          <a:ln>
+            <a:solidFill>
+              <a:srgbClr val="FFC003"/>
+            </a:solidFill>
+            <a:tailEnd type="triangle"/>
+          </a:ln>
+        </p:spPr>
+        <p:style>
+          <a:lnRef idx="2">
+            <a:schemeClr val="accent1"/>
+          </a:lnRef>
+          <a:fillRef idx="0">
+            <a:schemeClr val="accent1"/>
+          </a:fillRef>
+          <a:effectRef idx="1">
+            <a:schemeClr val="accent1"/>
+          </a:effectRef>
+          <a:fontRef idx="minor">
+            <a:schemeClr val="tx1"/>
+          </a:fontRef>
+        </p:style>
+      </p:cxnSp>
+      <p:cxnSp>
+        <p:nvCxnSpPr>
+          <p:cNvPr id="162" name="Straight Arrow Connector 161">
+            <a:extLst>
+              <a:ext uri="{FF2B5EF4-FFF2-40B4-BE49-F238E27FC236}">
+                <a16:creationId xmlns:a16="http://schemas.microsoft.com/office/drawing/2014/main" id="{244BE758-4A92-068F-70F2-6D7B8031E33A}"/>
+              </a:ext>
+            </a:extLst>
+          </p:cNvPr>
+          <p:cNvCxnSpPr>
+            <a:cxnSpLocks/>
+            <a:stCxn id="157" idx="3"/>
+            <a:endCxn id="27" idx="0"/>
+          </p:cNvCxnSpPr>
+          <p:nvPr/>
+        </p:nvCxnSpPr>
+        <p:spPr>
+          <a:xfrm>
+            <a:off x="1788523" y="864866"/>
+            <a:ext cx="3088618" cy="729165"/>
+          </a:xfrm>
+          <a:prstGeom prst="straightConnector1">
+            <a:avLst/>
+          </a:prstGeom>
+          <a:ln>
+            <a:solidFill>
+              <a:srgbClr val="FFC003"/>
+            </a:solidFill>
+            <a:tailEnd type="triangle"/>
+          </a:ln>
+        </p:spPr>
+        <p:style>
+          <a:lnRef idx="2">
+            <a:schemeClr val="accent1"/>
+          </a:lnRef>
+          <a:fillRef idx="0">
+            <a:schemeClr val="accent1"/>
+          </a:fillRef>
+          <a:effectRef idx="1">
+            <a:schemeClr val="accent1"/>
+          </a:effectRef>
+          <a:fontRef idx="minor">
+            <a:schemeClr val="tx1"/>
+          </a:fontRef>
+        </p:style>
+      </p:cxnSp>
+      <p:cxnSp>
+        <p:nvCxnSpPr>
+          <p:cNvPr id="165" name="Straight Arrow Connector 164">
+            <a:extLst>
+              <a:ext uri="{FF2B5EF4-FFF2-40B4-BE49-F238E27FC236}">
+                <a16:creationId xmlns:a16="http://schemas.microsoft.com/office/drawing/2014/main" id="{F55E33E9-BFDD-EAB4-54E3-0237E2B45BB6}"/>
+              </a:ext>
+            </a:extLst>
+          </p:cNvPr>
+          <p:cNvCxnSpPr>
+            <a:cxnSpLocks/>
+            <a:stCxn id="3" idx="3"/>
+            <a:endCxn id="16" idx="2"/>
+          </p:cNvCxnSpPr>
+          <p:nvPr/>
+        </p:nvCxnSpPr>
+        <p:spPr>
+          <a:xfrm flipV="1">
+            <a:off x="1788523" y="2863405"/>
+            <a:ext cx="762770" cy="1279506"/>
+          </a:xfrm>
+          <a:prstGeom prst="straightConnector1">
+            <a:avLst/>
+          </a:prstGeom>
+          <a:ln>
+            <a:solidFill>
+              <a:srgbClr val="EDE995"/>
+            </a:solidFill>
+            <a:tailEnd type="triangle"/>
+          </a:ln>
+        </p:spPr>
+        <p:style>
+          <a:lnRef idx="2">
+            <a:schemeClr val="accent1"/>
+          </a:lnRef>
+          <a:fillRef idx="0">
+            <a:schemeClr val="accent1"/>
+          </a:fillRef>
+          <a:effectRef idx="1">
+            <a:schemeClr val="accent1"/>
+          </a:effectRef>
+          <a:fontRef idx="minor">
+            <a:schemeClr val="tx1"/>
+          </a:fontRef>
+        </p:style>
+      </p:cxnSp>
+      <p:cxnSp>
+        <p:nvCxnSpPr>
+          <p:cNvPr id="168" name="Straight Arrow Connector 167">
+            <a:extLst>
+              <a:ext uri="{FF2B5EF4-FFF2-40B4-BE49-F238E27FC236}">
+                <a16:creationId xmlns:a16="http://schemas.microsoft.com/office/drawing/2014/main" id="{3A9536AC-9E82-CE08-5DB9-A9C8E98DCE0B}"/>
+              </a:ext>
+            </a:extLst>
+          </p:cNvPr>
+          <p:cNvCxnSpPr>
+            <a:cxnSpLocks/>
+            <a:stCxn id="13" idx="3"/>
+            <a:endCxn id="16" idx="2"/>
+          </p:cNvCxnSpPr>
+          <p:nvPr/>
+        </p:nvCxnSpPr>
+        <p:spPr>
+          <a:xfrm flipV="1">
+            <a:off x="1788523" y="2863405"/>
+            <a:ext cx="762770" cy="1884160"/>
+          </a:xfrm>
+          <a:prstGeom prst="straightConnector1">
+            <a:avLst/>
+          </a:prstGeom>
+          <a:ln>
+            <a:solidFill>
+              <a:srgbClr val="EDE995"/>
+            </a:solidFill>
+            <a:tailEnd type="triangle"/>
+          </a:ln>
+        </p:spPr>
+        <p:style>
+          <a:lnRef idx="2">
+            <a:schemeClr val="accent1"/>
+          </a:lnRef>
+          <a:fillRef idx="0">
+            <a:schemeClr val="accent1"/>
+          </a:fillRef>
+          <a:effectRef idx="1">
+            <a:schemeClr val="accent1"/>
+          </a:effectRef>
+          <a:fontRef idx="minor">
+            <a:schemeClr val="tx1"/>
+          </a:fontRef>
+        </p:style>
+      </p:cxnSp>
+      <p:cxnSp>
+        <p:nvCxnSpPr>
+          <p:cNvPr id="176" name="Straight Arrow Connector 175">
+            <a:extLst>
+              <a:ext uri="{FF2B5EF4-FFF2-40B4-BE49-F238E27FC236}">
+                <a16:creationId xmlns:a16="http://schemas.microsoft.com/office/drawing/2014/main" id="{F05130F5-CC80-520F-43AB-CF50F246B738}"/>
+              </a:ext>
+            </a:extLst>
+          </p:cNvPr>
+          <p:cNvCxnSpPr>
+            <a:cxnSpLocks/>
+            <a:stCxn id="157" idx="3"/>
+            <a:endCxn id="28" idx="0"/>
+          </p:cNvCxnSpPr>
+          <p:nvPr/>
+        </p:nvCxnSpPr>
+        <p:spPr>
+          <a:xfrm>
+            <a:off x="1788523" y="864866"/>
+            <a:ext cx="3088618" cy="1456688"/>
+          </a:xfrm>
+          <a:prstGeom prst="straightConnector1">
+            <a:avLst/>
+          </a:prstGeom>
+          <a:ln>
+            <a:solidFill>
+              <a:srgbClr val="EDE995"/>
+            </a:solidFill>
+            <a:tailEnd type="triangle"/>
+          </a:ln>
+        </p:spPr>
+        <p:style>
+          <a:lnRef idx="2">
+            <a:schemeClr val="accent1"/>
+          </a:lnRef>
+          <a:fillRef idx="0">
+            <a:schemeClr val="accent1"/>
+          </a:fillRef>
+          <a:effectRef idx="1">
+            <a:schemeClr val="accent1"/>
+          </a:effectRef>
+          <a:fontRef idx="minor">
+            <a:schemeClr val="tx1"/>
+          </a:fontRef>
+        </p:style>
+      </p:cxnSp>
+      <p:sp>
+        <p:nvSpPr>
+          <p:cNvPr id="192" name="TextBox 191">
+            <a:extLst>
+              <a:ext uri="{FF2B5EF4-FFF2-40B4-BE49-F238E27FC236}">
+                <a16:creationId xmlns:a16="http://schemas.microsoft.com/office/drawing/2014/main" id="{B7A524F5-BE27-708E-5F7B-063E55D0DB72}"/>
+              </a:ext>
+            </a:extLst>
+          </p:cNvPr>
+          <p:cNvSpPr txBox="1"/>
+          <p:nvPr/>
+        </p:nvSpPr>
+        <p:spPr>
+          <a:xfrm>
+            <a:off x="6808575" y="2397206"/>
+            <a:ext cx="752129" cy="246221"/>
+          </a:xfrm>
+          <a:prstGeom prst="rect">
+            <a:avLst/>
+          </a:prstGeom>
+          <a:noFill/>
+        </p:spPr>
+        <p:txBody>
+          <a:bodyPr wrap="none" rtlCol="0">
+            <a:spAutoFit/>
+          </a:bodyPr>
+          <a:lstStyle/>
+          <a:p>
+            <a:pPr algn="ctr"/>
+            <a:r>
+              <a:rPr lang="en-US" sz="1000" dirty="0"/>
+              <a:t>Quicklime</a:t>
+            </a:r>
+          </a:p>
+        </p:txBody>
+      </p:sp>
+      <p:sp>
+        <p:nvSpPr>
+          <p:cNvPr id="193" name="TextBox 192">
+            <a:extLst>
+              <a:ext uri="{FF2B5EF4-FFF2-40B4-BE49-F238E27FC236}">
+                <a16:creationId xmlns:a16="http://schemas.microsoft.com/office/drawing/2014/main" id="{76B3E778-C004-2D1C-D3DB-B82F27DCBD8D}"/>
+              </a:ext>
+            </a:extLst>
+          </p:cNvPr>
+          <p:cNvSpPr txBox="1"/>
+          <p:nvPr/>
+        </p:nvSpPr>
+        <p:spPr>
+          <a:xfrm rot="20356732">
+            <a:off x="6849763" y="2932669"/>
+            <a:ext cx="761747" cy="246221"/>
+          </a:xfrm>
+          <a:prstGeom prst="rect">
+            <a:avLst/>
+          </a:prstGeom>
+          <a:noFill/>
+        </p:spPr>
+        <p:txBody>
+          <a:bodyPr wrap="none" rtlCol="0">
+            <a:spAutoFit/>
+          </a:bodyPr>
+          <a:lstStyle/>
+          <a:p>
+            <a:pPr algn="ctr"/>
+            <a:r>
+              <a:rPr lang="en-US" sz="1000" dirty="0"/>
+              <a:t>Anthracite</a:t>
+            </a:r>
+          </a:p>
+        </p:txBody>
+      </p:sp>
+      <p:sp>
+        <p:nvSpPr>
+          <p:cNvPr id="194" name="TextBox 193">
+            <a:extLst>
+              <a:ext uri="{FF2B5EF4-FFF2-40B4-BE49-F238E27FC236}">
+                <a16:creationId xmlns:a16="http://schemas.microsoft.com/office/drawing/2014/main" id="{29443E69-61FB-FCB5-0777-C3548235CD8B}"/>
+              </a:ext>
+            </a:extLst>
+          </p:cNvPr>
+          <p:cNvSpPr txBox="1"/>
+          <p:nvPr/>
+        </p:nvSpPr>
+        <p:spPr>
+          <a:xfrm>
+            <a:off x="6754829" y="3282776"/>
+            <a:ext cx="984565" cy="246221"/>
+          </a:xfrm>
+          <a:prstGeom prst="rect">
+            <a:avLst/>
+          </a:prstGeom>
+          <a:noFill/>
+        </p:spPr>
+        <p:txBody>
+          <a:bodyPr wrap="none" rtlCol="0">
+            <a:spAutoFit/>
+          </a:bodyPr>
+          <a:lstStyle/>
+          <a:p>
+            <a:pPr algn="ctr"/>
+            <a:r>
+              <a:rPr lang="en-US" sz="1000" dirty="0"/>
+              <a:t>Coke oven gas</a:t>
+            </a:r>
+          </a:p>
+        </p:txBody>
+      </p:sp>
+      <p:cxnSp>
+        <p:nvCxnSpPr>
+          <p:cNvPr id="195" name="Straight Arrow Connector 194">
+            <a:extLst>
+              <a:ext uri="{FF2B5EF4-FFF2-40B4-BE49-F238E27FC236}">
+                <a16:creationId xmlns:a16="http://schemas.microsoft.com/office/drawing/2014/main" id="{37492EA7-82FF-337E-4F01-6E6A0BAD1194}"/>
+              </a:ext>
+            </a:extLst>
+          </p:cNvPr>
+          <p:cNvCxnSpPr>
+            <a:cxnSpLocks/>
+            <a:stCxn id="32" idx="3"/>
+            <a:endCxn id="36" idx="2"/>
+          </p:cNvCxnSpPr>
+          <p:nvPr/>
+        </p:nvCxnSpPr>
+        <p:spPr>
+          <a:xfrm flipV="1">
+            <a:off x="1788523" y="2863405"/>
+            <a:ext cx="7905871" cy="2488814"/>
+          </a:xfrm>
+          <a:prstGeom prst="straightConnector1">
+            <a:avLst/>
+          </a:prstGeom>
+          <a:ln>
+            <a:solidFill>
+              <a:srgbClr val="C00000"/>
+            </a:solidFill>
+            <a:tailEnd type="triangle"/>
+          </a:ln>
+        </p:spPr>
+        <p:style>
+          <a:lnRef idx="2">
+            <a:schemeClr val="accent1"/>
+          </a:lnRef>
+          <a:fillRef idx="0">
+            <a:schemeClr val="accent1"/>
+          </a:fillRef>
+          <a:effectRef idx="1">
+            <a:schemeClr val="accent1"/>
+          </a:effectRef>
+          <a:fontRef idx="minor">
+            <a:schemeClr val="tx1"/>
+          </a:fontRef>
+        </p:style>
+      </p:cxnSp>
+      <p:cxnSp>
+        <p:nvCxnSpPr>
+          <p:cNvPr id="199" name="Straight Arrow Connector 198">
+            <a:extLst>
+              <a:ext uri="{FF2B5EF4-FFF2-40B4-BE49-F238E27FC236}">
+                <a16:creationId xmlns:a16="http://schemas.microsoft.com/office/drawing/2014/main" id="{D7BC275F-0B97-4E1D-E721-872F2C303194}"/>
+              </a:ext>
+            </a:extLst>
+          </p:cNvPr>
+          <p:cNvCxnSpPr>
+            <a:cxnSpLocks/>
+            <a:stCxn id="198" idx="3"/>
+            <a:endCxn id="36" idx="2"/>
+          </p:cNvCxnSpPr>
+          <p:nvPr/>
+        </p:nvCxnSpPr>
+        <p:spPr>
+          <a:xfrm flipV="1">
+            <a:off x="1788523" y="2863405"/>
+            <a:ext cx="7905871" cy="3093467"/>
+          </a:xfrm>
+          <a:prstGeom prst="straightConnector1">
+            <a:avLst/>
+          </a:prstGeom>
+          <a:ln>
+            <a:solidFill>
+              <a:srgbClr val="C00000"/>
+            </a:solidFill>
+            <a:tailEnd type="triangle"/>
+          </a:ln>
+        </p:spPr>
+        <p:style>
+          <a:lnRef idx="2">
+            <a:schemeClr val="accent1"/>
+          </a:lnRef>
+          <a:fillRef idx="0">
+            <a:schemeClr val="accent1"/>
+          </a:fillRef>
+          <a:effectRef idx="1">
+            <a:schemeClr val="accent1"/>
+          </a:effectRef>
+          <a:fontRef idx="minor">
+            <a:schemeClr val="tx1"/>
+          </a:fontRef>
+        </p:style>
+      </p:cxnSp>
+      <p:sp>
+        <p:nvSpPr>
+          <p:cNvPr id="202" name="TextBox 201">
+            <a:extLst>
+              <a:ext uri="{FF2B5EF4-FFF2-40B4-BE49-F238E27FC236}">
+                <a16:creationId xmlns:a16="http://schemas.microsoft.com/office/drawing/2014/main" id="{819B3F3A-D1FC-C6D2-4B2B-90B52F6B8E91}"/>
+              </a:ext>
+            </a:extLst>
+          </p:cNvPr>
+          <p:cNvSpPr txBox="1"/>
+          <p:nvPr/>
+        </p:nvSpPr>
+        <p:spPr>
+          <a:xfrm>
+            <a:off x="10179743" y="2401325"/>
+            <a:ext cx="591829" cy="246221"/>
+          </a:xfrm>
+          <a:prstGeom prst="rect">
+            <a:avLst/>
+          </a:prstGeom>
+          <a:noFill/>
+        </p:spPr>
+        <p:txBody>
+          <a:bodyPr wrap="none" rtlCol="0">
+            <a:spAutoFit/>
+          </a:bodyPr>
+          <a:lstStyle/>
+          <a:p>
+            <a:pPr algn="ctr"/>
+            <a:r>
+              <a:rPr lang="en-US" sz="1000" dirty="0"/>
+              <a:t>Pig iron</a:t>
+            </a:r>
+          </a:p>
+        </p:txBody>
+      </p:sp>
+      <p:sp>
+        <p:nvSpPr>
+          <p:cNvPr id="4" name="Rounded Rectangle 3">
+            <a:extLst>
+              <a:ext uri="{FF2B5EF4-FFF2-40B4-BE49-F238E27FC236}">
+                <a16:creationId xmlns:a16="http://schemas.microsoft.com/office/drawing/2014/main" id="{910DAD58-D809-EE00-C268-33B690CA2B49}"/>
+              </a:ext>
+            </a:extLst>
+          </p:cNvPr>
+          <p:cNvSpPr/>
+          <p:nvPr/>
+        </p:nvSpPr>
+        <p:spPr>
+          <a:xfrm>
+            <a:off x="914400" y="3033608"/>
+            <a:ext cx="874123" cy="541851"/>
+          </a:xfrm>
+          <a:prstGeom prst="roundRect">
+            <a:avLst/>
+          </a:prstGeom>
+          <a:solidFill>
+            <a:schemeClr val="bg1"/>
+          </a:solidFill>
+        </p:spPr>
+        <p:style>
+          <a:lnRef idx="2">
+            <a:schemeClr val="accent1">
+              <a:shade val="15000"/>
+            </a:schemeClr>
+          </a:lnRef>
+          <a:fillRef idx="1">
+            <a:schemeClr val="accent1"/>
+          </a:fillRef>
+          <a:effectRef idx="0">
+            <a:schemeClr val="accent1"/>
+          </a:effectRef>
+          <a:fontRef idx="minor">
+            <a:schemeClr val="lt1"/>
+          </a:fontRef>
+        </p:style>
+        <p:txBody>
+          <a:bodyPr rtlCol="0" anchor="ctr"/>
+          <a:lstStyle/>
+          <a:p>
+            <a:pPr algn="ctr"/>
+            <a:r>
+              <a:rPr lang="en-US" sz="1000" dirty="0">
+                <a:solidFill>
+                  <a:schemeClr val="tx1"/>
+                </a:solidFill>
+              </a:rPr>
+              <a:t>Resources</a:t>
+            </a:r>
+          </a:p>
+          <a:p>
+            <a:pPr algn="ctr"/>
+            <a:r>
+              <a:rPr lang="en-US" sz="1000" dirty="0">
+                <a:solidFill>
+                  <a:schemeClr val="tx1"/>
+                </a:solidFill>
+              </a:rPr>
+              <a:t>[of Coal]</a:t>
+            </a:r>
+          </a:p>
+        </p:txBody>
+      </p:sp>
+      <p:sp>
+        <p:nvSpPr>
+          <p:cNvPr id="20" name="Rounded Rectangle 19">
+            <a:extLst>
+              <a:ext uri="{FF2B5EF4-FFF2-40B4-BE49-F238E27FC236}">
+                <a16:creationId xmlns:a16="http://schemas.microsoft.com/office/drawing/2014/main" id="{E9B457B8-3ABF-7335-2A52-2EF1C476F399}"/>
+              </a:ext>
+            </a:extLst>
+          </p:cNvPr>
+          <p:cNvSpPr/>
+          <p:nvPr/>
+        </p:nvSpPr>
+        <p:spPr>
+          <a:xfrm>
+            <a:off x="858528" y="1594031"/>
+            <a:ext cx="929995" cy="541851"/>
+          </a:xfrm>
+          <a:prstGeom prst="roundRect">
+            <a:avLst/>
+          </a:prstGeom>
+          <a:solidFill>
+            <a:schemeClr val="bg1"/>
+          </a:solidFill>
+        </p:spPr>
+        <p:style>
+          <a:lnRef idx="2">
+            <a:schemeClr val="accent1">
+              <a:shade val="15000"/>
+            </a:schemeClr>
+          </a:lnRef>
+          <a:fillRef idx="1">
+            <a:schemeClr val="accent1"/>
+          </a:fillRef>
+          <a:effectRef idx="0">
+            <a:schemeClr val="accent1"/>
+          </a:effectRef>
+          <a:fontRef idx="minor">
+            <a:schemeClr val="lt1"/>
+          </a:fontRef>
+        </p:style>
+        <p:txBody>
+          <a:bodyPr rtlCol="0" anchor="ctr"/>
+          <a:lstStyle/>
+          <a:p>
+            <a:pPr algn="ctr"/>
+            <a:r>
+              <a:rPr lang="en-US" sz="1000" dirty="0">
+                <a:solidFill>
+                  <a:schemeClr val="tx1"/>
+                </a:solidFill>
+              </a:rPr>
+              <a:t>Resources</a:t>
+            </a:r>
+          </a:p>
+          <a:p>
+            <a:pPr algn="ctr"/>
+            <a:r>
+              <a:rPr lang="en-US" sz="1000" dirty="0">
+                <a:solidFill>
+                  <a:schemeClr val="tx1"/>
+                </a:solidFill>
+              </a:rPr>
+              <a:t>[of Iron ore]</a:t>
+            </a:r>
+          </a:p>
+        </p:txBody>
+      </p:sp>
+      <p:sp>
+        <p:nvSpPr>
+          <p:cNvPr id="21" name="Rounded Rectangle 20">
+            <a:extLst>
+              <a:ext uri="{FF2B5EF4-FFF2-40B4-BE49-F238E27FC236}">
+                <a16:creationId xmlns:a16="http://schemas.microsoft.com/office/drawing/2014/main" id="{EC9E8AFC-735B-FCDD-044E-8F4B85C6934C}"/>
+              </a:ext>
+            </a:extLst>
+          </p:cNvPr>
+          <p:cNvSpPr/>
+          <p:nvPr/>
+        </p:nvSpPr>
+        <p:spPr>
+          <a:xfrm>
+            <a:off x="741405" y="2321554"/>
+            <a:ext cx="1047118" cy="541851"/>
+          </a:xfrm>
+          <a:prstGeom prst="roundRect">
+            <a:avLst/>
+          </a:prstGeom>
+          <a:solidFill>
+            <a:schemeClr val="bg1"/>
+          </a:solidFill>
+        </p:spPr>
+        <p:style>
+          <a:lnRef idx="2">
+            <a:schemeClr val="accent1">
+              <a:shade val="15000"/>
+            </a:schemeClr>
+          </a:lnRef>
+          <a:fillRef idx="1">
+            <a:schemeClr val="accent1"/>
+          </a:fillRef>
+          <a:effectRef idx="0">
+            <a:schemeClr val="accent1"/>
+          </a:effectRef>
+          <a:fontRef idx="minor">
+            <a:schemeClr val="lt1"/>
+          </a:fontRef>
+        </p:style>
+        <p:txBody>
+          <a:bodyPr rtlCol="0" anchor="ctr"/>
+          <a:lstStyle/>
+          <a:p>
+            <a:pPr algn="ctr"/>
+            <a:r>
+              <a:rPr lang="en-US" sz="1000" dirty="0">
+                <a:solidFill>
+                  <a:schemeClr val="tx1"/>
+                </a:solidFill>
+              </a:rPr>
+              <a:t>Resources</a:t>
+            </a:r>
+          </a:p>
+          <a:p>
+            <a:pPr algn="ctr"/>
+            <a:r>
+              <a:rPr lang="en-US" sz="1000" dirty="0">
+                <a:solidFill>
+                  <a:schemeClr val="tx1"/>
+                </a:solidFill>
+              </a:rPr>
+              <a:t>[of Limestone]</a:t>
+            </a:r>
+          </a:p>
+        </p:txBody>
+      </p:sp>
+      <p:sp>
+        <p:nvSpPr>
+          <p:cNvPr id="3" name="Rounded Rectangle 2">
+            <a:extLst>
+              <a:ext uri="{FF2B5EF4-FFF2-40B4-BE49-F238E27FC236}">
+                <a16:creationId xmlns:a16="http://schemas.microsoft.com/office/drawing/2014/main" id="{F8760FA8-A7F1-C5BD-24E0-65501A7B1D1A}"/>
+              </a:ext>
+            </a:extLst>
+          </p:cNvPr>
+          <p:cNvSpPr/>
+          <p:nvPr/>
+        </p:nvSpPr>
+        <p:spPr>
+          <a:xfrm>
+            <a:off x="976184" y="3871985"/>
+            <a:ext cx="812339" cy="541851"/>
+          </a:xfrm>
+          <a:prstGeom prst="roundRect">
+            <a:avLst/>
+          </a:prstGeom>
+          <a:solidFill>
+            <a:schemeClr val="bg1"/>
+          </a:solidFill>
+        </p:spPr>
+        <p:style>
+          <a:lnRef idx="2">
+            <a:schemeClr val="accent1">
+              <a:shade val="15000"/>
+            </a:schemeClr>
+          </a:lnRef>
+          <a:fillRef idx="1">
+            <a:schemeClr val="accent1"/>
+          </a:fillRef>
+          <a:effectRef idx="0">
+            <a:schemeClr val="accent1"/>
+          </a:effectRef>
+          <a:fontRef idx="minor">
+            <a:schemeClr val="lt1"/>
+          </a:fontRef>
+        </p:style>
+        <p:txBody>
+          <a:bodyPr rtlCol="0" anchor="ctr"/>
+          <a:lstStyle/>
+          <a:p>
+            <a:pPr algn="ctr"/>
+            <a:r>
+              <a:rPr lang="en-US" sz="1000" dirty="0">
+                <a:solidFill>
+                  <a:schemeClr val="tx1"/>
+                </a:solidFill>
+              </a:rPr>
+              <a:t>Supply</a:t>
+            </a:r>
+          </a:p>
+          <a:p>
+            <a:pPr algn="ctr"/>
+            <a:r>
+              <a:rPr lang="en-US" sz="1000" dirty="0">
+                <a:solidFill>
+                  <a:schemeClr val="tx1"/>
+                </a:solidFill>
+              </a:rPr>
+              <a:t>[of Diesel]</a:t>
+            </a:r>
+          </a:p>
+        </p:txBody>
+      </p:sp>
+      <p:sp>
+        <p:nvSpPr>
+          <p:cNvPr id="13" name="Rounded Rectangle 12">
+            <a:extLst>
+              <a:ext uri="{FF2B5EF4-FFF2-40B4-BE49-F238E27FC236}">
+                <a16:creationId xmlns:a16="http://schemas.microsoft.com/office/drawing/2014/main" id="{64EBDF53-5246-6794-34BC-28915872C4C3}"/>
+              </a:ext>
+            </a:extLst>
+          </p:cNvPr>
+          <p:cNvSpPr/>
+          <p:nvPr/>
+        </p:nvSpPr>
+        <p:spPr>
+          <a:xfrm>
+            <a:off x="815546" y="4476639"/>
+            <a:ext cx="972977" cy="541851"/>
+          </a:xfrm>
+          <a:prstGeom prst="roundRect">
+            <a:avLst/>
+          </a:prstGeom>
+          <a:solidFill>
+            <a:schemeClr val="bg1"/>
+          </a:solidFill>
+        </p:spPr>
+        <p:style>
+          <a:lnRef idx="2">
+            <a:schemeClr val="accent1">
+              <a:shade val="15000"/>
+            </a:schemeClr>
+          </a:lnRef>
+          <a:fillRef idx="1">
+            <a:schemeClr val="accent1"/>
+          </a:fillRef>
+          <a:effectRef idx="0">
+            <a:schemeClr val="accent1"/>
+          </a:effectRef>
+          <a:fontRef idx="minor">
+            <a:schemeClr val="lt1"/>
+          </a:fontRef>
+        </p:style>
+        <p:txBody>
+          <a:bodyPr rtlCol="0" anchor="ctr"/>
+          <a:lstStyle/>
+          <a:p>
+            <a:pPr algn="ctr"/>
+            <a:r>
+              <a:rPr lang="en-US" sz="1000" dirty="0">
+                <a:solidFill>
+                  <a:schemeClr val="tx1"/>
+                </a:solidFill>
+              </a:rPr>
+              <a:t>Supply</a:t>
+            </a:r>
+          </a:p>
+          <a:p>
+            <a:pPr algn="ctr"/>
+            <a:r>
+              <a:rPr lang="en-US" sz="1000" dirty="0">
+                <a:solidFill>
+                  <a:schemeClr val="tx1"/>
+                </a:solidFill>
+              </a:rPr>
+              <a:t>[of Gasoline]</a:t>
+            </a:r>
+          </a:p>
+        </p:txBody>
+      </p:sp>
+      <p:sp>
+        <p:nvSpPr>
+          <p:cNvPr id="15" name="Rounded Rectangle 14">
+            <a:extLst>
+              <a:ext uri="{FF2B5EF4-FFF2-40B4-BE49-F238E27FC236}">
+                <a16:creationId xmlns:a16="http://schemas.microsoft.com/office/drawing/2014/main" id="{964FC9BA-EFD6-E497-4169-6233F3719414}"/>
+              </a:ext>
+            </a:extLst>
+          </p:cNvPr>
+          <p:cNvSpPr/>
+          <p:nvPr/>
+        </p:nvSpPr>
+        <p:spPr>
+          <a:xfrm>
+            <a:off x="2155501" y="1594031"/>
+            <a:ext cx="791585" cy="541851"/>
+          </a:xfrm>
+          <a:prstGeom prst="roundRect">
+            <a:avLst/>
+          </a:prstGeom>
+          <a:solidFill>
+            <a:schemeClr val="bg1"/>
+          </a:solidFill>
+        </p:spPr>
+        <p:style>
+          <a:lnRef idx="2">
+            <a:schemeClr val="accent1">
+              <a:shade val="15000"/>
+            </a:schemeClr>
+          </a:lnRef>
+          <a:fillRef idx="1">
+            <a:schemeClr val="accent1"/>
+          </a:fillRef>
+          <a:effectRef idx="0">
+            <a:schemeClr val="accent1"/>
+          </a:effectRef>
+          <a:fontRef idx="minor">
+            <a:schemeClr val="lt1"/>
+          </a:fontRef>
+        </p:style>
+        <p:txBody>
+          <a:bodyPr rtlCol="0" anchor="ctr"/>
+          <a:lstStyle/>
+          <a:p>
+            <a:pPr algn="ctr"/>
+            <a:r>
+              <a:rPr lang="en-US" sz="1000" dirty="0">
+                <a:solidFill>
+                  <a:schemeClr val="tx1"/>
+                </a:solidFill>
+              </a:rPr>
+              <a:t>Iron ore extraction</a:t>
+            </a:r>
+          </a:p>
+        </p:txBody>
+      </p:sp>
+      <p:sp>
+        <p:nvSpPr>
+          <p:cNvPr id="16" name="Rounded Rectangle 15">
+            <a:extLst>
+              <a:ext uri="{FF2B5EF4-FFF2-40B4-BE49-F238E27FC236}">
+                <a16:creationId xmlns:a16="http://schemas.microsoft.com/office/drawing/2014/main" id="{D42B75CF-C1E0-67E0-B93D-83DB88978474}"/>
+              </a:ext>
+            </a:extLst>
+          </p:cNvPr>
+          <p:cNvSpPr/>
+          <p:nvPr/>
+        </p:nvSpPr>
+        <p:spPr>
+          <a:xfrm>
+            <a:off x="2122154" y="2321554"/>
+            <a:ext cx="858278" cy="541851"/>
+          </a:xfrm>
+          <a:prstGeom prst="roundRect">
+            <a:avLst/>
+          </a:prstGeom>
+          <a:solidFill>
+            <a:schemeClr val="bg1"/>
+          </a:solidFill>
+        </p:spPr>
+        <p:style>
+          <a:lnRef idx="2">
+            <a:schemeClr val="accent1">
+              <a:shade val="15000"/>
+            </a:schemeClr>
+          </a:lnRef>
+          <a:fillRef idx="1">
+            <a:schemeClr val="accent1"/>
+          </a:fillRef>
+          <a:effectRef idx="0">
+            <a:schemeClr val="accent1"/>
+          </a:effectRef>
+          <a:fontRef idx="minor">
+            <a:schemeClr val="lt1"/>
+          </a:fontRef>
+        </p:style>
+        <p:txBody>
+          <a:bodyPr rtlCol="0" anchor="ctr"/>
+          <a:lstStyle/>
+          <a:p>
+            <a:pPr algn="ctr"/>
+            <a:r>
+              <a:rPr lang="en-US" sz="1000" dirty="0">
+                <a:solidFill>
+                  <a:schemeClr val="tx1"/>
+                </a:solidFill>
+              </a:rPr>
+              <a:t>Limestone extraction</a:t>
+            </a:r>
+          </a:p>
+        </p:txBody>
+      </p:sp>
+      <p:sp>
+        <p:nvSpPr>
+          <p:cNvPr id="19" name="Rounded Rectangle 18">
+            <a:extLst>
+              <a:ext uri="{FF2B5EF4-FFF2-40B4-BE49-F238E27FC236}">
+                <a16:creationId xmlns:a16="http://schemas.microsoft.com/office/drawing/2014/main" id="{1D0E79A5-E41E-C5E3-E4FF-A3DE49C269D9}"/>
+              </a:ext>
+            </a:extLst>
+          </p:cNvPr>
+          <p:cNvSpPr/>
+          <p:nvPr/>
+        </p:nvSpPr>
+        <p:spPr>
+          <a:xfrm>
+            <a:off x="2108357" y="3033608"/>
+            <a:ext cx="885873" cy="541851"/>
+          </a:xfrm>
+          <a:prstGeom prst="roundRect">
+            <a:avLst/>
+          </a:prstGeom>
+          <a:solidFill>
+            <a:schemeClr val="bg1"/>
+          </a:solidFill>
+        </p:spPr>
+        <p:style>
+          <a:lnRef idx="2">
+            <a:schemeClr val="accent1">
+              <a:shade val="15000"/>
+            </a:schemeClr>
+          </a:lnRef>
+          <a:fillRef idx="1">
+            <a:schemeClr val="accent1"/>
+          </a:fillRef>
+          <a:effectRef idx="0">
+            <a:schemeClr val="accent1"/>
+          </a:effectRef>
+          <a:fontRef idx="minor">
+            <a:schemeClr val="lt1"/>
+          </a:fontRef>
+        </p:style>
+        <p:txBody>
+          <a:bodyPr rtlCol="0" anchor="ctr"/>
+          <a:lstStyle/>
+          <a:p>
+            <a:pPr algn="ctr"/>
+            <a:r>
+              <a:rPr lang="en-US" sz="1000" dirty="0">
+                <a:solidFill>
+                  <a:schemeClr val="tx1"/>
+                </a:solidFill>
+              </a:rPr>
+              <a:t>Coal</a:t>
+            </a:r>
+          </a:p>
+          <a:p>
+            <a:pPr algn="ctr"/>
+            <a:r>
+              <a:rPr lang="en-US" sz="1000" dirty="0">
+                <a:solidFill>
+                  <a:schemeClr val="tx1"/>
+                </a:solidFill>
+              </a:rPr>
+              <a:t>extraction</a:t>
+            </a:r>
+          </a:p>
+        </p:txBody>
+      </p:sp>
+      <p:sp>
+        <p:nvSpPr>
+          <p:cNvPr id="23" name="Rounded Rectangle 22">
+            <a:extLst>
+              <a:ext uri="{FF2B5EF4-FFF2-40B4-BE49-F238E27FC236}">
+                <a16:creationId xmlns:a16="http://schemas.microsoft.com/office/drawing/2014/main" id="{8D1D64F0-0D85-6DFB-9A28-D64369F24F62}"/>
+              </a:ext>
+            </a:extLst>
+          </p:cNvPr>
+          <p:cNvSpPr/>
+          <p:nvPr/>
+        </p:nvSpPr>
+        <p:spPr>
+          <a:xfrm>
+            <a:off x="3344819" y="1594031"/>
+            <a:ext cx="690304" cy="541851"/>
+          </a:xfrm>
+          <a:prstGeom prst="roundRect">
+            <a:avLst/>
+          </a:prstGeom>
+          <a:solidFill>
+            <a:schemeClr val="bg1"/>
+          </a:solidFill>
+        </p:spPr>
+        <p:style>
+          <a:lnRef idx="2">
+            <a:schemeClr val="accent1">
+              <a:shade val="15000"/>
+            </a:schemeClr>
+          </a:lnRef>
+          <a:fillRef idx="1">
+            <a:schemeClr val="accent1"/>
+          </a:fillRef>
+          <a:effectRef idx="0">
+            <a:schemeClr val="accent1"/>
+          </a:effectRef>
+          <a:fontRef idx="minor">
+            <a:schemeClr val="lt1"/>
+          </a:fontRef>
+        </p:style>
+        <p:txBody>
+          <a:bodyPr rtlCol="0" anchor="ctr"/>
+          <a:lstStyle/>
+          <a:p>
+            <a:pPr algn="ctr"/>
+            <a:r>
+              <a:rPr lang="en-US" sz="1000" dirty="0">
+                <a:solidFill>
+                  <a:schemeClr val="tx1"/>
+                </a:solidFill>
+              </a:rPr>
+              <a:t>Iron ore hauling</a:t>
+            </a:r>
+          </a:p>
+        </p:txBody>
+      </p:sp>
+      <p:sp>
+        <p:nvSpPr>
+          <p:cNvPr id="24" name="Rounded Rectangle 23">
+            <a:extLst>
+              <a:ext uri="{FF2B5EF4-FFF2-40B4-BE49-F238E27FC236}">
+                <a16:creationId xmlns:a16="http://schemas.microsoft.com/office/drawing/2014/main" id="{73A0BD1A-60DD-AA23-FB56-4F99BDBF6E30}"/>
+              </a:ext>
+            </a:extLst>
+          </p:cNvPr>
+          <p:cNvSpPr/>
+          <p:nvPr/>
+        </p:nvSpPr>
+        <p:spPr>
+          <a:xfrm>
+            <a:off x="3241267" y="2321554"/>
+            <a:ext cx="897408" cy="541851"/>
+          </a:xfrm>
+          <a:prstGeom prst="roundRect">
+            <a:avLst/>
+          </a:prstGeom>
+          <a:solidFill>
+            <a:schemeClr val="bg1"/>
+          </a:solidFill>
+        </p:spPr>
+        <p:style>
+          <a:lnRef idx="2">
+            <a:schemeClr val="accent1">
+              <a:shade val="15000"/>
+            </a:schemeClr>
+          </a:lnRef>
+          <a:fillRef idx="1">
+            <a:schemeClr val="accent1"/>
+          </a:fillRef>
+          <a:effectRef idx="0">
+            <a:schemeClr val="accent1"/>
+          </a:effectRef>
+          <a:fontRef idx="minor">
+            <a:schemeClr val="lt1"/>
+          </a:fontRef>
+        </p:style>
+        <p:txBody>
+          <a:bodyPr rtlCol="0" anchor="ctr"/>
+          <a:lstStyle/>
+          <a:p>
+            <a:pPr algn="ctr"/>
+            <a:r>
+              <a:rPr lang="en-US" sz="1000" dirty="0">
+                <a:solidFill>
+                  <a:schemeClr val="tx1"/>
+                </a:solidFill>
+              </a:rPr>
+              <a:t>Limestone</a:t>
+            </a:r>
+          </a:p>
+          <a:p>
+            <a:pPr algn="ctr"/>
+            <a:r>
+              <a:rPr lang="en-US" sz="1000" dirty="0">
+                <a:solidFill>
+                  <a:schemeClr val="tx1"/>
+                </a:solidFill>
+              </a:rPr>
+              <a:t>hauling</a:t>
+            </a:r>
+          </a:p>
+        </p:txBody>
+      </p:sp>
+      <p:sp>
+        <p:nvSpPr>
+          <p:cNvPr id="26" name="Rounded Rectangle 25">
+            <a:extLst>
+              <a:ext uri="{FF2B5EF4-FFF2-40B4-BE49-F238E27FC236}">
+                <a16:creationId xmlns:a16="http://schemas.microsoft.com/office/drawing/2014/main" id="{291B51CA-8F77-1686-BCCA-9765BAFDC4EF}"/>
+              </a:ext>
+            </a:extLst>
+          </p:cNvPr>
+          <p:cNvSpPr/>
+          <p:nvPr/>
+        </p:nvSpPr>
+        <p:spPr>
+          <a:xfrm>
+            <a:off x="3334562" y="3033608"/>
+            <a:ext cx="710819" cy="541851"/>
+          </a:xfrm>
+          <a:prstGeom prst="roundRect">
+            <a:avLst/>
+          </a:prstGeom>
+          <a:solidFill>
+            <a:schemeClr val="bg1"/>
+          </a:solidFill>
+        </p:spPr>
+        <p:style>
+          <a:lnRef idx="2">
+            <a:schemeClr val="accent1">
+              <a:shade val="15000"/>
+            </a:schemeClr>
+          </a:lnRef>
+          <a:fillRef idx="1">
+            <a:schemeClr val="accent1"/>
+          </a:fillRef>
+          <a:effectRef idx="0">
+            <a:schemeClr val="accent1"/>
+          </a:effectRef>
+          <a:fontRef idx="minor">
+            <a:schemeClr val="lt1"/>
+          </a:fontRef>
+        </p:style>
+        <p:txBody>
+          <a:bodyPr rtlCol="0" anchor="ctr"/>
+          <a:lstStyle/>
+          <a:p>
+            <a:pPr algn="ctr"/>
+            <a:r>
+              <a:rPr lang="en-US" sz="1000" dirty="0">
+                <a:solidFill>
+                  <a:schemeClr val="tx1"/>
+                </a:solidFill>
+              </a:rPr>
+              <a:t>Coal</a:t>
+            </a:r>
+          </a:p>
+          <a:p>
+            <a:pPr algn="ctr"/>
+            <a:r>
+              <a:rPr lang="en-US" sz="1000" dirty="0">
+                <a:solidFill>
+                  <a:schemeClr val="tx1"/>
+                </a:solidFill>
+              </a:rPr>
+              <a:t>hauling</a:t>
+            </a:r>
+          </a:p>
+        </p:txBody>
+      </p:sp>
+      <p:sp>
+        <p:nvSpPr>
+          <p:cNvPr id="27" name="Rounded Rectangle 26">
+            <a:extLst>
+              <a:ext uri="{FF2B5EF4-FFF2-40B4-BE49-F238E27FC236}">
+                <a16:creationId xmlns:a16="http://schemas.microsoft.com/office/drawing/2014/main" id="{ED7D4BA8-B898-8DAC-B0FB-1A5EE564CFA0}"/>
+              </a:ext>
+            </a:extLst>
+          </p:cNvPr>
+          <p:cNvSpPr/>
+          <p:nvPr/>
+        </p:nvSpPr>
+        <p:spPr>
+          <a:xfrm>
+            <a:off x="4350049" y="1594031"/>
+            <a:ext cx="1054184" cy="541851"/>
+          </a:xfrm>
+          <a:prstGeom prst="roundRect">
+            <a:avLst/>
+          </a:prstGeom>
+          <a:solidFill>
+            <a:schemeClr val="bg1"/>
+          </a:solidFill>
+        </p:spPr>
+        <p:style>
+          <a:lnRef idx="2">
+            <a:schemeClr val="accent1">
+              <a:shade val="15000"/>
+            </a:schemeClr>
+          </a:lnRef>
+          <a:fillRef idx="1">
+            <a:schemeClr val="accent1"/>
+          </a:fillRef>
+          <a:effectRef idx="0">
+            <a:schemeClr val="accent1"/>
+          </a:effectRef>
+          <a:fontRef idx="minor">
+            <a:schemeClr val="lt1"/>
+          </a:fontRef>
+        </p:style>
+        <p:txBody>
+          <a:bodyPr rtlCol="0" anchor="ctr"/>
+          <a:lstStyle/>
+          <a:p>
+            <a:pPr algn="ctr"/>
+            <a:r>
+              <a:rPr lang="en-US" sz="1000" dirty="0">
+                <a:solidFill>
+                  <a:schemeClr val="tx1"/>
+                </a:solidFill>
+              </a:rPr>
+              <a:t>Iron ore beneficiation</a:t>
+            </a:r>
+          </a:p>
+        </p:txBody>
+      </p:sp>
+      <p:sp>
+        <p:nvSpPr>
+          <p:cNvPr id="28" name="Rounded Rectangle 27">
+            <a:extLst>
+              <a:ext uri="{FF2B5EF4-FFF2-40B4-BE49-F238E27FC236}">
+                <a16:creationId xmlns:a16="http://schemas.microsoft.com/office/drawing/2014/main" id="{2C26D405-CC69-C081-5AD9-4D04577D11A6}"/>
+              </a:ext>
+            </a:extLst>
+          </p:cNvPr>
+          <p:cNvSpPr/>
+          <p:nvPr/>
+        </p:nvSpPr>
+        <p:spPr>
+          <a:xfrm>
+            <a:off x="4350049" y="2321554"/>
+            <a:ext cx="1054184" cy="541851"/>
+          </a:xfrm>
+          <a:prstGeom prst="roundRect">
+            <a:avLst/>
+          </a:prstGeom>
+          <a:solidFill>
+            <a:schemeClr val="bg1"/>
+          </a:solidFill>
+        </p:spPr>
+        <p:style>
+          <a:lnRef idx="2">
+            <a:schemeClr val="accent1">
+              <a:shade val="15000"/>
+            </a:schemeClr>
+          </a:lnRef>
+          <a:fillRef idx="1">
+            <a:schemeClr val="accent1"/>
+          </a:fillRef>
+          <a:effectRef idx="0">
+            <a:schemeClr val="accent1"/>
+          </a:effectRef>
+          <a:fontRef idx="minor">
+            <a:schemeClr val="lt1"/>
+          </a:fontRef>
+        </p:style>
+        <p:txBody>
+          <a:bodyPr rtlCol="0" anchor="ctr"/>
+          <a:lstStyle/>
+          <a:p>
+            <a:pPr algn="ctr"/>
+            <a:r>
+              <a:rPr lang="en-US" sz="1000" dirty="0">
+                <a:solidFill>
+                  <a:schemeClr val="tx1"/>
+                </a:solidFill>
+              </a:rPr>
+              <a:t>Limestone beneficiation</a:t>
+            </a:r>
+          </a:p>
+        </p:txBody>
+      </p:sp>
+      <p:sp>
+        <p:nvSpPr>
+          <p:cNvPr id="29" name="Rounded Rectangle 28">
+            <a:extLst>
+              <a:ext uri="{FF2B5EF4-FFF2-40B4-BE49-F238E27FC236}">
+                <a16:creationId xmlns:a16="http://schemas.microsoft.com/office/drawing/2014/main" id="{DD73B501-A03A-7087-BAC3-83FC7CFF423D}"/>
+              </a:ext>
+            </a:extLst>
+          </p:cNvPr>
+          <p:cNvSpPr/>
+          <p:nvPr/>
+        </p:nvSpPr>
+        <p:spPr>
+          <a:xfrm>
+            <a:off x="4350049" y="3033608"/>
+            <a:ext cx="1054184" cy="541851"/>
+          </a:xfrm>
+          <a:prstGeom prst="roundRect">
+            <a:avLst/>
+          </a:prstGeom>
+          <a:solidFill>
+            <a:schemeClr val="bg1"/>
+          </a:solidFill>
+        </p:spPr>
+        <p:style>
+          <a:lnRef idx="2">
+            <a:schemeClr val="accent1">
+              <a:shade val="15000"/>
+            </a:schemeClr>
+          </a:lnRef>
+          <a:fillRef idx="1">
+            <a:schemeClr val="accent1"/>
+          </a:fillRef>
+          <a:effectRef idx="0">
+            <a:schemeClr val="accent1"/>
+          </a:effectRef>
+          <a:fontRef idx="minor">
+            <a:schemeClr val="lt1"/>
+          </a:fontRef>
+        </p:style>
+        <p:txBody>
+          <a:bodyPr rtlCol="0" anchor="ctr"/>
+          <a:lstStyle/>
+          <a:p>
+            <a:pPr algn="ctr"/>
+            <a:r>
+              <a:rPr lang="en-US" sz="1000" dirty="0">
+                <a:solidFill>
+                  <a:schemeClr val="tx1"/>
+                </a:solidFill>
+              </a:rPr>
+              <a:t>Coal beneficiation</a:t>
+            </a:r>
+          </a:p>
+        </p:txBody>
+      </p:sp>
+      <p:sp>
+        <p:nvSpPr>
+          <p:cNvPr id="30" name="Rounded Rectangle 29">
+            <a:extLst>
+              <a:ext uri="{FF2B5EF4-FFF2-40B4-BE49-F238E27FC236}">
+                <a16:creationId xmlns:a16="http://schemas.microsoft.com/office/drawing/2014/main" id="{FB887829-FC40-28CE-ACA3-DD309CAEF20E}"/>
+              </a:ext>
+            </a:extLst>
+          </p:cNvPr>
+          <p:cNvSpPr/>
+          <p:nvPr/>
+        </p:nvSpPr>
+        <p:spPr>
+          <a:xfrm>
+            <a:off x="5688741" y="2321554"/>
+            <a:ext cx="1054184" cy="541851"/>
+          </a:xfrm>
+          <a:prstGeom prst="roundRect">
+            <a:avLst/>
+          </a:prstGeom>
+          <a:solidFill>
+            <a:schemeClr val="bg1"/>
+          </a:solidFill>
+        </p:spPr>
+        <p:style>
+          <a:lnRef idx="2">
+            <a:schemeClr val="accent1">
+              <a:shade val="15000"/>
+            </a:schemeClr>
+          </a:lnRef>
+          <a:fillRef idx="1">
+            <a:schemeClr val="accent1"/>
+          </a:fillRef>
+          <a:effectRef idx="0">
+            <a:schemeClr val="accent1"/>
+          </a:effectRef>
+          <a:fontRef idx="minor">
+            <a:schemeClr val="lt1"/>
+          </a:fontRef>
+        </p:style>
+        <p:txBody>
+          <a:bodyPr rtlCol="0" anchor="ctr"/>
+          <a:lstStyle/>
+          <a:p>
+            <a:pPr algn="ctr"/>
+            <a:r>
+              <a:rPr lang="en-US" sz="1000" dirty="0">
+                <a:solidFill>
+                  <a:schemeClr val="tx1"/>
+                </a:solidFill>
+              </a:rPr>
+              <a:t>Rotary kiln</a:t>
+            </a:r>
+          </a:p>
+        </p:txBody>
+      </p:sp>
+      <p:sp>
+        <p:nvSpPr>
+          <p:cNvPr id="31" name="Rounded Rectangle 30">
+            <a:extLst>
+              <a:ext uri="{FF2B5EF4-FFF2-40B4-BE49-F238E27FC236}">
+                <a16:creationId xmlns:a16="http://schemas.microsoft.com/office/drawing/2014/main" id="{A7252028-CED5-DAFB-F081-B29C4FC62ADD}"/>
+              </a:ext>
+            </a:extLst>
+          </p:cNvPr>
+          <p:cNvSpPr/>
+          <p:nvPr/>
+        </p:nvSpPr>
+        <p:spPr>
+          <a:xfrm>
+            <a:off x="5688741" y="3033608"/>
+            <a:ext cx="1054184" cy="541851"/>
+          </a:xfrm>
+          <a:prstGeom prst="roundRect">
+            <a:avLst/>
+          </a:prstGeom>
+          <a:solidFill>
+            <a:schemeClr val="bg1"/>
+          </a:solidFill>
+        </p:spPr>
+        <p:style>
+          <a:lnRef idx="2">
+            <a:schemeClr val="accent1">
+              <a:shade val="15000"/>
+            </a:schemeClr>
+          </a:lnRef>
+          <a:fillRef idx="1">
+            <a:schemeClr val="accent1"/>
+          </a:fillRef>
+          <a:effectRef idx="0">
+            <a:schemeClr val="accent1"/>
+          </a:effectRef>
+          <a:fontRef idx="minor">
+            <a:schemeClr val="lt1"/>
+          </a:fontRef>
+        </p:style>
+        <p:txBody>
+          <a:bodyPr rtlCol="0" anchor="ctr"/>
+          <a:lstStyle/>
+          <a:p>
+            <a:pPr algn="ctr"/>
+            <a:r>
+              <a:rPr lang="en-US" sz="1000" dirty="0">
+                <a:solidFill>
+                  <a:schemeClr val="tx1"/>
+                </a:solidFill>
+              </a:rPr>
+              <a:t>Coke oven</a:t>
+            </a:r>
+          </a:p>
+        </p:txBody>
+      </p:sp>
+      <p:sp>
+        <p:nvSpPr>
+          <p:cNvPr id="32" name="Rounded Rectangle 31">
+            <a:extLst>
+              <a:ext uri="{FF2B5EF4-FFF2-40B4-BE49-F238E27FC236}">
+                <a16:creationId xmlns:a16="http://schemas.microsoft.com/office/drawing/2014/main" id="{521B03BF-1FD5-CE4F-823B-BB349956D738}"/>
+              </a:ext>
+            </a:extLst>
+          </p:cNvPr>
+          <p:cNvSpPr/>
+          <p:nvPr/>
+        </p:nvSpPr>
+        <p:spPr>
+          <a:xfrm>
+            <a:off x="691978" y="5081293"/>
+            <a:ext cx="1096545" cy="541851"/>
+          </a:xfrm>
+          <a:prstGeom prst="roundRect">
+            <a:avLst/>
+          </a:prstGeom>
+          <a:solidFill>
+            <a:schemeClr val="bg1"/>
+          </a:solidFill>
+        </p:spPr>
+        <p:style>
+          <a:lnRef idx="2">
+            <a:schemeClr val="accent1">
+              <a:shade val="15000"/>
+            </a:schemeClr>
+          </a:lnRef>
+          <a:fillRef idx="1">
+            <a:schemeClr val="accent1"/>
+          </a:fillRef>
+          <a:effectRef idx="0">
+            <a:schemeClr val="accent1"/>
+          </a:effectRef>
+          <a:fontRef idx="minor">
+            <a:schemeClr val="lt1"/>
+          </a:fontRef>
+        </p:style>
+        <p:txBody>
+          <a:bodyPr rtlCol="0" anchor="ctr"/>
+          <a:lstStyle/>
+          <a:p>
+            <a:pPr algn="ctr"/>
+            <a:r>
+              <a:rPr lang="en-US" sz="1000" dirty="0">
+                <a:solidFill>
+                  <a:schemeClr val="tx1"/>
+                </a:solidFill>
+              </a:rPr>
+              <a:t>Supply</a:t>
+            </a:r>
+          </a:p>
+          <a:p>
+            <a:pPr algn="ctr"/>
+            <a:r>
+              <a:rPr lang="en-US" sz="1000" dirty="0">
+                <a:solidFill>
+                  <a:schemeClr val="tx1"/>
+                </a:solidFill>
+              </a:rPr>
+              <a:t>[of Natural gas]</a:t>
+            </a:r>
+          </a:p>
+        </p:txBody>
+      </p:sp>
+      <p:sp>
+        <p:nvSpPr>
+          <p:cNvPr id="33" name="Rounded Rectangle 32">
+            <a:extLst>
+              <a:ext uri="{FF2B5EF4-FFF2-40B4-BE49-F238E27FC236}">
+                <a16:creationId xmlns:a16="http://schemas.microsoft.com/office/drawing/2014/main" id="{4E0E3AF7-DEDA-FFE7-A23E-49DD0A520FFB}"/>
+              </a:ext>
+            </a:extLst>
+          </p:cNvPr>
+          <p:cNvSpPr/>
+          <p:nvPr/>
+        </p:nvSpPr>
+        <p:spPr>
+          <a:xfrm>
+            <a:off x="7717440" y="3033608"/>
+            <a:ext cx="1054184" cy="541851"/>
+          </a:xfrm>
+          <a:prstGeom prst="roundRect">
+            <a:avLst/>
+          </a:prstGeom>
+          <a:solidFill>
+            <a:schemeClr val="bg1"/>
+          </a:solidFill>
+        </p:spPr>
+        <p:style>
+          <a:lnRef idx="2">
+            <a:schemeClr val="accent1">
+              <a:shade val="15000"/>
+            </a:schemeClr>
+          </a:lnRef>
+          <a:fillRef idx="1">
+            <a:schemeClr val="accent1"/>
+          </a:fillRef>
+          <a:effectRef idx="0">
+            <a:schemeClr val="accent1"/>
+          </a:effectRef>
+          <a:fontRef idx="minor">
+            <a:schemeClr val="lt1"/>
+          </a:fontRef>
+        </p:style>
+        <p:txBody>
+          <a:bodyPr rtlCol="0" anchor="ctr"/>
+          <a:lstStyle/>
+          <a:p>
+            <a:pPr algn="ctr"/>
+            <a:r>
+              <a:rPr lang="en-US" sz="1000" dirty="0">
+                <a:solidFill>
+                  <a:schemeClr val="tx1"/>
+                </a:solidFill>
+              </a:rPr>
+              <a:t>Coke oven gas treatment</a:t>
+            </a:r>
+          </a:p>
+        </p:txBody>
+      </p:sp>
+      <p:sp>
+        <p:nvSpPr>
+          <p:cNvPr id="34" name="Rounded Rectangle 33">
+            <a:extLst>
+              <a:ext uri="{FF2B5EF4-FFF2-40B4-BE49-F238E27FC236}">
+                <a16:creationId xmlns:a16="http://schemas.microsoft.com/office/drawing/2014/main" id="{28F5108C-D012-523D-8166-985DABF120DB}"/>
+              </a:ext>
+            </a:extLst>
+          </p:cNvPr>
+          <p:cNvSpPr/>
+          <p:nvPr/>
+        </p:nvSpPr>
+        <p:spPr>
+          <a:xfrm>
+            <a:off x="9167301" y="3033608"/>
+            <a:ext cx="1054184" cy="541851"/>
+          </a:xfrm>
+          <a:prstGeom prst="roundRect">
+            <a:avLst/>
+          </a:prstGeom>
+          <a:solidFill>
+            <a:schemeClr val="bg1"/>
+          </a:solidFill>
+        </p:spPr>
+        <p:style>
+          <a:lnRef idx="2">
+            <a:schemeClr val="accent1">
+              <a:shade val="15000"/>
+            </a:schemeClr>
+          </a:lnRef>
+          <a:fillRef idx="1">
+            <a:schemeClr val="accent1"/>
+          </a:fillRef>
+          <a:effectRef idx="0">
+            <a:schemeClr val="accent1"/>
+          </a:effectRef>
+          <a:fontRef idx="minor">
+            <a:schemeClr val="lt1"/>
+          </a:fontRef>
+        </p:style>
+        <p:txBody>
+          <a:bodyPr rtlCol="0" anchor="ctr"/>
+          <a:lstStyle/>
+          <a:p>
+            <a:pPr algn="ctr"/>
+            <a:r>
+              <a:rPr lang="en-US" sz="1000" dirty="0">
+                <a:solidFill>
+                  <a:schemeClr val="tx1"/>
+                </a:solidFill>
+              </a:rPr>
+              <a:t>Coke oven gas distribution</a:t>
+            </a:r>
+          </a:p>
+        </p:txBody>
+      </p:sp>
+      <p:sp>
+        <p:nvSpPr>
+          <p:cNvPr id="35" name="Rounded Rectangle 34">
+            <a:extLst>
+              <a:ext uri="{FF2B5EF4-FFF2-40B4-BE49-F238E27FC236}">
+                <a16:creationId xmlns:a16="http://schemas.microsoft.com/office/drawing/2014/main" id="{D8A04068-65CF-9F16-FBAF-7F487330BE33}"/>
+              </a:ext>
+            </a:extLst>
+          </p:cNvPr>
+          <p:cNvSpPr/>
+          <p:nvPr/>
+        </p:nvSpPr>
+        <p:spPr>
+          <a:xfrm>
+            <a:off x="7653466" y="2321554"/>
+            <a:ext cx="588492" cy="541851"/>
+          </a:xfrm>
+          <a:prstGeom prst="roundRect">
+            <a:avLst/>
+          </a:prstGeom>
+          <a:solidFill>
+            <a:schemeClr val="bg1"/>
+          </a:solidFill>
+        </p:spPr>
+        <p:style>
+          <a:lnRef idx="2">
+            <a:schemeClr val="accent1">
+              <a:shade val="15000"/>
+            </a:schemeClr>
+          </a:lnRef>
+          <a:fillRef idx="1">
+            <a:schemeClr val="accent1"/>
+          </a:fillRef>
+          <a:effectRef idx="0">
+            <a:schemeClr val="accent1"/>
+          </a:effectRef>
+          <a:fontRef idx="minor">
+            <a:schemeClr val="lt1"/>
+          </a:fontRef>
+        </p:style>
+        <p:txBody>
+          <a:bodyPr rtlCol="0" anchor="ctr"/>
+          <a:lstStyle/>
+          <a:p>
+            <a:pPr algn="ctr"/>
+            <a:r>
+              <a:rPr lang="en-US" sz="1000" dirty="0">
+                <a:solidFill>
+                  <a:schemeClr val="tx1"/>
+                </a:solidFill>
+              </a:rPr>
+              <a:t>Mixer</a:t>
+            </a:r>
+          </a:p>
+        </p:txBody>
+      </p:sp>
+      <p:sp>
+        <p:nvSpPr>
+          <p:cNvPr id="36" name="Rounded Rectangle 35">
+            <a:extLst>
+              <a:ext uri="{FF2B5EF4-FFF2-40B4-BE49-F238E27FC236}">
+                <a16:creationId xmlns:a16="http://schemas.microsoft.com/office/drawing/2014/main" id="{B347712F-3101-BA64-B3A6-3CFB1B53A11A}"/>
+              </a:ext>
+            </a:extLst>
+          </p:cNvPr>
+          <p:cNvSpPr/>
+          <p:nvPr/>
+        </p:nvSpPr>
+        <p:spPr>
+          <a:xfrm>
+            <a:off x="9167302" y="2321554"/>
+            <a:ext cx="1054184" cy="541851"/>
+          </a:xfrm>
+          <a:prstGeom prst="roundRect">
+            <a:avLst/>
+          </a:prstGeom>
+          <a:solidFill>
+            <a:schemeClr val="bg1"/>
+          </a:solidFill>
+        </p:spPr>
+        <p:style>
+          <a:lnRef idx="2">
+            <a:schemeClr val="accent1">
+              <a:shade val="15000"/>
+            </a:schemeClr>
+          </a:lnRef>
+          <a:fillRef idx="1">
+            <a:schemeClr val="accent1"/>
+          </a:fillRef>
+          <a:effectRef idx="0">
+            <a:schemeClr val="accent1"/>
+          </a:effectRef>
+          <a:fontRef idx="minor">
+            <a:schemeClr val="lt1"/>
+          </a:fontRef>
+        </p:style>
+        <p:txBody>
+          <a:bodyPr rtlCol="0" anchor="ctr"/>
+          <a:lstStyle/>
+          <a:p>
+            <a:pPr algn="ctr"/>
+            <a:r>
+              <a:rPr lang="en-US" sz="1000" dirty="0">
+                <a:solidFill>
+                  <a:schemeClr val="tx1"/>
+                </a:solidFill>
+              </a:rPr>
+              <a:t>Blast furnace</a:t>
+            </a:r>
+          </a:p>
+        </p:txBody>
+      </p:sp>
+      <p:sp>
+        <p:nvSpPr>
+          <p:cNvPr id="115" name="Rounded Rectangle 114">
+            <a:extLst>
+              <a:ext uri="{FF2B5EF4-FFF2-40B4-BE49-F238E27FC236}">
+                <a16:creationId xmlns:a16="http://schemas.microsoft.com/office/drawing/2014/main" id="{E5922765-1E82-70B3-701A-53D6B3BDF606}"/>
+              </a:ext>
+            </a:extLst>
+          </p:cNvPr>
+          <p:cNvSpPr/>
+          <p:nvPr/>
+        </p:nvSpPr>
+        <p:spPr>
+          <a:xfrm>
+            <a:off x="10747295" y="2321554"/>
+            <a:ext cx="730591" cy="541851"/>
+          </a:xfrm>
+          <a:prstGeom prst="roundRect">
+            <a:avLst/>
+          </a:prstGeom>
+          <a:solidFill>
+            <a:schemeClr val="bg1"/>
+          </a:solidFill>
+        </p:spPr>
+        <p:style>
+          <a:lnRef idx="2">
+            <a:schemeClr val="accent1">
+              <a:shade val="15000"/>
+            </a:schemeClr>
+          </a:lnRef>
+          <a:fillRef idx="1">
+            <a:schemeClr val="accent1"/>
+          </a:fillRef>
+          <a:effectRef idx="0">
+            <a:schemeClr val="accent1"/>
+          </a:effectRef>
+          <a:fontRef idx="minor">
+            <a:schemeClr val="lt1"/>
+          </a:fontRef>
+        </p:style>
+        <p:txBody>
+          <a:bodyPr rtlCol="0" anchor="ctr"/>
+          <a:lstStyle/>
+          <a:p>
+            <a:pPr algn="ctr"/>
+            <a:r>
+              <a:rPr lang="en-US" sz="1000" dirty="0">
+                <a:solidFill>
+                  <a:schemeClr val="tx1"/>
+                </a:solidFill>
+              </a:rPr>
+              <a:t>Iron and steel</a:t>
+            </a:r>
+          </a:p>
+        </p:txBody>
+      </p:sp>
+      <p:sp>
+        <p:nvSpPr>
+          <p:cNvPr id="157" name="Rounded Rectangle 156">
+            <a:extLst>
+              <a:ext uri="{FF2B5EF4-FFF2-40B4-BE49-F238E27FC236}">
+                <a16:creationId xmlns:a16="http://schemas.microsoft.com/office/drawing/2014/main" id="{A4E0EAE9-CDD8-463F-1029-251EF614BD7C}"/>
+              </a:ext>
+            </a:extLst>
+          </p:cNvPr>
+          <p:cNvSpPr/>
+          <p:nvPr/>
+        </p:nvSpPr>
+        <p:spPr>
+          <a:xfrm>
+            <a:off x="779342" y="593940"/>
+            <a:ext cx="1009181" cy="541851"/>
+          </a:xfrm>
+          <a:prstGeom prst="roundRect">
+            <a:avLst/>
+          </a:prstGeom>
+          <a:solidFill>
+            <a:schemeClr val="bg1"/>
+          </a:solidFill>
+        </p:spPr>
+        <p:style>
+          <a:lnRef idx="2">
+            <a:schemeClr val="accent1">
+              <a:shade val="15000"/>
+            </a:schemeClr>
+          </a:lnRef>
+          <a:fillRef idx="1">
+            <a:schemeClr val="accent1"/>
+          </a:fillRef>
+          <a:effectRef idx="0">
+            <a:schemeClr val="accent1"/>
+          </a:effectRef>
+          <a:fontRef idx="minor">
+            <a:schemeClr val="lt1"/>
+          </a:fontRef>
+        </p:style>
+        <p:txBody>
+          <a:bodyPr rtlCol="0" anchor="ctr"/>
+          <a:lstStyle/>
+          <a:p>
+            <a:pPr algn="ctr"/>
+            <a:r>
+              <a:rPr lang="en-US" sz="1000" dirty="0">
+                <a:solidFill>
+                  <a:schemeClr val="tx1"/>
+                </a:solidFill>
+              </a:rPr>
+              <a:t>Supply</a:t>
+            </a:r>
+          </a:p>
+          <a:p>
+            <a:pPr algn="ctr"/>
+            <a:r>
+              <a:rPr lang="en-US" sz="1000" dirty="0">
+                <a:solidFill>
+                  <a:schemeClr val="tx1"/>
+                </a:solidFill>
+              </a:rPr>
+              <a:t>[of Electricity]</a:t>
+            </a:r>
+          </a:p>
+        </p:txBody>
+      </p:sp>
+      <p:sp>
+        <p:nvSpPr>
+          <p:cNvPr id="198" name="Rounded Rectangle 197">
+            <a:extLst>
+              <a:ext uri="{FF2B5EF4-FFF2-40B4-BE49-F238E27FC236}">
+                <a16:creationId xmlns:a16="http://schemas.microsoft.com/office/drawing/2014/main" id="{E3761CC4-E792-1411-91C8-4C5AC6839671}"/>
+              </a:ext>
+            </a:extLst>
+          </p:cNvPr>
+          <p:cNvSpPr/>
+          <p:nvPr/>
+        </p:nvSpPr>
+        <p:spPr>
+          <a:xfrm>
+            <a:off x="914400" y="5685946"/>
+            <a:ext cx="874123" cy="541851"/>
+          </a:xfrm>
+          <a:prstGeom prst="roundRect">
+            <a:avLst/>
+          </a:prstGeom>
+          <a:solidFill>
+            <a:schemeClr val="bg1"/>
+          </a:solidFill>
+        </p:spPr>
+        <p:style>
+          <a:lnRef idx="2">
+            <a:schemeClr val="accent1">
+              <a:shade val="15000"/>
+            </a:schemeClr>
+          </a:lnRef>
+          <a:fillRef idx="1">
+            <a:schemeClr val="accent1"/>
+          </a:fillRef>
+          <a:effectRef idx="0">
+            <a:schemeClr val="accent1"/>
+          </a:effectRef>
+          <a:fontRef idx="minor">
+            <a:schemeClr val="lt1"/>
+          </a:fontRef>
+        </p:style>
+        <p:txBody>
+          <a:bodyPr rtlCol="0" anchor="ctr"/>
+          <a:lstStyle/>
+          <a:p>
+            <a:pPr algn="ctr"/>
+            <a:r>
+              <a:rPr lang="en-US" sz="1000" dirty="0">
+                <a:solidFill>
+                  <a:schemeClr val="tx1"/>
+                </a:solidFill>
+              </a:rPr>
+              <a:t>Supply</a:t>
+            </a:r>
+          </a:p>
+          <a:p>
+            <a:pPr algn="ctr"/>
+            <a:r>
+              <a:rPr lang="en-US" sz="1000" dirty="0">
+                <a:solidFill>
+                  <a:schemeClr val="tx1"/>
+                </a:solidFill>
+              </a:rPr>
+              <a:t>[of Fuel oil]</a:t>
+            </a:r>
+          </a:p>
+        </p:txBody>
+      </p:sp>
+      <p:cxnSp>
+        <p:nvCxnSpPr>
+          <p:cNvPr id="217" name="Straight Arrow Connector 216">
+            <a:extLst>
+              <a:ext uri="{FF2B5EF4-FFF2-40B4-BE49-F238E27FC236}">
+                <a16:creationId xmlns:a16="http://schemas.microsoft.com/office/drawing/2014/main" id="{25A0FF63-B260-2E3E-0250-D4444DCD5F58}"/>
+              </a:ext>
+            </a:extLst>
+          </p:cNvPr>
+          <p:cNvCxnSpPr>
+            <a:cxnSpLocks/>
+            <a:stCxn id="21" idx="3"/>
+            <a:endCxn id="16" idx="1"/>
+          </p:cNvCxnSpPr>
+          <p:nvPr/>
+        </p:nvCxnSpPr>
+        <p:spPr>
+          <a:xfrm>
+            <a:off x="1788523" y="2592480"/>
+            <a:ext cx="333631" cy="0"/>
+          </a:xfrm>
+          <a:prstGeom prst="straightConnector1">
+            <a:avLst/>
+          </a:prstGeom>
+          <a:ln>
+            <a:solidFill>
+              <a:srgbClr val="EDE995"/>
+            </a:solidFill>
+            <a:tailEnd type="triangle"/>
+          </a:ln>
+        </p:spPr>
+        <p:style>
+          <a:lnRef idx="2">
+            <a:schemeClr val="accent1"/>
+          </a:lnRef>
+          <a:fillRef idx="0">
+            <a:schemeClr val="accent1"/>
+          </a:fillRef>
+          <a:effectRef idx="1">
+            <a:schemeClr val="accent1"/>
+          </a:effectRef>
+          <a:fontRef idx="minor">
+            <a:schemeClr val="tx1"/>
+          </a:fontRef>
+        </p:style>
+      </p:cxnSp>
+      <p:cxnSp>
+        <p:nvCxnSpPr>
+          <p:cNvPr id="220" name="Straight Arrow Connector 219">
+            <a:extLst>
+              <a:ext uri="{FF2B5EF4-FFF2-40B4-BE49-F238E27FC236}">
+                <a16:creationId xmlns:a16="http://schemas.microsoft.com/office/drawing/2014/main" id="{C50BBADB-8F87-4DDB-3A0A-4D21AED70AA3}"/>
+              </a:ext>
+            </a:extLst>
+          </p:cNvPr>
+          <p:cNvCxnSpPr>
+            <a:cxnSpLocks/>
+            <a:stCxn id="4" idx="3"/>
+            <a:endCxn id="19" idx="1"/>
+          </p:cNvCxnSpPr>
+          <p:nvPr/>
+        </p:nvCxnSpPr>
+        <p:spPr>
+          <a:xfrm>
+            <a:off x="1788523" y="3304534"/>
+            <a:ext cx="319834" cy="0"/>
+          </a:xfrm>
+          <a:prstGeom prst="straightConnector1">
+            <a:avLst/>
+          </a:prstGeom>
+          <a:ln>
+            <a:solidFill>
+              <a:schemeClr val="tx1"/>
+            </a:solidFill>
+            <a:tailEnd type="triangle"/>
+          </a:ln>
+        </p:spPr>
+        <p:style>
+          <a:lnRef idx="2">
+            <a:schemeClr val="accent1"/>
+          </a:lnRef>
+          <a:fillRef idx="0">
+            <a:schemeClr val="accent1"/>
+          </a:fillRef>
+          <a:effectRef idx="1">
+            <a:schemeClr val="accent1"/>
+          </a:effectRef>
+          <a:fontRef idx="minor">
+            <a:schemeClr val="tx1"/>
+          </a:fontRef>
+        </p:style>
+      </p:cxnSp>
+      <p:sp>
+        <p:nvSpPr>
+          <p:cNvPr id="225" name="TextBox 224">
+            <a:extLst>
+              <a:ext uri="{FF2B5EF4-FFF2-40B4-BE49-F238E27FC236}">
+                <a16:creationId xmlns:a16="http://schemas.microsoft.com/office/drawing/2014/main" id="{2E18131F-9031-532A-4047-B56A1D535C7E}"/>
+              </a:ext>
+            </a:extLst>
+          </p:cNvPr>
+          <p:cNvSpPr txBox="1"/>
+          <p:nvPr/>
+        </p:nvSpPr>
+        <p:spPr>
+          <a:xfrm rot="628617">
+            <a:off x="6056123" y="1842469"/>
+            <a:ext cx="609461" cy="400110"/>
+          </a:xfrm>
+          <a:prstGeom prst="rect">
+            <a:avLst/>
+          </a:prstGeom>
+          <a:noFill/>
+        </p:spPr>
+        <p:txBody>
+          <a:bodyPr wrap="none" rtlCol="0">
+            <a:spAutoFit/>
+          </a:bodyPr>
+          <a:lstStyle/>
+          <a:p>
+            <a:pPr algn="ctr"/>
+            <a:r>
+              <a:rPr lang="en-US" sz="1000" dirty="0"/>
+              <a:t>Iron ore</a:t>
+            </a:r>
+          </a:p>
+          <a:p>
+            <a:pPr algn="ctr"/>
+            <a:r>
+              <a:rPr lang="en-US" sz="1000" dirty="0"/>
+              <a:t>1000 kg</a:t>
+            </a:r>
+          </a:p>
+        </p:txBody>
+      </p:sp>
+    </p:spTree>
+    <p:extLst>
+      <p:ext uri="{BB962C8B-B14F-4D97-AF65-F5344CB8AC3E}">
+        <p14:creationId xmlns:p14="http://schemas.microsoft.com/office/powerpoint/2010/main" val="2378191584"/>
+      </p:ext>
+    </p:extLst>
+  </p:cSld>
+  <p:clrMapOvr>
+    <a:masterClrMapping/>
+  </p:clrMapOvr>
+</p:sld>
+</file>
+
 <file path=ppt/theme/theme1.xml><?xml version="1.0" encoding="utf-8"?>
 <a:theme xmlns:a="http://schemas.openxmlformats.org/drawingml/2006/main" name="Office Theme">
   <a:themeElements>

</xml_diff>

<commit_message>
Added start of new fig
</commit_message>
<xml_diff>
--- a/images/BXCC_figs.pptx
+++ b/images/BXCC_figs.pptx
@@ -10,6 +10,7 @@
     <p:sldId id="258" r:id="rId4"/>
     <p:sldId id="259" r:id="rId5"/>
     <p:sldId id="261" r:id="rId6"/>
+    <p:sldId id="262" r:id="rId7"/>
   </p:sldIdLst>
   <p:sldSz cx="12192000" cy="6858000"/>
   <p:notesSz cx="6858000" cy="9144000"/>
@@ -263,7 +264,7 @@
           <a:p>
             <a:fld id="{42C5692D-4EAB-6146-AB82-22160C9836E7}" type="datetimeFigureOut">
               <a:rPr lang="en-US" smtClean="0"/>
-              <a:t>8/5/25</a:t>
+              <a:t>8/11/25</a:t>
             </a:fld>
             <a:endParaRPr lang="en-US"/>
           </a:p>
@@ -461,7 +462,7 @@
           <a:p>
             <a:fld id="{42C5692D-4EAB-6146-AB82-22160C9836E7}" type="datetimeFigureOut">
               <a:rPr lang="en-US" smtClean="0"/>
-              <a:t>8/5/25</a:t>
+              <a:t>8/11/25</a:t>
             </a:fld>
             <a:endParaRPr lang="en-US"/>
           </a:p>
@@ -669,7 +670,7 @@
           <a:p>
             <a:fld id="{42C5692D-4EAB-6146-AB82-22160C9836E7}" type="datetimeFigureOut">
               <a:rPr lang="en-US" smtClean="0"/>
-              <a:t>8/5/25</a:t>
+              <a:t>8/11/25</a:t>
             </a:fld>
             <a:endParaRPr lang="en-US"/>
           </a:p>
@@ -867,7 +868,7 @@
           <a:p>
             <a:fld id="{42C5692D-4EAB-6146-AB82-22160C9836E7}" type="datetimeFigureOut">
               <a:rPr lang="en-US" smtClean="0"/>
-              <a:t>8/5/25</a:t>
+              <a:t>8/11/25</a:t>
             </a:fld>
             <a:endParaRPr lang="en-US"/>
           </a:p>
@@ -1142,7 +1143,7 @@
           <a:p>
             <a:fld id="{42C5692D-4EAB-6146-AB82-22160C9836E7}" type="datetimeFigureOut">
               <a:rPr lang="en-US" smtClean="0"/>
-              <a:t>8/5/25</a:t>
+              <a:t>8/11/25</a:t>
             </a:fld>
             <a:endParaRPr lang="en-US"/>
           </a:p>
@@ -1407,7 +1408,7 @@
           <a:p>
             <a:fld id="{42C5692D-4EAB-6146-AB82-22160C9836E7}" type="datetimeFigureOut">
               <a:rPr lang="en-US" smtClean="0"/>
-              <a:t>8/5/25</a:t>
+              <a:t>8/11/25</a:t>
             </a:fld>
             <a:endParaRPr lang="en-US"/>
           </a:p>
@@ -1819,7 +1820,7 @@
           <a:p>
             <a:fld id="{42C5692D-4EAB-6146-AB82-22160C9836E7}" type="datetimeFigureOut">
               <a:rPr lang="en-US" smtClean="0"/>
-              <a:t>8/5/25</a:t>
+              <a:t>8/11/25</a:t>
             </a:fld>
             <a:endParaRPr lang="en-US"/>
           </a:p>
@@ -1960,7 +1961,7 @@
           <a:p>
             <a:fld id="{42C5692D-4EAB-6146-AB82-22160C9836E7}" type="datetimeFigureOut">
               <a:rPr lang="en-US" smtClean="0"/>
-              <a:t>8/5/25</a:t>
+              <a:t>8/11/25</a:t>
             </a:fld>
             <a:endParaRPr lang="en-US"/>
           </a:p>
@@ -2073,7 +2074,7 @@
           <a:p>
             <a:fld id="{42C5692D-4EAB-6146-AB82-22160C9836E7}" type="datetimeFigureOut">
               <a:rPr lang="en-US" smtClean="0"/>
-              <a:t>8/5/25</a:t>
+              <a:t>8/11/25</a:t>
             </a:fld>
             <a:endParaRPr lang="en-US"/>
           </a:p>
@@ -2384,7 +2385,7 @@
           <a:p>
             <a:fld id="{42C5692D-4EAB-6146-AB82-22160C9836E7}" type="datetimeFigureOut">
               <a:rPr lang="en-US" smtClean="0"/>
-              <a:t>8/5/25</a:t>
+              <a:t>8/11/25</a:t>
             </a:fld>
             <a:endParaRPr lang="en-US"/>
           </a:p>
@@ -2672,7 +2673,7 @@
           <a:p>
             <a:fld id="{42C5692D-4EAB-6146-AB82-22160C9836E7}" type="datetimeFigureOut">
               <a:rPr lang="en-US" smtClean="0"/>
-              <a:t>8/5/25</a:t>
+              <a:t>8/11/25</a:t>
             </a:fld>
             <a:endParaRPr lang="en-US"/>
           </a:p>
@@ -2913,7 +2914,7 @@
           <a:p>
             <a:fld id="{42C5692D-4EAB-6146-AB82-22160C9836E7}" type="datetimeFigureOut">
               <a:rPr lang="en-US" smtClean="0"/>
-              <a:t>8/5/25</a:t>
+              <a:t>8/11/25</a:t>
             </a:fld>
             <a:endParaRPr lang="en-US"/>
           </a:p>
@@ -13960,6 +13961,137 @@
 </p:sld>
 </file>
 
+<file path=ppt/slides/slide6.xml><?xml version="1.0" encoding="utf-8"?>
+<p:sld xmlns:a="http://schemas.openxmlformats.org/drawingml/2006/main" xmlns:r="http://schemas.openxmlformats.org/officeDocument/2006/relationships" xmlns:p="http://schemas.openxmlformats.org/presentationml/2006/main">
+  <p:cSld>
+    <p:spTree>
+      <p:nvGrpSpPr>
+        <p:cNvPr id="1" name="">
+          <a:extLst>
+            <a:ext uri="{FF2B5EF4-FFF2-40B4-BE49-F238E27FC236}">
+              <a16:creationId xmlns:a16="http://schemas.microsoft.com/office/drawing/2014/main" id="{502B83F1-0107-E4FC-F354-73B6B0DAC43C}"/>
+            </a:ext>
+          </a:extLst>
+        </p:cNvPr>
+        <p:cNvGrpSpPr/>
+        <p:nvPr/>
+      </p:nvGrpSpPr>
+      <p:grpSpPr>
+        <a:xfrm>
+          <a:off x="0" y="0"/>
+          <a:ext cx="0" cy="0"/>
+          <a:chOff x="0" y="0"/>
+          <a:chExt cx="0" cy="0"/>
+        </a:xfrm>
+      </p:grpSpPr>
+      <p:sp>
+        <p:nvSpPr>
+          <p:cNvPr id="198" name="Rounded Rectangle 197">
+            <a:extLst>
+              <a:ext uri="{FF2B5EF4-FFF2-40B4-BE49-F238E27FC236}">
+                <a16:creationId xmlns:a16="http://schemas.microsoft.com/office/drawing/2014/main" id="{8CFCAA64-4B13-6874-8210-38BB614E2DE2}"/>
+              </a:ext>
+            </a:extLst>
+          </p:cNvPr>
+          <p:cNvSpPr/>
+          <p:nvPr/>
+        </p:nvSpPr>
+        <p:spPr>
+          <a:xfrm>
+            <a:off x="4640826" y="2952578"/>
+            <a:ext cx="874123" cy="541851"/>
+          </a:xfrm>
+          <a:prstGeom prst="roundRect">
+            <a:avLst/>
+          </a:prstGeom>
+          <a:solidFill>
+            <a:schemeClr val="bg1"/>
+          </a:solidFill>
+        </p:spPr>
+        <p:style>
+          <a:lnRef idx="2">
+            <a:schemeClr val="accent1">
+              <a:shade val="15000"/>
+            </a:schemeClr>
+          </a:lnRef>
+          <a:fillRef idx="1">
+            <a:schemeClr val="accent1"/>
+          </a:fillRef>
+          <a:effectRef idx="0">
+            <a:schemeClr val="accent1"/>
+          </a:effectRef>
+          <a:fontRef idx="minor">
+            <a:schemeClr val="lt1"/>
+          </a:fontRef>
+        </p:style>
+        <p:txBody>
+          <a:bodyPr rtlCol="0" anchor="ctr"/>
+          <a:lstStyle/>
+          <a:p>
+            <a:pPr algn="ctr"/>
+            <a:endParaRPr lang="en-US" sz="1000" dirty="0">
+              <a:solidFill>
+                <a:schemeClr val="tx1"/>
+              </a:solidFill>
+            </a:endParaRPr>
+          </a:p>
+        </p:txBody>
+      </p:sp>
+      <p:cxnSp>
+        <p:nvCxnSpPr>
+          <p:cNvPr id="5" name="Straight Arrow Connector 4">
+            <a:extLst>
+              <a:ext uri="{FF2B5EF4-FFF2-40B4-BE49-F238E27FC236}">
+                <a16:creationId xmlns:a16="http://schemas.microsoft.com/office/drawing/2014/main" id="{A310E1AF-42E1-8AEF-91C0-7F8E43A08F43}"/>
+              </a:ext>
+            </a:extLst>
+          </p:cNvPr>
+          <p:cNvCxnSpPr>
+            <a:cxnSpLocks/>
+            <a:endCxn id="198" idx="1"/>
+          </p:cNvCxnSpPr>
+          <p:nvPr/>
+        </p:nvCxnSpPr>
+        <p:spPr>
+          <a:xfrm>
+            <a:off x="3519948" y="3223504"/>
+            <a:ext cx="1120878" cy="0"/>
+          </a:xfrm>
+          <a:prstGeom prst="straightConnector1">
+            <a:avLst/>
+          </a:prstGeom>
+          <a:ln>
+            <a:tailEnd type="triangle"/>
+          </a:ln>
+        </p:spPr>
+        <p:style>
+          <a:lnRef idx="2">
+            <a:schemeClr val="accent1"/>
+          </a:lnRef>
+          <a:fillRef idx="0">
+            <a:schemeClr val="accent1"/>
+          </a:fillRef>
+          <a:effectRef idx="1">
+            <a:schemeClr val="accent1"/>
+          </a:effectRef>
+          <a:fontRef idx="minor">
+            <a:schemeClr val="tx1"/>
+          </a:fontRef>
+        </p:style>
+      </p:cxnSp>
+    </p:spTree>
+    <p:extLst>
+      <p:ext uri="{BB962C8B-B14F-4D97-AF65-F5344CB8AC3E}">
+        <p14:creationId xmlns:p14="http://schemas.microsoft.com/office/powerpoint/2010/main" val="3294312316"/>
+      </p:ext>
+    </p:extLst>
+  </p:cSld>
+  <p:clrMapOvr>
+    <a:masterClrMapping/>
+  </p:clrMapOvr>
+</p:sld>
+</file>
+
 <file path=ppt/theme/theme1.xml><?xml version="1.0" encoding="utf-8"?>
 <a:theme xmlns:a="http://schemas.openxmlformats.org/drawingml/2006/main" name="Office Theme">
   <a:themeElements>

</xml_diff>

<commit_message>
Q loss in MCC
</commit_message>
<xml_diff>
--- a/images/BXCC_figs.pptx
+++ b/images/BXCC_figs.pptx
@@ -264,7 +264,7 @@
           <a:p>
             <a:fld id="{42C5692D-4EAB-6146-AB82-22160C9836E7}" type="datetimeFigureOut">
               <a:rPr lang="en-US" smtClean="0"/>
-              <a:t>8/11/25</a:t>
+              <a:t>8/17/2025</a:t>
             </a:fld>
             <a:endParaRPr lang="en-US"/>
           </a:p>
@@ -462,7 +462,7 @@
           <a:p>
             <a:fld id="{42C5692D-4EAB-6146-AB82-22160C9836E7}" type="datetimeFigureOut">
               <a:rPr lang="en-US" smtClean="0"/>
-              <a:t>8/11/25</a:t>
+              <a:t>8/17/2025</a:t>
             </a:fld>
             <a:endParaRPr lang="en-US"/>
           </a:p>
@@ -670,7 +670,7 @@
           <a:p>
             <a:fld id="{42C5692D-4EAB-6146-AB82-22160C9836E7}" type="datetimeFigureOut">
               <a:rPr lang="en-US" smtClean="0"/>
-              <a:t>8/11/25</a:t>
+              <a:t>8/17/2025</a:t>
             </a:fld>
             <a:endParaRPr lang="en-US"/>
           </a:p>
@@ -868,7 +868,7 @@
           <a:p>
             <a:fld id="{42C5692D-4EAB-6146-AB82-22160C9836E7}" type="datetimeFigureOut">
               <a:rPr lang="en-US" smtClean="0"/>
-              <a:t>8/11/25</a:t>
+              <a:t>8/17/2025</a:t>
             </a:fld>
             <a:endParaRPr lang="en-US"/>
           </a:p>
@@ -1143,7 +1143,7 @@
           <a:p>
             <a:fld id="{42C5692D-4EAB-6146-AB82-22160C9836E7}" type="datetimeFigureOut">
               <a:rPr lang="en-US" smtClean="0"/>
-              <a:t>8/11/25</a:t>
+              <a:t>8/17/2025</a:t>
             </a:fld>
             <a:endParaRPr lang="en-US"/>
           </a:p>
@@ -1408,7 +1408,7 @@
           <a:p>
             <a:fld id="{42C5692D-4EAB-6146-AB82-22160C9836E7}" type="datetimeFigureOut">
               <a:rPr lang="en-US" smtClean="0"/>
-              <a:t>8/11/25</a:t>
+              <a:t>8/17/2025</a:t>
             </a:fld>
             <a:endParaRPr lang="en-US"/>
           </a:p>
@@ -1820,7 +1820,7 @@
           <a:p>
             <a:fld id="{42C5692D-4EAB-6146-AB82-22160C9836E7}" type="datetimeFigureOut">
               <a:rPr lang="en-US" smtClean="0"/>
-              <a:t>8/11/25</a:t>
+              <a:t>8/17/2025</a:t>
             </a:fld>
             <a:endParaRPr lang="en-US"/>
           </a:p>
@@ -1961,7 +1961,7 @@
           <a:p>
             <a:fld id="{42C5692D-4EAB-6146-AB82-22160C9836E7}" type="datetimeFigureOut">
               <a:rPr lang="en-US" smtClean="0"/>
-              <a:t>8/11/25</a:t>
+              <a:t>8/17/2025</a:t>
             </a:fld>
             <a:endParaRPr lang="en-US"/>
           </a:p>
@@ -2074,7 +2074,7 @@
           <a:p>
             <a:fld id="{42C5692D-4EAB-6146-AB82-22160C9836E7}" type="datetimeFigureOut">
               <a:rPr lang="en-US" smtClean="0"/>
-              <a:t>8/11/25</a:t>
+              <a:t>8/17/2025</a:t>
             </a:fld>
             <a:endParaRPr lang="en-US"/>
           </a:p>
@@ -2385,7 +2385,7 @@
           <a:p>
             <a:fld id="{42C5692D-4EAB-6146-AB82-22160C9836E7}" type="datetimeFigureOut">
               <a:rPr lang="en-US" smtClean="0"/>
-              <a:t>8/11/25</a:t>
+              <a:t>8/17/2025</a:t>
             </a:fld>
             <a:endParaRPr lang="en-US"/>
           </a:p>
@@ -2673,7 +2673,7 @@
           <a:p>
             <a:fld id="{42C5692D-4EAB-6146-AB82-22160C9836E7}" type="datetimeFigureOut">
               <a:rPr lang="en-US" smtClean="0"/>
-              <a:t>8/11/25</a:t>
+              <a:t>8/17/2025</a:t>
             </a:fld>
             <a:endParaRPr lang="en-US"/>
           </a:p>
@@ -2914,7 +2914,7 @@
           <a:p>
             <a:fld id="{42C5692D-4EAB-6146-AB82-22160C9836E7}" type="datetimeFigureOut">
               <a:rPr lang="en-US" smtClean="0"/>
-              <a:t>8/11/25</a:t>
+              <a:t>8/17/2025</a:t>
             </a:fld>
             <a:endParaRPr lang="en-US"/>
           </a:p>
@@ -13998,8 +13998,8 @@
         </p:nvSpPr>
         <p:spPr>
           <a:xfrm>
-            <a:off x="4640826" y="2952578"/>
-            <a:ext cx="874123" cy="541851"/>
+            <a:off x="4937121" y="2820213"/>
+            <a:ext cx="2317758" cy="1217573"/>
           </a:xfrm>
           <a:prstGeom prst="roundRect">
             <a:avLst/>
@@ -14054,13 +14054,16 @@
         </p:nvCxnSpPr>
         <p:spPr>
           <a:xfrm>
-            <a:off x="3519948" y="3223504"/>
-            <a:ext cx="1120878" cy="0"/>
+            <a:off x="2112264" y="3429000"/>
+            <a:ext cx="2824857" cy="0"/>
           </a:xfrm>
           <a:prstGeom prst="straightConnector1">
             <a:avLst/>
           </a:prstGeom>
           <a:ln>
+            <a:solidFill>
+              <a:schemeClr val="tx1"/>
+            </a:solidFill>
             <a:tailEnd type="triangle"/>
           </a:ln>
         </p:spPr>
@@ -14079,6 +14082,520 @@
           </a:fontRef>
         </p:style>
       </p:cxnSp>
+      <p:cxnSp>
+        <p:nvCxnSpPr>
+          <p:cNvPr id="4" name="Straight Arrow Connector 3">
+            <a:extLst>
+              <a:ext uri="{FF2B5EF4-FFF2-40B4-BE49-F238E27FC236}">
+                <a16:creationId xmlns:a16="http://schemas.microsoft.com/office/drawing/2014/main" id="{ECFC8F3E-578B-6DCA-8AED-C00E0F32B70E}"/>
+              </a:ext>
+            </a:extLst>
+          </p:cNvPr>
+          <p:cNvCxnSpPr>
+            <a:cxnSpLocks/>
+          </p:cNvCxnSpPr>
+          <p:nvPr/>
+        </p:nvCxnSpPr>
+        <p:spPr>
+          <a:xfrm>
+            <a:off x="7254879" y="3425952"/>
+            <a:ext cx="2824857" cy="0"/>
+          </a:xfrm>
+          <a:prstGeom prst="straightConnector1">
+            <a:avLst/>
+          </a:prstGeom>
+          <a:ln>
+            <a:solidFill>
+              <a:schemeClr val="tx1"/>
+            </a:solidFill>
+            <a:tailEnd type="triangle"/>
+          </a:ln>
+        </p:spPr>
+        <p:style>
+          <a:lnRef idx="2">
+            <a:schemeClr val="accent1"/>
+          </a:lnRef>
+          <a:fillRef idx="0">
+            <a:schemeClr val="accent1"/>
+          </a:fillRef>
+          <a:effectRef idx="1">
+            <a:schemeClr val="accent1"/>
+          </a:effectRef>
+          <a:fontRef idx="minor">
+            <a:schemeClr val="tx1"/>
+          </a:fontRef>
+        </p:style>
+      </p:cxnSp>
+      <p:cxnSp>
+        <p:nvCxnSpPr>
+          <p:cNvPr id="6" name="Straight Arrow Connector 5">
+            <a:extLst>
+              <a:ext uri="{FF2B5EF4-FFF2-40B4-BE49-F238E27FC236}">
+                <a16:creationId xmlns:a16="http://schemas.microsoft.com/office/drawing/2014/main" id="{AFF019BE-39F8-9634-CD74-930ED18693FD}"/>
+              </a:ext>
+            </a:extLst>
+          </p:cNvPr>
+          <p:cNvCxnSpPr>
+            <a:cxnSpLocks/>
+          </p:cNvCxnSpPr>
+          <p:nvPr/>
+        </p:nvCxnSpPr>
+        <p:spPr>
+          <a:xfrm>
+            <a:off x="6096000" y="1104189"/>
+            <a:ext cx="0" cy="1716024"/>
+          </a:xfrm>
+          <a:prstGeom prst="straightConnector1">
+            <a:avLst/>
+          </a:prstGeom>
+          <a:ln>
+            <a:solidFill>
+              <a:schemeClr val="tx1"/>
+            </a:solidFill>
+            <a:tailEnd type="triangle"/>
+          </a:ln>
+        </p:spPr>
+        <p:style>
+          <a:lnRef idx="2">
+            <a:schemeClr val="accent1"/>
+          </a:lnRef>
+          <a:fillRef idx="0">
+            <a:schemeClr val="accent1"/>
+          </a:fillRef>
+          <a:effectRef idx="1">
+            <a:schemeClr val="accent1"/>
+          </a:effectRef>
+          <a:fontRef idx="minor">
+            <a:schemeClr val="tx1"/>
+          </a:fontRef>
+        </p:style>
+      </p:cxnSp>
+      <p:cxnSp>
+        <p:nvCxnSpPr>
+          <p:cNvPr id="8" name="Straight Arrow Connector 7">
+            <a:extLst>
+              <a:ext uri="{FF2B5EF4-FFF2-40B4-BE49-F238E27FC236}">
+                <a16:creationId xmlns:a16="http://schemas.microsoft.com/office/drawing/2014/main" id="{DE555CDC-D1F7-F45D-8523-EF62FF9A5C92}"/>
+              </a:ext>
+            </a:extLst>
+          </p:cNvPr>
+          <p:cNvCxnSpPr>
+            <a:cxnSpLocks/>
+          </p:cNvCxnSpPr>
+          <p:nvPr/>
+        </p:nvCxnSpPr>
+        <p:spPr>
+          <a:xfrm>
+            <a:off x="5571105" y="4037786"/>
+            <a:ext cx="0" cy="1448614"/>
+          </a:xfrm>
+          <a:prstGeom prst="straightConnector1">
+            <a:avLst/>
+          </a:prstGeom>
+          <a:ln>
+            <a:solidFill>
+              <a:schemeClr val="tx1"/>
+            </a:solidFill>
+            <a:tailEnd type="triangle"/>
+          </a:ln>
+        </p:spPr>
+        <p:style>
+          <a:lnRef idx="2">
+            <a:schemeClr val="accent1"/>
+          </a:lnRef>
+          <a:fillRef idx="0">
+            <a:schemeClr val="accent1"/>
+          </a:fillRef>
+          <a:effectRef idx="1">
+            <a:schemeClr val="accent1"/>
+          </a:effectRef>
+          <a:fontRef idx="minor">
+            <a:schemeClr val="tx1"/>
+          </a:fontRef>
+        </p:style>
+      </p:cxnSp>
+      <p:cxnSp>
+        <p:nvCxnSpPr>
+          <p:cNvPr id="10" name="Straight Arrow Connector 9">
+            <a:extLst>
+              <a:ext uri="{FF2B5EF4-FFF2-40B4-BE49-F238E27FC236}">
+                <a16:creationId xmlns:a16="http://schemas.microsoft.com/office/drawing/2014/main" id="{0BC7FEA6-6ABD-F3D1-CC53-0A9E7A1F8046}"/>
+              </a:ext>
+            </a:extLst>
+          </p:cNvPr>
+          <p:cNvCxnSpPr>
+            <a:cxnSpLocks/>
+          </p:cNvCxnSpPr>
+          <p:nvPr/>
+        </p:nvCxnSpPr>
+        <p:spPr>
+          <a:xfrm>
+            <a:off x="6683625" y="4037786"/>
+            <a:ext cx="0" cy="1448614"/>
+          </a:xfrm>
+          <a:prstGeom prst="straightConnector1">
+            <a:avLst/>
+          </a:prstGeom>
+          <a:ln>
+            <a:solidFill>
+              <a:schemeClr val="tx1"/>
+            </a:solidFill>
+            <a:tailEnd type="triangle"/>
+          </a:ln>
+        </p:spPr>
+        <p:style>
+          <a:lnRef idx="2">
+            <a:schemeClr val="accent1"/>
+          </a:lnRef>
+          <a:fillRef idx="0">
+            <a:schemeClr val="accent1"/>
+          </a:fillRef>
+          <a:effectRef idx="1">
+            <a:schemeClr val="accent1"/>
+          </a:effectRef>
+          <a:fontRef idx="minor">
+            <a:schemeClr val="tx1"/>
+          </a:fontRef>
+        </p:style>
+      </p:cxnSp>
+      <p:sp>
+        <p:nvSpPr>
+          <p:cNvPr id="11" name="TextBox 10">
+            <a:extLst>
+              <a:ext uri="{FF2B5EF4-FFF2-40B4-BE49-F238E27FC236}">
+                <a16:creationId xmlns:a16="http://schemas.microsoft.com/office/drawing/2014/main" id="{2D732CDD-5901-E27C-9C27-73E8020918B8}"/>
+              </a:ext>
+            </a:extLst>
+          </p:cNvPr>
+          <p:cNvSpPr txBox="1"/>
+          <p:nvPr/>
+        </p:nvSpPr>
+        <p:spPr>
+          <a:xfrm>
+            <a:off x="3373849" y="3179731"/>
+            <a:ext cx="301686" cy="323165"/>
+          </a:xfrm>
+          <a:prstGeom prst="rect">
+            <a:avLst/>
+          </a:prstGeom>
+          <a:noFill/>
+        </p:spPr>
+        <p:txBody>
+          <a:bodyPr wrap="none" rtlCol="0">
+            <a:spAutoFit/>
+          </a:bodyPr>
+          <a:lstStyle/>
+          <a:p>
+            <a:pPr algn="ctr"/>
+            <a:r>
+              <a:rPr lang="en-US" sz="1500" dirty="0"/>
+              <a:t>R</a:t>
+            </a:r>
+          </a:p>
+        </p:txBody>
+      </p:sp>
+      <p:sp>
+        <p:nvSpPr>
+          <p:cNvPr id="12" name="TextBox 11">
+            <a:extLst>
+              <a:ext uri="{FF2B5EF4-FFF2-40B4-BE49-F238E27FC236}">
+                <a16:creationId xmlns:a16="http://schemas.microsoft.com/office/drawing/2014/main" id="{FA31C80C-F5B5-EC26-D879-FFE8780DDDBB}"/>
+              </a:ext>
+            </a:extLst>
+          </p:cNvPr>
+          <p:cNvSpPr txBox="1"/>
+          <p:nvPr/>
+        </p:nvSpPr>
+        <p:spPr>
+          <a:xfrm>
+            <a:off x="8519670" y="3179730"/>
+            <a:ext cx="295274" cy="323165"/>
+          </a:xfrm>
+          <a:prstGeom prst="rect">
+            <a:avLst/>
+          </a:prstGeom>
+          <a:noFill/>
+        </p:spPr>
+        <p:txBody>
+          <a:bodyPr wrap="none" rtlCol="0">
+            <a:spAutoFit/>
+          </a:bodyPr>
+          <a:lstStyle/>
+          <a:p>
+            <a:pPr algn="ctr"/>
+            <a:r>
+              <a:rPr lang="en-US" sz="1500" dirty="0"/>
+              <a:t>P</a:t>
+            </a:r>
+          </a:p>
+        </p:txBody>
+      </p:sp>
+      <p:sp>
+        <p:nvSpPr>
+          <p:cNvPr id="13" name="TextBox 12">
+            <a:extLst>
+              <a:ext uri="{FF2B5EF4-FFF2-40B4-BE49-F238E27FC236}">
+                <a16:creationId xmlns:a16="http://schemas.microsoft.com/office/drawing/2014/main" id="{71A50411-A646-98BE-BECF-56F33221981A}"/>
+              </a:ext>
+            </a:extLst>
+          </p:cNvPr>
+          <p:cNvSpPr txBox="1"/>
+          <p:nvPr/>
+        </p:nvSpPr>
+        <p:spPr>
+          <a:xfrm>
+            <a:off x="5802329" y="1769325"/>
+            <a:ext cx="292068" cy="323165"/>
+          </a:xfrm>
+          <a:prstGeom prst="rect">
+            <a:avLst/>
+          </a:prstGeom>
+          <a:noFill/>
+        </p:spPr>
+        <p:txBody>
+          <a:bodyPr wrap="none" rtlCol="0">
+            <a:spAutoFit/>
+          </a:bodyPr>
+          <a:lstStyle/>
+          <a:p>
+            <a:pPr algn="ctr"/>
+            <a:r>
+              <a:rPr lang="en-US" sz="1500" dirty="0"/>
+              <a:t>E</a:t>
+            </a:r>
+          </a:p>
+        </p:txBody>
+      </p:sp>
+      <mc:AlternateContent xmlns:mc="http://schemas.openxmlformats.org/markup-compatibility/2006">
+        <mc:Choice xmlns:a14="http://schemas.microsoft.com/office/drawing/2010/main" Requires="a14">
+          <p:sp>
+            <p:nvSpPr>
+              <p:cNvPr id="14" name="TextBox 13">
+                <a:extLst>
+                  <a:ext uri="{FF2B5EF4-FFF2-40B4-BE49-F238E27FC236}">
+                    <a16:creationId xmlns:a16="http://schemas.microsoft.com/office/drawing/2014/main" id="{23AAF2DC-F493-0475-DFB2-1D7A07673157}"/>
+                  </a:ext>
+                </a:extLst>
+              </p:cNvPr>
+              <p:cNvSpPr txBox="1"/>
+              <p:nvPr/>
+            </p:nvSpPr>
+            <p:spPr>
+              <a:xfrm>
+                <a:off x="5128644" y="4616797"/>
+                <a:ext cx="515205" cy="323165"/>
+              </a:xfrm>
+              <a:prstGeom prst="rect">
+                <a:avLst/>
+              </a:prstGeom>
+              <a:noFill/>
+            </p:spPr>
+            <p:txBody>
+              <a:bodyPr wrap="none" rtlCol="0">
+                <a:spAutoFit/>
+              </a:bodyPr>
+              <a:lstStyle/>
+              <a:p>
+                <a:pPr algn="ctr"/>
+                <a14:m>
+                  <m:oMathPara xmlns:m="http://schemas.openxmlformats.org/officeDocument/2006/math">
+                    <m:oMathParaPr>
+                      <m:jc m:val="centerGroup"/>
+                    </m:oMathParaPr>
+                    <m:oMath xmlns:m="http://schemas.openxmlformats.org/officeDocument/2006/math">
+                      <m:sSub>
+                        <m:sSubPr>
+                          <m:ctrlPr>
+                            <a:rPr lang="en-US" sz="1500" i="1" smtClean="0">
+                              <a:latin typeface="Cambria Math" panose="02040503050406030204" pitchFamily="18" charset="0"/>
+                            </a:rPr>
+                          </m:ctrlPr>
+                        </m:sSubPr>
+                        <m:e>
+                          <m:r>
+                            <a:rPr lang="en-US" sz="1500" b="0" i="1" smtClean="0">
+                              <a:latin typeface="Cambria Math" panose="02040503050406030204" pitchFamily="18" charset="0"/>
+                            </a:rPr>
+                            <m:t>𝑊</m:t>
+                          </m:r>
+                        </m:e>
+                        <m:sub>
+                          <m:r>
+                            <a:rPr lang="en-US" sz="1500" b="0" i="1" smtClean="0">
+                              <a:latin typeface="Cambria Math" panose="02040503050406030204" pitchFamily="18" charset="0"/>
+                            </a:rPr>
+                            <m:t>𝑀</m:t>
+                          </m:r>
+                        </m:sub>
+                      </m:sSub>
+                    </m:oMath>
+                  </m:oMathPara>
+                </a14:m>
+                <a:endParaRPr lang="en-US" sz="1500" dirty="0"/>
+              </a:p>
+            </p:txBody>
+          </p:sp>
+        </mc:Choice>
+        <mc:Fallback>
+          <p:sp>
+            <p:nvSpPr>
+              <p:cNvPr id="14" name="TextBox 13">
+                <a:extLst>
+                  <a:ext uri="{FF2B5EF4-FFF2-40B4-BE49-F238E27FC236}">
+                    <a16:creationId xmlns:a16="http://schemas.microsoft.com/office/drawing/2014/main" id="{23AAF2DC-F493-0475-DFB2-1D7A07673157}"/>
+                  </a:ext>
+                </a:extLst>
+              </p:cNvPr>
+              <p:cNvSpPr txBox="1">
+                <a:spLocks noRot="1" noChangeAspect="1" noMove="1" noResize="1" noEditPoints="1" noAdjustHandles="1" noChangeArrowheads="1" noChangeShapeType="1" noTextEdit="1"/>
+              </p:cNvSpPr>
+              <p:nvPr/>
+            </p:nvSpPr>
+            <p:spPr>
+              <a:xfrm>
+                <a:off x="5128644" y="4616797"/>
+                <a:ext cx="515205" cy="323165"/>
+              </a:xfrm>
+              <a:prstGeom prst="rect">
+                <a:avLst/>
+              </a:prstGeom>
+              <a:blipFill>
+                <a:blip r:embed="rId2"/>
+                <a:stretch>
+                  <a:fillRect/>
+                </a:stretch>
+              </a:blipFill>
+            </p:spPr>
+            <p:txBody>
+              <a:bodyPr/>
+              <a:lstStyle/>
+              <a:p>
+                <a:r>
+                  <a:rPr lang="en-US">
+                    <a:noFill/>
+                  </a:rPr>
+                  <a:t> </a:t>
+                </a:r>
+              </a:p>
+            </p:txBody>
+          </p:sp>
+        </mc:Fallback>
+      </mc:AlternateContent>
+      <mc:AlternateContent xmlns:mc="http://schemas.openxmlformats.org/markup-compatibility/2006">
+        <mc:Choice xmlns:a14="http://schemas.microsoft.com/office/drawing/2010/main" Requires="a14">
+          <p:sp>
+            <p:nvSpPr>
+              <p:cNvPr id="15" name="TextBox 14">
+                <a:extLst>
+                  <a:ext uri="{FF2B5EF4-FFF2-40B4-BE49-F238E27FC236}">
+                    <a16:creationId xmlns:a16="http://schemas.microsoft.com/office/drawing/2014/main" id="{21A0B80C-CB57-91BD-2CA0-9610B8872478}"/>
+                  </a:ext>
+                </a:extLst>
+              </p:cNvPr>
+              <p:cNvSpPr txBox="1"/>
+              <p:nvPr/>
+            </p:nvSpPr>
+            <p:spPr>
+              <a:xfrm>
+                <a:off x="6263554" y="4600510"/>
+                <a:ext cx="489942" cy="339452"/>
+              </a:xfrm>
+              <a:prstGeom prst="rect">
+                <a:avLst/>
+              </a:prstGeom>
+              <a:noFill/>
+            </p:spPr>
+            <p:txBody>
+              <a:bodyPr wrap="none" rtlCol="0">
+                <a:spAutoFit/>
+              </a:bodyPr>
+              <a:lstStyle/>
+              <a:p>
+                <a:pPr algn="ctr"/>
+                <a14:m>
+                  <m:oMathPara xmlns:m="http://schemas.openxmlformats.org/officeDocument/2006/math">
+                    <m:oMathParaPr>
+                      <m:jc m:val="centerGroup"/>
+                    </m:oMathParaPr>
+                    <m:oMath xmlns:m="http://schemas.openxmlformats.org/officeDocument/2006/math">
+                      <m:sSub>
+                        <m:sSubPr>
+                          <m:ctrlPr>
+                            <a:rPr lang="en-US" sz="1500" i="1" smtClean="0">
+                              <a:latin typeface="Cambria Math" panose="02040503050406030204" pitchFamily="18" charset="0"/>
+                            </a:rPr>
+                          </m:ctrlPr>
+                        </m:sSubPr>
+                        <m:e>
+                          <m:r>
+                            <a:rPr lang="en-US" sz="1500" b="0" i="1" smtClean="0">
+                              <a:latin typeface="Cambria Math" panose="02040503050406030204" pitchFamily="18" charset="0"/>
+                            </a:rPr>
+                            <m:t>𝑊</m:t>
+                          </m:r>
+                        </m:e>
+                        <m:sub>
+                          <m:r>
+                            <a:rPr lang="en-US" sz="1500" b="0" i="1" smtClean="0">
+                              <a:latin typeface="Cambria Math" panose="02040503050406030204" pitchFamily="18" charset="0"/>
+                            </a:rPr>
+                            <m:t>𝑄</m:t>
+                          </m:r>
+                        </m:sub>
+                      </m:sSub>
+                    </m:oMath>
+                  </m:oMathPara>
+                </a14:m>
+                <a:endParaRPr lang="en-US" sz="1500" dirty="0"/>
+              </a:p>
+            </p:txBody>
+          </p:sp>
+        </mc:Choice>
+        <mc:Fallback>
+          <p:sp>
+            <p:nvSpPr>
+              <p:cNvPr id="15" name="TextBox 14">
+                <a:extLst>
+                  <a:ext uri="{FF2B5EF4-FFF2-40B4-BE49-F238E27FC236}">
+                    <a16:creationId xmlns:a16="http://schemas.microsoft.com/office/drawing/2014/main" id="{21A0B80C-CB57-91BD-2CA0-9610B8872478}"/>
+                  </a:ext>
+                </a:extLst>
+              </p:cNvPr>
+              <p:cNvSpPr txBox="1">
+                <a:spLocks noRot="1" noChangeAspect="1" noMove="1" noResize="1" noEditPoints="1" noAdjustHandles="1" noChangeArrowheads="1" noChangeShapeType="1" noTextEdit="1"/>
+              </p:cNvSpPr>
+              <p:nvPr/>
+            </p:nvSpPr>
+            <p:spPr>
+              <a:xfrm>
+                <a:off x="6263554" y="4600510"/>
+                <a:ext cx="489942" cy="339452"/>
+              </a:xfrm>
+              <a:prstGeom prst="rect">
+                <a:avLst/>
+              </a:prstGeom>
+              <a:blipFill>
+                <a:blip r:embed="rId3"/>
+                <a:stretch>
+                  <a:fillRect b="-3636"/>
+                </a:stretch>
+              </a:blipFill>
+            </p:spPr>
+            <p:txBody>
+              <a:bodyPr/>
+              <a:lstStyle/>
+              <a:p>
+                <a:r>
+                  <a:rPr lang="en-US">
+                    <a:noFill/>
+                  </a:rPr>
+                  <a:t> </a:t>
+                </a:r>
+              </a:p>
+            </p:txBody>
+          </p:sp>
+        </mc:Fallback>
+      </mc:AlternateContent>
     </p:spTree>
     <p:extLst>
       <p:ext uri="{BB962C8B-B14F-4D97-AF65-F5344CB8AC3E}">

</xml_diff>

<commit_message>
Example process now a .pdf diagram.
</commit_message>
<xml_diff>
--- a/images/BXCC_figs.pptx
+++ b/images/BXCC_figs.pptx
@@ -264,7 +264,7 @@
           <a:p>
             <a:fld id="{42C5692D-4EAB-6146-AB82-22160C9836E7}" type="datetimeFigureOut">
               <a:rPr lang="en-US" smtClean="0"/>
-              <a:t>8/17/2025</a:t>
+              <a:t>8/18/25</a:t>
             </a:fld>
             <a:endParaRPr lang="en-US"/>
           </a:p>
@@ -462,7 +462,7 @@
           <a:p>
             <a:fld id="{42C5692D-4EAB-6146-AB82-22160C9836E7}" type="datetimeFigureOut">
               <a:rPr lang="en-US" smtClean="0"/>
-              <a:t>8/17/2025</a:t>
+              <a:t>8/18/25</a:t>
             </a:fld>
             <a:endParaRPr lang="en-US"/>
           </a:p>
@@ -670,7 +670,7 @@
           <a:p>
             <a:fld id="{42C5692D-4EAB-6146-AB82-22160C9836E7}" type="datetimeFigureOut">
               <a:rPr lang="en-US" smtClean="0"/>
-              <a:t>8/17/2025</a:t>
+              <a:t>8/18/25</a:t>
             </a:fld>
             <a:endParaRPr lang="en-US"/>
           </a:p>
@@ -868,7 +868,7 @@
           <a:p>
             <a:fld id="{42C5692D-4EAB-6146-AB82-22160C9836E7}" type="datetimeFigureOut">
               <a:rPr lang="en-US" smtClean="0"/>
-              <a:t>8/17/2025</a:t>
+              <a:t>8/18/25</a:t>
             </a:fld>
             <a:endParaRPr lang="en-US"/>
           </a:p>
@@ -1143,7 +1143,7 @@
           <a:p>
             <a:fld id="{42C5692D-4EAB-6146-AB82-22160C9836E7}" type="datetimeFigureOut">
               <a:rPr lang="en-US" smtClean="0"/>
-              <a:t>8/17/2025</a:t>
+              <a:t>8/18/25</a:t>
             </a:fld>
             <a:endParaRPr lang="en-US"/>
           </a:p>
@@ -1408,7 +1408,7 @@
           <a:p>
             <a:fld id="{42C5692D-4EAB-6146-AB82-22160C9836E7}" type="datetimeFigureOut">
               <a:rPr lang="en-US" smtClean="0"/>
-              <a:t>8/17/2025</a:t>
+              <a:t>8/18/25</a:t>
             </a:fld>
             <a:endParaRPr lang="en-US"/>
           </a:p>
@@ -1820,7 +1820,7 @@
           <a:p>
             <a:fld id="{42C5692D-4EAB-6146-AB82-22160C9836E7}" type="datetimeFigureOut">
               <a:rPr lang="en-US" smtClean="0"/>
-              <a:t>8/17/2025</a:t>
+              <a:t>8/18/25</a:t>
             </a:fld>
             <a:endParaRPr lang="en-US"/>
           </a:p>
@@ -1961,7 +1961,7 @@
           <a:p>
             <a:fld id="{42C5692D-4EAB-6146-AB82-22160C9836E7}" type="datetimeFigureOut">
               <a:rPr lang="en-US" smtClean="0"/>
-              <a:t>8/17/2025</a:t>
+              <a:t>8/18/25</a:t>
             </a:fld>
             <a:endParaRPr lang="en-US"/>
           </a:p>
@@ -2074,7 +2074,7 @@
           <a:p>
             <a:fld id="{42C5692D-4EAB-6146-AB82-22160C9836E7}" type="datetimeFigureOut">
               <a:rPr lang="en-US" smtClean="0"/>
-              <a:t>8/17/2025</a:t>
+              <a:t>8/18/25</a:t>
             </a:fld>
             <a:endParaRPr lang="en-US"/>
           </a:p>
@@ -2385,7 +2385,7 @@
           <a:p>
             <a:fld id="{42C5692D-4EAB-6146-AB82-22160C9836E7}" type="datetimeFigureOut">
               <a:rPr lang="en-US" smtClean="0"/>
-              <a:t>8/17/2025</a:t>
+              <a:t>8/18/25</a:t>
             </a:fld>
             <a:endParaRPr lang="en-US"/>
           </a:p>
@@ -2673,7 +2673,7 @@
           <a:p>
             <a:fld id="{42C5692D-4EAB-6146-AB82-22160C9836E7}" type="datetimeFigureOut">
               <a:rPr lang="en-US" smtClean="0"/>
-              <a:t>8/17/2025</a:t>
+              <a:t>8/18/25</a:t>
             </a:fld>
             <a:endParaRPr lang="en-US"/>
           </a:p>
@@ -2914,7 +2914,7 @@
           <a:p>
             <a:fld id="{42C5692D-4EAB-6146-AB82-22160C9836E7}" type="datetimeFigureOut">
               <a:rPr lang="en-US" smtClean="0"/>
-              <a:t>8/17/2025</a:t>
+              <a:t>8/18/25</a:t>
             </a:fld>
             <a:endParaRPr lang="en-US"/>
           </a:p>
@@ -14039,55 +14039,10 @@
       </p:sp>
       <p:cxnSp>
         <p:nvCxnSpPr>
-          <p:cNvPr id="5" name="Straight Arrow Connector 4">
-            <a:extLst>
-              <a:ext uri="{FF2B5EF4-FFF2-40B4-BE49-F238E27FC236}">
-                <a16:creationId xmlns:a16="http://schemas.microsoft.com/office/drawing/2014/main" id="{A310E1AF-42E1-8AEF-91C0-7F8E43A08F43}"/>
-              </a:ext>
-            </a:extLst>
-          </p:cNvPr>
-          <p:cNvCxnSpPr>
-            <a:cxnSpLocks/>
-            <a:endCxn id="198" idx="1"/>
-          </p:cNvCxnSpPr>
-          <p:nvPr/>
-        </p:nvCxnSpPr>
-        <p:spPr>
-          <a:xfrm>
-            <a:off x="2112264" y="3429000"/>
-            <a:ext cx="2824857" cy="0"/>
-          </a:xfrm>
-          <a:prstGeom prst="straightConnector1">
-            <a:avLst/>
-          </a:prstGeom>
-          <a:ln>
-            <a:solidFill>
-              <a:schemeClr val="tx1"/>
-            </a:solidFill>
-            <a:tailEnd type="triangle"/>
-          </a:ln>
-        </p:spPr>
-        <p:style>
-          <a:lnRef idx="2">
-            <a:schemeClr val="accent1"/>
-          </a:lnRef>
-          <a:fillRef idx="0">
-            <a:schemeClr val="accent1"/>
-          </a:fillRef>
-          <a:effectRef idx="1">
-            <a:schemeClr val="accent1"/>
-          </a:effectRef>
-          <a:fontRef idx="minor">
-            <a:schemeClr val="tx1"/>
-          </a:fontRef>
-        </p:style>
-      </p:cxnSp>
-      <p:cxnSp>
-        <p:nvCxnSpPr>
-          <p:cNvPr id="4" name="Straight Arrow Connector 3">
-            <a:extLst>
-              <a:ext uri="{FF2B5EF4-FFF2-40B4-BE49-F238E27FC236}">
-                <a16:creationId xmlns:a16="http://schemas.microsoft.com/office/drawing/2014/main" id="{ECFC8F3E-578B-6DCA-8AED-C00E0F32B70E}"/>
+          <p:cNvPr id="6" name="Straight Arrow Connector 5">
+            <a:extLst>
+              <a:ext uri="{FF2B5EF4-FFF2-40B4-BE49-F238E27FC236}">
+                <a16:creationId xmlns:a16="http://schemas.microsoft.com/office/drawing/2014/main" id="{AFF019BE-39F8-9634-CD74-930ED18693FD}"/>
               </a:ext>
             </a:extLst>
           </p:cNvPr>
@@ -14098,52 +14053,8 @@
         </p:nvCxnSpPr>
         <p:spPr>
           <a:xfrm>
-            <a:off x="7254879" y="3425952"/>
-            <a:ext cx="2824857" cy="0"/>
-          </a:xfrm>
-          <a:prstGeom prst="straightConnector1">
-            <a:avLst/>
-          </a:prstGeom>
-          <a:ln>
-            <a:solidFill>
-              <a:schemeClr val="tx1"/>
-            </a:solidFill>
-            <a:tailEnd type="triangle"/>
-          </a:ln>
-        </p:spPr>
-        <p:style>
-          <a:lnRef idx="2">
-            <a:schemeClr val="accent1"/>
-          </a:lnRef>
-          <a:fillRef idx="0">
-            <a:schemeClr val="accent1"/>
-          </a:fillRef>
-          <a:effectRef idx="1">
-            <a:schemeClr val="accent1"/>
-          </a:effectRef>
-          <a:fontRef idx="minor">
-            <a:schemeClr val="tx1"/>
-          </a:fontRef>
-        </p:style>
-      </p:cxnSp>
-      <p:cxnSp>
-        <p:nvCxnSpPr>
-          <p:cNvPr id="6" name="Straight Arrow Connector 5">
-            <a:extLst>
-              <a:ext uri="{FF2B5EF4-FFF2-40B4-BE49-F238E27FC236}">
-                <a16:creationId xmlns:a16="http://schemas.microsoft.com/office/drawing/2014/main" id="{AFF019BE-39F8-9634-CD74-930ED18693FD}"/>
-              </a:ext>
-            </a:extLst>
-          </p:cNvPr>
-          <p:cNvCxnSpPr>
-            <a:cxnSpLocks/>
-          </p:cNvCxnSpPr>
-          <p:nvPr/>
-        </p:nvCxnSpPr>
-        <p:spPr>
-          <a:xfrm>
-            <a:off x="6096000" y="1104189"/>
-            <a:ext cx="0" cy="1716024"/>
+            <a:off x="6096000" y="2074606"/>
+            <a:ext cx="0" cy="745607"/>
           </a:xfrm>
           <a:prstGeom prst="straightConnector1">
             <a:avLst/>
@@ -14187,7 +14098,7 @@
         <p:spPr>
           <a:xfrm>
             <a:off x="5571105" y="4037786"/>
-            <a:ext cx="0" cy="1448614"/>
+            <a:ext cx="0" cy="691530"/>
           </a:xfrm>
           <a:prstGeom prst="straightConnector1">
             <a:avLst/>
@@ -14231,7 +14142,7 @@
         <p:spPr>
           <a:xfrm>
             <a:off x="6683625" y="4037786"/>
-            <a:ext cx="0" cy="1448614"/>
+            <a:ext cx="0" cy="691530"/>
           </a:xfrm>
           <a:prstGeom prst="straightConnector1">
             <a:avLst/>
@@ -14272,7 +14183,7 @@
         </p:nvSpPr>
         <p:spPr>
           <a:xfrm>
-            <a:off x="3373849" y="3179731"/>
+            <a:off x="4327578" y="3189563"/>
             <a:ext cx="301686" cy="323165"/>
           </a:xfrm>
           <a:prstGeom prst="rect">
@@ -14308,7 +14219,7 @@
         </p:nvSpPr>
         <p:spPr>
           <a:xfrm>
-            <a:off x="8519670" y="3179730"/>
+            <a:off x="7546277" y="3189563"/>
             <a:ext cx="295274" cy="323165"/>
           </a:xfrm>
           <a:prstGeom prst="rect">
@@ -14344,7 +14255,7 @@
         </p:nvSpPr>
         <p:spPr>
           <a:xfrm>
-            <a:off x="5802329" y="1769325"/>
+            <a:off x="5861322" y="2300266"/>
             <a:ext cx="292068" cy="323165"/>
           </a:xfrm>
           <a:prstGeom prst="rect">
@@ -14382,7 +14293,7 @@
             </p:nvSpPr>
             <p:spPr>
               <a:xfrm>
-                <a:off x="5128644" y="4616797"/>
+                <a:off x="5502271" y="4223507"/>
                 <a:ext cx="515205" cy="323165"/>
               </a:xfrm>
               <a:prstGeom prst="rect">
@@ -14453,7 +14364,7 @@
             </p:nvSpPr>
             <p:spPr>
               <a:xfrm>
-                <a:off x="5128644" y="4616797"/>
+                <a:off x="5502271" y="4223507"/>
                 <a:ext cx="515205" cy="323165"/>
               </a:xfrm>
               <a:prstGeom prst="rect">
@@ -14497,7 +14408,7 @@
             </p:nvSpPr>
             <p:spPr>
               <a:xfrm>
-                <a:off x="6263554" y="4600510"/>
+                <a:off x="6617511" y="4226884"/>
                 <a:ext cx="489942" cy="339452"/>
               </a:xfrm>
               <a:prstGeom prst="rect">
@@ -14568,7 +14479,7 @@
             </p:nvSpPr>
             <p:spPr>
               <a:xfrm>
-                <a:off x="6263554" y="4600510"/>
+                <a:off x="6617511" y="4226884"/>
                 <a:ext cx="489942" cy="339452"/>
               </a:xfrm>
               <a:prstGeom prst="rect">
@@ -14577,7 +14488,7 @@
               <a:blipFill>
                 <a:blip r:embed="rId3"/>
                 <a:stretch>
-                  <a:fillRect b="-3636"/>
+                  <a:fillRect/>
                 </a:stretch>
               </a:blipFill>
             </p:spPr>
@@ -14596,6 +14507,96 @@
           </p:sp>
         </mc:Fallback>
       </mc:AlternateContent>
+      <p:cxnSp>
+        <p:nvCxnSpPr>
+          <p:cNvPr id="7" name="Straight Arrow Connector 6">
+            <a:extLst>
+              <a:ext uri="{FF2B5EF4-FFF2-40B4-BE49-F238E27FC236}">
+                <a16:creationId xmlns:a16="http://schemas.microsoft.com/office/drawing/2014/main" id="{61BA93B7-32C4-018E-2DC1-D90940641E5D}"/>
+              </a:ext>
+            </a:extLst>
+          </p:cNvPr>
+          <p:cNvCxnSpPr>
+            <a:cxnSpLocks/>
+            <a:endCxn id="198" idx="1"/>
+          </p:cNvCxnSpPr>
+          <p:nvPr/>
+        </p:nvCxnSpPr>
+        <p:spPr>
+          <a:xfrm>
+            <a:off x="4050890" y="3429000"/>
+            <a:ext cx="886231" cy="0"/>
+          </a:xfrm>
+          <a:prstGeom prst="straightConnector1">
+            <a:avLst/>
+          </a:prstGeom>
+          <a:ln>
+            <a:solidFill>
+              <a:schemeClr val="tx1"/>
+            </a:solidFill>
+            <a:tailEnd type="triangle"/>
+          </a:ln>
+        </p:spPr>
+        <p:style>
+          <a:lnRef idx="2">
+            <a:schemeClr val="accent1"/>
+          </a:lnRef>
+          <a:fillRef idx="0">
+            <a:schemeClr val="accent1"/>
+          </a:fillRef>
+          <a:effectRef idx="1">
+            <a:schemeClr val="accent1"/>
+          </a:effectRef>
+          <a:fontRef idx="minor">
+            <a:schemeClr val="tx1"/>
+          </a:fontRef>
+        </p:style>
+      </p:cxnSp>
+      <p:cxnSp>
+        <p:nvCxnSpPr>
+          <p:cNvPr id="17" name="Straight Arrow Connector 16">
+            <a:extLst>
+              <a:ext uri="{FF2B5EF4-FFF2-40B4-BE49-F238E27FC236}">
+                <a16:creationId xmlns:a16="http://schemas.microsoft.com/office/drawing/2014/main" id="{1449E09D-0076-B1CA-BBE4-E1C36CE3F45C}"/>
+              </a:ext>
+            </a:extLst>
+          </p:cNvPr>
+          <p:cNvCxnSpPr>
+            <a:cxnSpLocks/>
+            <a:stCxn id="198" idx="3"/>
+          </p:cNvCxnSpPr>
+          <p:nvPr/>
+        </p:nvCxnSpPr>
+        <p:spPr>
+          <a:xfrm>
+            <a:off x="7254879" y="3429000"/>
+            <a:ext cx="856734" cy="0"/>
+          </a:xfrm>
+          <a:prstGeom prst="straightConnector1">
+            <a:avLst/>
+          </a:prstGeom>
+          <a:ln>
+            <a:solidFill>
+              <a:schemeClr val="tx1"/>
+            </a:solidFill>
+            <a:tailEnd type="triangle"/>
+          </a:ln>
+        </p:spPr>
+        <p:style>
+          <a:lnRef idx="2">
+            <a:schemeClr val="accent1"/>
+          </a:lnRef>
+          <a:fillRef idx="0">
+            <a:schemeClr val="accent1"/>
+          </a:fillRef>
+          <a:effectRef idx="1">
+            <a:schemeClr val="accent1"/>
+          </a:effectRef>
+          <a:fontRef idx="minor">
+            <a:schemeClr val="tx1"/>
+          </a:fontRef>
+        </p:style>
+      </p:cxnSp>
     </p:spTree>
     <p:extLst>
       <p:ext uri="{BB962C8B-B14F-4D97-AF65-F5344CB8AC3E}">

</xml_diff>

<commit_message>
Made Tania's suggested edits.
</commit_message>
<xml_diff>
--- a/images/BXCC_figs.pptx
+++ b/images/BXCC_figs.pptx
@@ -264,7 +264,7 @@
           <a:p>
             <a:fld id="{42C5692D-4EAB-6146-AB82-22160C9836E7}" type="datetimeFigureOut">
               <a:rPr lang="en-US" smtClean="0"/>
-              <a:t>9/17/25</a:t>
+              <a:t>10/14/25</a:t>
             </a:fld>
             <a:endParaRPr lang="en-US"/>
           </a:p>
@@ -462,7 +462,7 @@
           <a:p>
             <a:fld id="{42C5692D-4EAB-6146-AB82-22160C9836E7}" type="datetimeFigureOut">
               <a:rPr lang="en-US" smtClean="0"/>
-              <a:t>9/17/25</a:t>
+              <a:t>10/14/25</a:t>
             </a:fld>
             <a:endParaRPr lang="en-US"/>
           </a:p>
@@ -670,7 +670,7 @@
           <a:p>
             <a:fld id="{42C5692D-4EAB-6146-AB82-22160C9836E7}" type="datetimeFigureOut">
               <a:rPr lang="en-US" smtClean="0"/>
-              <a:t>9/17/25</a:t>
+              <a:t>10/14/25</a:t>
             </a:fld>
             <a:endParaRPr lang="en-US"/>
           </a:p>
@@ -868,7 +868,7 @@
           <a:p>
             <a:fld id="{42C5692D-4EAB-6146-AB82-22160C9836E7}" type="datetimeFigureOut">
               <a:rPr lang="en-US" smtClean="0"/>
-              <a:t>9/17/25</a:t>
+              <a:t>10/14/25</a:t>
             </a:fld>
             <a:endParaRPr lang="en-US"/>
           </a:p>
@@ -1143,7 +1143,7 @@
           <a:p>
             <a:fld id="{42C5692D-4EAB-6146-AB82-22160C9836E7}" type="datetimeFigureOut">
               <a:rPr lang="en-US" smtClean="0"/>
-              <a:t>9/17/25</a:t>
+              <a:t>10/14/25</a:t>
             </a:fld>
             <a:endParaRPr lang="en-US"/>
           </a:p>
@@ -1408,7 +1408,7 @@
           <a:p>
             <a:fld id="{42C5692D-4EAB-6146-AB82-22160C9836E7}" type="datetimeFigureOut">
               <a:rPr lang="en-US" smtClean="0"/>
-              <a:t>9/17/25</a:t>
+              <a:t>10/14/25</a:t>
             </a:fld>
             <a:endParaRPr lang="en-US"/>
           </a:p>
@@ -1820,7 +1820,7 @@
           <a:p>
             <a:fld id="{42C5692D-4EAB-6146-AB82-22160C9836E7}" type="datetimeFigureOut">
               <a:rPr lang="en-US" smtClean="0"/>
-              <a:t>9/17/25</a:t>
+              <a:t>10/14/25</a:t>
             </a:fld>
             <a:endParaRPr lang="en-US"/>
           </a:p>
@@ -1961,7 +1961,7 @@
           <a:p>
             <a:fld id="{42C5692D-4EAB-6146-AB82-22160C9836E7}" type="datetimeFigureOut">
               <a:rPr lang="en-US" smtClean="0"/>
-              <a:t>9/17/25</a:t>
+              <a:t>10/14/25</a:t>
             </a:fld>
             <a:endParaRPr lang="en-US"/>
           </a:p>
@@ -2074,7 +2074,7 @@
           <a:p>
             <a:fld id="{42C5692D-4EAB-6146-AB82-22160C9836E7}" type="datetimeFigureOut">
               <a:rPr lang="en-US" smtClean="0"/>
-              <a:t>9/17/25</a:t>
+              <a:t>10/14/25</a:t>
             </a:fld>
             <a:endParaRPr lang="en-US"/>
           </a:p>
@@ -2385,7 +2385,7 @@
           <a:p>
             <a:fld id="{42C5692D-4EAB-6146-AB82-22160C9836E7}" type="datetimeFigureOut">
               <a:rPr lang="en-US" smtClean="0"/>
-              <a:t>9/17/25</a:t>
+              <a:t>10/14/25</a:t>
             </a:fld>
             <a:endParaRPr lang="en-US"/>
           </a:p>
@@ -2673,7 +2673,7 @@
           <a:p>
             <a:fld id="{42C5692D-4EAB-6146-AB82-22160C9836E7}" type="datetimeFigureOut">
               <a:rPr lang="en-US" smtClean="0"/>
-              <a:t>9/17/25</a:t>
+              <a:t>10/14/25</a:t>
             </a:fld>
             <a:endParaRPr lang="en-US"/>
           </a:p>
@@ -2914,7 +2914,7 @@
           <a:p>
             <a:fld id="{42C5692D-4EAB-6146-AB82-22160C9836E7}" type="datetimeFigureOut">
               <a:rPr lang="en-US" smtClean="0"/>
-              <a:t>9/17/25</a:t>
+              <a:t>10/14/25</a:t>
             </a:fld>
             <a:endParaRPr lang="en-US"/>
           </a:p>
@@ -10878,7 +10878,7 @@
           </a:prstGeom>
           <a:ln>
             <a:solidFill>
-              <a:srgbClr val="EDE995"/>
+              <a:schemeClr val="tx1"/>
             </a:solidFill>
             <a:tailEnd type="triangle"/>
           </a:ln>
@@ -10924,7 +10924,7 @@
           </a:prstGeom>
           <a:ln>
             <a:solidFill>
-              <a:srgbClr val="EDE995"/>
+              <a:schemeClr val="tx1"/>
             </a:solidFill>
             <a:tailEnd type="triangle"/>
           </a:ln>
@@ -10969,7 +10969,7 @@
           </a:prstGeom>
           <a:ln>
             <a:solidFill>
-              <a:srgbClr val="FFC003"/>
+              <a:schemeClr val="tx1"/>
             </a:solidFill>
             <a:tailEnd type="triangle"/>
           </a:ln>
@@ -11057,7 +11057,7 @@
           </a:prstGeom>
           <a:ln>
             <a:solidFill>
-              <a:srgbClr val="FFC003"/>
+              <a:schemeClr val="tx1"/>
             </a:solidFill>
             <a:tailEnd type="triangle"/>
           </a:ln>
@@ -11101,7 +11101,7 @@
           </a:prstGeom>
           <a:ln>
             <a:solidFill>
-              <a:srgbClr val="FFC003"/>
+              <a:schemeClr val="tx1"/>
             </a:solidFill>
             <a:tailEnd type="triangle"/>
           </a:ln>
@@ -11145,7 +11145,7 @@
           </a:prstGeom>
           <a:ln>
             <a:solidFill>
-              <a:srgbClr val="EDE995"/>
+              <a:schemeClr val="tx1"/>
             </a:solidFill>
             <a:tailEnd type="triangle"/>
           </a:ln>
@@ -11189,7 +11189,7 @@
           </a:prstGeom>
           <a:ln>
             <a:solidFill>
-              <a:srgbClr val="EDE995"/>
+              <a:schemeClr val="tx1"/>
             </a:solidFill>
             <a:tailEnd type="triangle"/>
           </a:ln>
@@ -11233,7 +11233,7 @@
           </a:prstGeom>
           <a:ln>
             <a:solidFill>
-              <a:srgbClr val="EDE995"/>
+              <a:schemeClr val="tx1"/>
             </a:solidFill>
             <a:tailEnd type="triangle"/>
           </a:ln>
@@ -11277,7 +11277,7 @@
           </a:prstGeom>
           <a:ln>
             <a:solidFill>
-              <a:srgbClr val="EDE995"/>
+              <a:schemeClr val="tx1"/>
             </a:solidFill>
             <a:tailEnd type="triangle"/>
           </a:ln>
@@ -11323,7 +11323,7 @@
           </a:prstGeom>
           <a:ln>
             <a:solidFill>
-              <a:srgbClr val="FFC003"/>
+              <a:schemeClr val="tx1"/>
             </a:solidFill>
             <a:tailEnd type="triangle"/>
           </a:ln>
@@ -11727,7 +11727,7 @@
           </a:prstGeom>
           <a:ln>
             <a:solidFill>
-              <a:srgbClr val="C00000"/>
+              <a:schemeClr val="tx1"/>
             </a:solidFill>
             <a:tailEnd type="triangle"/>
           </a:ln>
@@ -11771,7 +11771,7 @@
           </a:prstGeom>
           <a:ln>
             <a:solidFill>
-              <a:srgbClr val="C00100"/>
+              <a:schemeClr val="tx1"/>
             </a:solidFill>
             <a:tailEnd type="triangle"/>
           </a:ln>
@@ -11817,7 +11817,7 @@
           </a:prstGeom>
           <a:ln>
             <a:solidFill>
-              <a:srgbClr val="C00000"/>
+              <a:schemeClr val="tx1"/>
             </a:solidFill>
             <a:tailEnd type="triangle"/>
           </a:ln>
@@ -11863,7 +11863,7 @@
           </a:prstGeom>
           <a:ln>
             <a:solidFill>
-              <a:srgbClr val="FFC003"/>
+              <a:schemeClr val="tx1"/>
             </a:solidFill>
             <a:tailEnd type="triangle"/>
           </a:ln>
@@ -11909,7 +11909,7 @@
           </a:prstGeom>
           <a:ln>
             <a:solidFill>
-              <a:srgbClr val="FFC003"/>
+              <a:schemeClr val="tx1"/>
             </a:solidFill>
             <a:tailEnd type="triangle"/>
           </a:ln>
@@ -11955,7 +11955,7 @@
           </a:prstGeom>
           <a:ln>
             <a:solidFill>
-              <a:srgbClr val="FFC003"/>
+              <a:schemeClr val="tx1"/>
             </a:solidFill>
             <a:tailEnd type="triangle"/>
           </a:ln>
@@ -12001,7 +12001,7 @@
           </a:prstGeom>
           <a:ln>
             <a:solidFill>
-              <a:srgbClr val="EDE995"/>
+              <a:schemeClr val="tx1"/>
             </a:solidFill>
             <a:tailEnd type="triangle"/>
           </a:ln>
@@ -12047,7 +12047,7 @@
           </a:prstGeom>
           <a:ln>
             <a:solidFill>
-              <a:srgbClr val="EDE995"/>
+              <a:schemeClr val="tx1"/>
             </a:solidFill>
             <a:tailEnd type="triangle"/>
           </a:ln>
@@ -12093,7 +12093,7 @@
           </a:prstGeom>
           <a:ln>
             <a:solidFill>
-              <a:srgbClr val="EDE995"/>
+              <a:schemeClr val="tx1"/>
             </a:solidFill>
             <a:tailEnd type="triangle"/>
           </a:ln>
@@ -12247,7 +12247,7 @@
           </a:prstGeom>
           <a:ln>
             <a:solidFill>
-              <a:srgbClr val="C00000"/>
+              <a:schemeClr val="tx1"/>
             </a:solidFill>
             <a:tailEnd type="triangle"/>
           </a:ln>
@@ -12293,7 +12293,7 @@
           </a:prstGeom>
           <a:ln>
             <a:solidFill>
-              <a:srgbClr val="C00000"/>
+              <a:schemeClr val="tx1"/>
             </a:solidFill>
             <a:tailEnd type="triangle"/>
           </a:ln>
@@ -12327,7 +12327,7 @@
         </p:nvSpPr>
         <p:spPr>
           <a:xfrm>
-            <a:off x="10179743" y="2401325"/>
+            <a:off x="10165304" y="2391699"/>
             <a:ext cx="591829" cy="246221"/>
           </a:xfrm>
           <a:prstGeom prst="rect">
@@ -13840,7 +13840,7 @@
           </a:prstGeom>
           <a:ln>
             <a:solidFill>
-              <a:srgbClr val="EDE995"/>
+              <a:schemeClr val="tx1"/>
             </a:solidFill>
             <a:tailEnd type="triangle"/>
           </a:ln>

</xml_diff>